<commit_message>
elmo fire y slides avanzadas
</commit_message>
<xml_diff>
--- a/2017/dec_7_Git_GitHub_WorkShop/DGO.pptx
+++ b/2017/dec_7_Git_GitHub_WorkShop/DGO.pptx
@@ -12,9 +12,14 @@
     <p:sldId id="260" r:id="rId6"/>
     <p:sldId id="261" r:id="rId7"/>
     <p:sldId id="262" r:id="rId8"/>
-    <p:sldId id="263" r:id="rId9"/>
-    <p:sldId id="264" r:id="rId10"/>
-    <p:sldId id="265" r:id="rId11"/>
+    <p:sldId id="266" r:id="rId9"/>
+    <p:sldId id="267" r:id="rId10"/>
+    <p:sldId id="268" r:id="rId11"/>
+    <p:sldId id="269" r:id="rId12"/>
+    <p:sldId id="263" r:id="rId13"/>
+    <p:sldId id="264" r:id="rId14"/>
+    <p:sldId id="270" r:id="rId15"/>
+    <p:sldId id="265" r:id="rId16"/>
   </p:sldIdLst>
   <p:sldSz cx="12192000" cy="6858000"/>
   <p:notesSz cx="6858000" cy="9144000"/>
@@ -252,7 +257,7 @@
           <a:p>
             <a:fld id="{3FD3500F-8B60-4FBA-BC8A-72168F3C79F5}" type="datetimeFigureOut">
               <a:rPr lang="es-MX" smtClean="0"/>
-              <a:t>26/11/2017</a:t>
+              <a:t>30/11/2017</a:t>
             </a:fld>
             <a:endParaRPr lang="es-MX"/>
           </a:p>
@@ -422,7 +427,7 @@
           <a:p>
             <a:fld id="{3FD3500F-8B60-4FBA-BC8A-72168F3C79F5}" type="datetimeFigureOut">
               <a:rPr lang="es-MX" smtClean="0"/>
-              <a:t>26/11/2017</a:t>
+              <a:t>30/11/2017</a:t>
             </a:fld>
             <a:endParaRPr lang="es-MX"/>
           </a:p>
@@ -602,7 +607,7 @@
           <a:p>
             <a:fld id="{3FD3500F-8B60-4FBA-BC8A-72168F3C79F5}" type="datetimeFigureOut">
               <a:rPr lang="es-MX" smtClean="0"/>
-              <a:t>26/11/2017</a:t>
+              <a:t>30/11/2017</a:t>
             </a:fld>
             <a:endParaRPr lang="es-MX"/>
           </a:p>
@@ -772,7 +777,7 @@
           <a:p>
             <a:fld id="{3FD3500F-8B60-4FBA-BC8A-72168F3C79F5}" type="datetimeFigureOut">
               <a:rPr lang="es-MX" smtClean="0"/>
-              <a:t>26/11/2017</a:t>
+              <a:t>30/11/2017</a:t>
             </a:fld>
             <a:endParaRPr lang="es-MX"/>
           </a:p>
@@ -1018,7 +1023,7 @@
           <a:p>
             <a:fld id="{3FD3500F-8B60-4FBA-BC8A-72168F3C79F5}" type="datetimeFigureOut">
               <a:rPr lang="es-MX" smtClean="0"/>
-              <a:t>26/11/2017</a:t>
+              <a:t>30/11/2017</a:t>
             </a:fld>
             <a:endParaRPr lang="es-MX"/>
           </a:p>
@@ -1250,7 +1255,7 @@
           <a:p>
             <a:fld id="{3FD3500F-8B60-4FBA-BC8A-72168F3C79F5}" type="datetimeFigureOut">
               <a:rPr lang="es-MX" smtClean="0"/>
-              <a:t>26/11/2017</a:t>
+              <a:t>30/11/2017</a:t>
             </a:fld>
             <a:endParaRPr lang="es-MX"/>
           </a:p>
@@ -1617,7 +1622,7 @@
           <a:p>
             <a:fld id="{3FD3500F-8B60-4FBA-BC8A-72168F3C79F5}" type="datetimeFigureOut">
               <a:rPr lang="es-MX" smtClean="0"/>
-              <a:t>26/11/2017</a:t>
+              <a:t>30/11/2017</a:t>
             </a:fld>
             <a:endParaRPr lang="es-MX"/>
           </a:p>
@@ -1735,7 +1740,7 @@
           <a:p>
             <a:fld id="{3FD3500F-8B60-4FBA-BC8A-72168F3C79F5}" type="datetimeFigureOut">
               <a:rPr lang="es-MX" smtClean="0"/>
-              <a:t>26/11/2017</a:t>
+              <a:t>30/11/2017</a:t>
             </a:fld>
             <a:endParaRPr lang="es-MX"/>
           </a:p>
@@ -1830,7 +1835,7 @@
           <a:p>
             <a:fld id="{3FD3500F-8B60-4FBA-BC8A-72168F3C79F5}" type="datetimeFigureOut">
               <a:rPr lang="es-MX" smtClean="0"/>
-              <a:t>26/11/2017</a:t>
+              <a:t>30/11/2017</a:t>
             </a:fld>
             <a:endParaRPr lang="es-MX"/>
           </a:p>
@@ -2107,7 +2112,7 @@
           <a:p>
             <a:fld id="{3FD3500F-8B60-4FBA-BC8A-72168F3C79F5}" type="datetimeFigureOut">
               <a:rPr lang="es-MX" smtClean="0"/>
-              <a:t>26/11/2017</a:t>
+              <a:t>30/11/2017</a:t>
             </a:fld>
             <a:endParaRPr lang="es-MX"/>
           </a:p>
@@ -2364,7 +2369,7 @@
           <a:p>
             <a:fld id="{3FD3500F-8B60-4FBA-BC8A-72168F3C79F5}" type="datetimeFigureOut">
               <a:rPr lang="es-MX" smtClean="0"/>
-              <a:t>26/11/2017</a:t>
+              <a:t>30/11/2017</a:t>
             </a:fld>
             <a:endParaRPr lang="es-MX"/>
           </a:p>
@@ -2577,7 +2582,7 @@
           <a:p>
             <a:fld id="{3FD3500F-8B60-4FBA-BC8A-72168F3C79F5}" type="datetimeFigureOut">
               <a:rPr lang="es-MX" smtClean="0"/>
-              <a:t>26/11/2017</a:t>
+              <a:t>30/11/2017</a:t>
             </a:fld>
             <a:endParaRPr lang="es-MX"/>
           </a:p>
@@ -3007,65 +3012,61 @@
           <a:p>
             <a:r>
               <a:rPr lang="es-MX" sz="11000" dirty="0" err="1" smtClean="0">
+                <a:solidFill>
+                  <a:srgbClr val="921429"/>
+                </a:solidFill>
+                <a:latin typeface="Roboto Black" panose="02000000000000000000" pitchFamily="2" charset="0"/>
+                <a:ea typeface="Roboto Black" panose="02000000000000000000" pitchFamily="2" charset="0"/>
+                <a:cs typeface="Open Sans" panose="020B0606030504020204" pitchFamily="34" charset="0"/>
+              </a:rPr>
+              <a:t>Git</a:t>
+            </a:r>
+            <a:r>
+              <a:rPr lang="es-MX" sz="11000" dirty="0" smtClean="0">
+                <a:solidFill>
+                  <a:srgbClr val="921429"/>
+                </a:solidFill>
+                <a:latin typeface="Roboto Black" panose="02000000000000000000" pitchFamily="2" charset="0"/>
+                <a:ea typeface="Roboto Black" panose="02000000000000000000" pitchFamily="2" charset="0"/>
+                <a:cs typeface="Open Sans" panose="020B0606030504020204" pitchFamily="34" charset="0"/>
+              </a:rPr>
+              <a:t> / </a:t>
+            </a:r>
+            <a:r>
+              <a:rPr lang="es-MX" sz="11000" dirty="0" smtClean="0">
                 <a:gradFill flip="none" rotWithShape="1">
                   <a:gsLst>
-                    <a:gs pos="23000">
-                      <a:srgbClr val="6A3093"/>
+                    <a:gs pos="26000">
+                      <a:srgbClr val="921429"/>
                     </a:gs>
-                    <a:gs pos="100000">
-                      <a:srgbClr val="B469FF">
-                        <a:alpha val="27000"/>
-                      </a:srgbClr>
+                    <a:gs pos="0">
+                      <a:srgbClr val="D50F2E"/>
                     </a:gs>
                   </a:gsLst>
                   <a:lin ang="5400000" scaled="1"/>
                   <a:tileRect/>
                 </a:gradFill>
-                <a:latin typeface="Roboto" panose="02000000000000000000" pitchFamily="2" charset="0"/>
-                <a:ea typeface="Roboto" panose="02000000000000000000" pitchFamily="2" charset="0"/>
+                <a:latin typeface="Roboto Black" panose="02000000000000000000" pitchFamily="2" charset="0"/>
+                <a:ea typeface="Roboto Black" panose="02000000000000000000" pitchFamily="2" charset="0"/>
                 <a:cs typeface="Open Sans" panose="020B0606030504020204" pitchFamily="34" charset="0"/>
               </a:rPr>
-              <a:t>Git</a:t>
-            </a:r>
-            <a:r>
-              <a:rPr lang="es-MX" sz="11000" dirty="0" smtClean="0">
-                <a:gradFill flip="none" rotWithShape="1">
-                  <a:gsLst>
-                    <a:gs pos="23000">
-                      <a:srgbClr val="6A3093"/>
-                    </a:gs>
-                    <a:gs pos="100000">
-                      <a:srgbClr val="B469FF">
-                        <a:alpha val="27000"/>
-                      </a:srgbClr>
-                    </a:gs>
-                  </a:gsLst>
-                  <a:lin ang="5400000" scaled="1"/>
-                  <a:tileRect/>
-                </a:gradFill>
-                <a:latin typeface="Roboto" panose="02000000000000000000" pitchFamily="2" charset="0"/>
-                <a:ea typeface="Roboto" panose="02000000000000000000" pitchFamily="2" charset="0"/>
-                <a:cs typeface="Open Sans" panose="020B0606030504020204" pitchFamily="34" charset="0"/>
-              </a:rPr>
-              <a:t> / GitHub</a:t>
+              <a:t>GitHub</a:t>
             </a:r>
             <a:endParaRPr lang="es-MX" sz="11000" dirty="0">
               <a:gradFill flip="none" rotWithShape="1">
                 <a:gsLst>
-                  <a:gs pos="23000">
-                    <a:srgbClr val="6A3093"/>
+                  <a:gs pos="26000">
+                    <a:srgbClr val="921429"/>
                   </a:gs>
-                  <a:gs pos="100000">
-                    <a:srgbClr val="B469FF">
-                      <a:alpha val="27000"/>
-                    </a:srgbClr>
+                  <a:gs pos="0">
+                    <a:srgbClr val="D50F2E"/>
                   </a:gs>
                 </a:gsLst>
                 <a:lin ang="5400000" scaled="1"/>
                 <a:tileRect/>
               </a:gradFill>
-              <a:latin typeface="Roboto" panose="02000000000000000000" pitchFamily="2" charset="0"/>
-              <a:ea typeface="Roboto" panose="02000000000000000000" pitchFamily="2" charset="0"/>
+              <a:latin typeface="Roboto Black" panose="02000000000000000000" pitchFamily="2" charset="0"/>
+              <a:ea typeface="Roboto Black" panose="02000000000000000000" pitchFamily="2" charset="0"/>
               <a:cs typeface="Open Sans" panose="020B0606030504020204" pitchFamily="34" charset="0"/>
             </a:endParaRPr>
           </a:p>
@@ -3094,7 +3095,7 @@
           <a:lstStyle/>
           <a:p>
             <a:r>
-              <a:rPr lang="es-MX" sz="2000" dirty="0" err="1">
+              <a:rPr lang="es-MX" sz="1900" dirty="0" err="1">
                 <a:solidFill>
                   <a:srgbClr val="ACAFAF"/>
                 </a:solidFill>
@@ -3104,7 +3105,7 @@
               <a:t>f</a:t>
             </a:r>
             <a:r>
-              <a:rPr lang="es-MX" sz="2000" dirty="0" err="1" smtClean="0">
+              <a:rPr lang="es-MX" sz="1900" dirty="0" err="1" smtClean="0">
                 <a:solidFill>
                   <a:srgbClr val="ACAFAF"/>
                 </a:solidFill>
@@ -3114,7 +3115,7 @@
               <a:t>rom</a:t>
             </a:r>
             <a:r>
-              <a:rPr lang="es-MX" sz="2000" dirty="0" smtClean="0">
+              <a:rPr lang="es-MX" sz="1900" dirty="0" smtClean="0">
                 <a:solidFill>
                   <a:srgbClr val="ACAFAF"/>
                 </a:solidFill>
@@ -3124,7 +3125,7 @@
               <a:t> </a:t>
             </a:r>
             <a:r>
-              <a:rPr lang="es-MX" sz="2000" dirty="0" err="1" smtClean="0">
+              <a:rPr lang="es-MX" sz="1900" dirty="0" err="1" smtClean="0">
                 <a:solidFill>
                   <a:srgbClr val="ACAFAF"/>
                 </a:solidFill>
@@ -3134,7 +3135,7 @@
               <a:t>zero</a:t>
             </a:r>
             <a:r>
-              <a:rPr lang="es-MX" sz="2000" dirty="0" smtClean="0">
+              <a:rPr lang="es-MX" sz="1900" dirty="0" smtClean="0">
                 <a:solidFill>
                   <a:srgbClr val="ACAFAF"/>
                 </a:solidFill>
@@ -3144,7 +3145,7 @@
               <a:t> to </a:t>
             </a:r>
             <a:r>
-              <a:rPr lang="es-MX" sz="2000" dirty="0" err="1" smtClean="0">
+              <a:rPr lang="es-MX" sz="1900" dirty="0" err="1" smtClean="0">
                 <a:solidFill>
                   <a:srgbClr val="ACAFAF"/>
                 </a:solidFill>
@@ -3153,7 +3154,7 @@
               </a:rPr>
               <a:t>hero</a:t>
             </a:r>
-            <a:endParaRPr lang="es-MX" sz="2000" dirty="0">
+            <a:endParaRPr lang="es-MX" sz="1900" dirty="0">
               <a:solidFill>
                 <a:srgbClr val="ACAFAF"/>
               </a:solidFill>
@@ -3284,6 +3285,2355 @@
           <a:bodyPr/>
           <a:lstStyle/>
           <a:p>
+            <a:r>
+              <a:rPr lang="es-MX" sz="5000" dirty="0" smtClean="0">
+                <a:solidFill>
+                  <a:srgbClr val="D50F2E"/>
+                </a:solidFill>
+                <a:latin typeface="Roboto Black" panose="02000000000000000000" pitchFamily="2" charset="0"/>
+                <a:ea typeface="Roboto Black" panose="02000000000000000000" pitchFamily="2" charset="0"/>
+              </a:rPr>
+              <a:t>SSH to GitHub </a:t>
+            </a:r>
+            <a:r>
+              <a:rPr lang="es-MX" sz="5000" dirty="0" smtClean="0">
+                <a:solidFill>
+                  <a:srgbClr val="6A3093"/>
+                </a:solidFill>
+                <a:latin typeface="Roboto" panose="02000000000000000000" pitchFamily="2" charset="0"/>
+                <a:ea typeface="Roboto" panose="02000000000000000000" pitchFamily="2" charset="0"/>
+              </a:rPr>
+              <a:t> </a:t>
+            </a:r>
+            <a:r>
+              <a:rPr lang="es-MX" sz="2500" dirty="0">
+                <a:solidFill>
+                  <a:schemeClr val="bg1">
+                    <a:lumMod val="85000"/>
+                  </a:schemeClr>
+                </a:solidFill>
+                <a:latin typeface="Roboto" panose="02000000000000000000" pitchFamily="2" charset="0"/>
+                <a:ea typeface="Roboto" panose="02000000000000000000" pitchFamily="2" charset="0"/>
+              </a:rPr>
+              <a:t>[</a:t>
+            </a:r>
+            <a:r>
+              <a:rPr lang="es-MX" sz="3000" dirty="0" smtClean="0">
+                <a:solidFill>
+                  <a:schemeClr val="bg1">
+                    <a:lumMod val="85000"/>
+                  </a:schemeClr>
+                </a:solidFill>
+                <a:latin typeface="Roboto" panose="02000000000000000000" pitchFamily="2" charset="0"/>
+                <a:ea typeface="Roboto" panose="02000000000000000000" pitchFamily="2" charset="0"/>
+              </a:rPr>
+              <a:t> </a:t>
+            </a:r>
+            <a:r>
+              <a:rPr lang="es-MX" sz="3000" dirty="0" err="1" smtClean="0">
+                <a:solidFill>
+                  <a:schemeClr val="bg1">
+                    <a:lumMod val="85000"/>
+                  </a:schemeClr>
+                </a:solidFill>
+                <a:latin typeface="Roboto" panose="02000000000000000000" pitchFamily="2" charset="0"/>
+                <a:ea typeface="Roboto" panose="02000000000000000000" pitchFamily="2" charset="0"/>
+              </a:rPr>
+              <a:t>git</a:t>
+            </a:r>
+            <a:r>
+              <a:rPr lang="es-MX" sz="4000" dirty="0" smtClean="0">
+                <a:solidFill>
+                  <a:schemeClr val="bg1">
+                    <a:lumMod val="85000"/>
+                  </a:schemeClr>
+                </a:solidFill>
+                <a:latin typeface="Roboto" panose="02000000000000000000" pitchFamily="2" charset="0"/>
+                <a:ea typeface="Roboto" panose="02000000000000000000" pitchFamily="2" charset="0"/>
+              </a:rPr>
+              <a:t> </a:t>
+            </a:r>
+            <a:r>
+              <a:rPr lang="es-MX" sz="2500" dirty="0" smtClean="0">
+                <a:solidFill>
+                  <a:schemeClr val="bg1">
+                    <a:lumMod val="85000"/>
+                  </a:schemeClr>
+                </a:solidFill>
+                <a:latin typeface="Roboto" panose="02000000000000000000" pitchFamily="2" charset="0"/>
+                <a:ea typeface="Roboto" panose="02000000000000000000" pitchFamily="2" charset="0"/>
+              </a:rPr>
+              <a:t>]</a:t>
+            </a:r>
+            <a:r>
+              <a:rPr lang="es-MX" sz="4000" dirty="0" smtClean="0">
+                <a:solidFill>
+                  <a:schemeClr val="bg1">
+                    <a:lumMod val="85000"/>
+                  </a:schemeClr>
+                </a:solidFill>
+                <a:latin typeface="Roboto" panose="02000000000000000000" pitchFamily="2" charset="0"/>
+                <a:ea typeface="Roboto" panose="02000000000000000000" pitchFamily="2" charset="0"/>
+              </a:rPr>
+              <a:t> </a:t>
+            </a:r>
+            <a:endParaRPr lang="es-MX" sz="4000" dirty="0">
+              <a:solidFill>
+                <a:schemeClr val="bg1">
+                  <a:lumMod val="85000"/>
+                </a:schemeClr>
+              </a:solidFill>
+              <a:latin typeface="Roboto" panose="02000000000000000000" pitchFamily="2" charset="0"/>
+              <a:ea typeface="Roboto" panose="02000000000000000000" pitchFamily="2" charset="0"/>
+            </a:endParaRPr>
+          </a:p>
+        </p:txBody>
+      </p:sp>
+      <p:sp>
+        <p:nvSpPr>
+          <p:cNvPr id="3" name="Marcador de contenido 2"/>
+          <p:cNvSpPr>
+            <a:spLocks noGrp="1"/>
+          </p:cNvSpPr>
+          <p:nvPr>
+            <p:ph idx="1"/>
+          </p:nvPr>
+        </p:nvSpPr>
+        <p:spPr>
+          <a:xfrm>
+            <a:off x="838200" y="1895690"/>
+            <a:ext cx="10515600" cy="2190321"/>
+          </a:xfrm>
+        </p:spPr>
+        <p:txBody>
+          <a:bodyPr>
+            <a:noAutofit/>
+          </a:bodyPr>
+          <a:lstStyle/>
+          <a:p>
+            <a:pPr marL="0" indent="0">
+              <a:buNone/>
+            </a:pPr>
+            <a:r>
+              <a:rPr lang="es-MX" sz="2200" dirty="0" smtClean="0">
+                <a:solidFill>
+                  <a:schemeClr val="bg1">
+                    <a:lumMod val="75000"/>
+                  </a:schemeClr>
+                </a:solidFill>
+                <a:latin typeface="Roboto" panose="02000000000000000000" pitchFamily="2" charset="0"/>
+                <a:ea typeface="Roboto" panose="02000000000000000000" pitchFamily="2" charset="0"/>
+              </a:rPr>
+              <a:t>Copiar llave</a:t>
+            </a:r>
+            <a:endParaRPr lang="es-MX" sz="2200" dirty="0" smtClean="0">
+              <a:solidFill>
+                <a:schemeClr val="bg1">
+                  <a:lumMod val="75000"/>
+                </a:schemeClr>
+              </a:solidFill>
+              <a:latin typeface="Roboto" panose="02000000000000000000" pitchFamily="2" charset="0"/>
+              <a:ea typeface="Roboto" panose="02000000000000000000" pitchFamily="2" charset="0"/>
+            </a:endParaRPr>
+          </a:p>
+          <a:p>
+            <a:pPr marL="0" indent="0">
+              <a:buNone/>
+            </a:pPr>
+            <a:r>
+              <a:rPr lang="es-MX" sz="2400" u="sng" dirty="0">
+                <a:solidFill>
+                  <a:schemeClr val="bg1">
+                    <a:lumMod val="50000"/>
+                  </a:schemeClr>
+                </a:solidFill>
+                <a:latin typeface="Roboto" panose="02000000000000000000" pitchFamily="2" charset="0"/>
+                <a:ea typeface="Roboto" panose="02000000000000000000" pitchFamily="2" charset="0"/>
+              </a:rPr>
+              <a:t>c</a:t>
+            </a:r>
+            <a:r>
+              <a:rPr lang="es-MX" sz="2400" u="sng" dirty="0" smtClean="0">
+                <a:solidFill>
+                  <a:schemeClr val="bg1">
+                    <a:lumMod val="50000"/>
+                  </a:schemeClr>
+                </a:solidFill>
+                <a:latin typeface="Roboto" panose="02000000000000000000" pitchFamily="2" charset="0"/>
+                <a:ea typeface="Roboto" panose="02000000000000000000" pitchFamily="2" charset="0"/>
+              </a:rPr>
+              <a:t>lip</a:t>
+            </a:r>
+            <a:r>
+              <a:rPr lang="es-MX" sz="2400" dirty="0" smtClean="0">
+                <a:solidFill>
+                  <a:schemeClr val="bg1">
+                    <a:lumMod val="50000"/>
+                  </a:schemeClr>
+                </a:solidFill>
+                <a:latin typeface="Roboto" panose="02000000000000000000" pitchFamily="2" charset="0"/>
+                <a:ea typeface="Roboto" panose="02000000000000000000" pitchFamily="2" charset="0"/>
+              </a:rPr>
+              <a:t> &lt; ~/.</a:t>
+            </a:r>
+            <a:r>
+              <a:rPr lang="es-MX" sz="2400" dirty="0" err="1" smtClean="0">
+                <a:solidFill>
+                  <a:schemeClr val="bg1">
+                    <a:lumMod val="50000"/>
+                  </a:schemeClr>
+                </a:solidFill>
+                <a:latin typeface="Roboto" panose="02000000000000000000" pitchFamily="2" charset="0"/>
+                <a:ea typeface="Roboto" panose="02000000000000000000" pitchFamily="2" charset="0"/>
+              </a:rPr>
+              <a:t>ssh</a:t>
+            </a:r>
+            <a:r>
+              <a:rPr lang="es-MX" sz="2400" dirty="0" smtClean="0">
+                <a:solidFill>
+                  <a:schemeClr val="bg1">
+                    <a:lumMod val="50000"/>
+                  </a:schemeClr>
+                </a:solidFill>
+                <a:latin typeface="Roboto" panose="02000000000000000000" pitchFamily="2" charset="0"/>
+                <a:ea typeface="Roboto" panose="02000000000000000000" pitchFamily="2" charset="0"/>
+              </a:rPr>
+              <a:t>/&lt;nombreLlave.pub&gt;</a:t>
+            </a:r>
+            <a:endParaRPr lang="es-MX" sz="2400" dirty="0" smtClean="0">
+              <a:solidFill>
+                <a:schemeClr val="bg1">
+                  <a:lumMod val="50000"/>
+                </a:schemeClr>
+              </a:solidFill>
+              <a:latin typeface="Roboto" panose="02000000000000000000" pitchFamily="2" charset="0"/>
+              <a:ea typeface="Roboto" panose="02000000000000000000" pitchFamily="2" charset="0"/>
+            </a:endParaRPr>
+          </a:p>
+          <a:p>
+            <a:pPr marL="0" indent="0">
+              <a:buNone/>
+            </a:pPr>
+            <a:endParaRPr lang="es-MX" sz="2400" dirty="0">
+              <a:solidFill>
+                <a:schemeClr val="bg1">
+                  <a:lumMod val="50000"/>
+                </a:schemeClr>
+              </a:solidFill>
+              <a:latin typeface="Roboto" panose="02000000000000000000" pitchFamily="2" charset="0"/>
+              <a:ea typeface="Roboto" panose="02000000000000000000" pitchFamily="2" charset="0"/>
+            </a:endParaRPr>
+          </a:p>
+          <a:p>
+            <a:pPr marL="0" indent="0">
+              <a:buNone/>
+            </a:pPr>
+            <a:endParaRPr lang="es-MX" sz="2500" dirty="0">
+              <a:solidFill>
+                <a:schemeClr val="bg1">
+                  <a:lumMod val="50000"/>
+                </a:schemeClr>
+              </a:solidFill>
+              <a:latin typeface="Roboto" panose="02000000000000000000" pitchFamily="2" charset="0"/>
+              <a:ea typeface="Roboto" panose="02000000000000000000" pitchFamily="2" charset="0"/>
+            </a:endParaRPr>
+          </a:p>
+        </p:txBody>
+      </p:sp>
+      <p:pic>
+        <p:nvPicPr>
+          <p:cNvPr id="6" name="Imagen 5"/>
+          <p:cNvPicPr>
+            <a:picLocks noChangeAspect="1"/>
+          </p:cNvPicPr>
+          <p:nvPr/>
+        </p:nvPicPr>
+        <p:blipFill>
+          <a:blip r:embed="rId2"/>
+          <a:stretch>
+            <a:fillRect/>
+          </a:stretch>
+        </p:blipFill>
+        <p:spPr>
+          <a:xfrm>
+            <a:off x="838200" y="3208895"/>
+            <a:ext cx="10553700" cy="3257550"/>
+          </a:xfrm>
+          <a:prstGeom prst="rect">
+            <a:avLst/>
+          </a:prstGeom>
+        </p:spPr>
+      </p:pic>
+    </p:spTree>
+    <p:extLst>
+      <p:ext uri="{BB962C8B-B14F-4D97-AF65-F5344CB8AC3E}">
+        <p14:creationId xmlns:p14="http://schemas.microsoft.com/office/powerpoint/2010/main" val="2930691735"/>
+      </p:ext>
+    </p:extLst>
+  </p:cSld>
+  <p:clrMapOvr>
+    <a:masterClrMapping/>
+  </p:clrMapOvr>
+  <p:timing>
+    <p:tnLst>
+      <p:par>
+        <p:cTn id="1" dur="indefinite" restart="never" nodeType="tmRoot"/>
+      </p:par>
+    </p:tnLst>
+  </p:timing>
+</p:sld>
+</file>
+
+<file path=ppt/slides/slide11.xml><?xml version="1.0" encoding="utf-8"?>
+<p:sld xmlns:a="http://schemas.openxmlformats.org/drawingml/2006/main" xmlns:r="http://schemas.openxmlformats.org/officeDocument/2006/relationships" xmlns:p="http://schemas.openxmlformats.org/presentationml/2006/main">
+  <p:cSld>
+    <p:spTree>
+      <p:nvGrpSpPr>
+        <p:cNvPr id="1" name=""/>
+        <p:cNvGrpSpPr/>
+        <p:nvPr/>
+      </p:nvGrpSpPr>
+      <p:grpSpPr>
+        <a:xfrm>
+          <a:off x="0" y="0"/>
+          <a:ext cx="0" cy="0"/>
+          <a:chOff x="0" y="0"/>
+          <a:chExt cx="0" cy="0"/>
+        </a:xfrm>
+      </p:grpSpPr>
+      <p:sp>
+        <p:nvSpPr>
+          <p:cNvPr id="2" name="Título 1"/>
+          <p:cNvSpPr>
+            <a:spLocks noGrp="1"/>
+          </p:cNvSpPr>
+          <p:nvPr>
+            <p:ph type="title"/>
+          </p:nvPr>
+        </p:nvSpPr>
+        <p:spPr/>
+        <p:txBody>
+          <a:bodyPr/>
+          <a:lstStyle/>
+          <a:p>
+            <a:r>
+              <a:rPr lang="es-MX" sz="5000" dirty="0" err="1" smtClean="0">
+                <a:solidFill>
+                  <a:srgbClr val="D50F2E"/>
+                </a:solidFill>
+                <a:latin typeface="Roboto Black" panose="02000000000000000000" pitchFamily="2" charset="0"/>
+                <a:ea typeface="Roboto Black" panose="02000000000000000000" pitchFamily="2" charset="0"/>
+              </a:rPr>
+              <a:t>Testing</a:t>
+            </a:r>
+            <a:r>
+              <a:rPr lang="es-MX" sz="5000" dirty="0" smtClean="0">
+                <a:solidFill>
+                  <a:srgbClr val="D50F2E"/>
+                </a:solidFill>
+                <a:latin typeface="Roboto Black" panose="02000000000000000000" pitchFamily="2" charset="0"/>
+                <a:ea typeface="Roboto Black" panose="02000000000000000000" pitchFamily="2" charset="0"/>
+              </a:rPr>
+              <a:t> </a:t>
+            </a:r>
+            <a:r>
+              <a:rPr lang="es-MX" sz="2500" dirty="0" smtClean="0">
+                <a:solidFill>
+                  <a:schemeClr val="bg1">
+                    <a:lumMod val="85000"/>
+                  </a:schemeClr>
+                </a:solidFill>
+                <a:latin typeface="Roboto" panose="02000000000000000000" pitchFamily="2" charset="0"/>
+                <a:ea typeface="Roboto" panose="02000000000000000000" pitchFamily="2" charset="0"/>
+              </a:rPr>
+              <a:t>[</a:t>
+            </a:r>
+            <a:r>
+              <a:rPr lang="es-MX" sz="3000" dirty="0" smtClean="0">
+                <a:solidFill>
+                  <a:schemeClr val="bg1">
+                    <a:lumMod val="85000"/>
+                  </a:schemeClr>
+                </a:solidFill>
+                <a:latin typeface="Roboto" panose="02000000000000000000" pitchFamily="2" charset="0"/>
+                <a:ea typeface="Roboto" panose="02000000000000000000" pitchFamily="2" charset="0"/>
+              </a:rPr>
+              <a:t> </a:t>
+            </a:r>
+            <a:r>
+              <a:rPr lang="es-MX" sz="3000" dirty="0" err="1" smtClean="0">
+                <a:solidFill>
+                  <a:schemeClr val="bg1">
+                    <a:lumMod val="85000"/>
+                  </a:schemeClr>
+                </a:solidFill>
+                <a:latin typeface="Roboto" panose="02000000000000000000" pitchFamily="2" charset="0"/>
+                <a:ea typeface="Roboto" panose="02000000000000000000" pitchFamily="2" charset="0"/>
+              </a:rPr>
+              <a:t>git</a:t>
+            </a:r>
+            <a:r>
+              <a:rPr lang="es-MX" sz="4000" dirty="0" smtClean="0">
+                <a:solidFill>
+                  <a:schemeClr val="bg1">
+                    <a:lumMod val="85000"/>
+                  </a:schemeClr>
+                </a:solidFill>
+                <a:latin typeface="Roboto" panose="02000000000000000000" pitchFamily="2" charset="0"/>
+                <a:ea typeface="Roboto" panose="02000000000000000000" pitchFamily="2" charset="0"/>
+              </a:rPr>
+              <a:t> </a:t>
+            </a:r>
+            <a:r>
+              <a:rPr lang="es-MX" sz="2500" dirty="0" smtClean="0">
+                <a:solidFill>
+                  <a:schemeClr val="bg1">
+                    <a:lumMod val="85000"/>
+                  </a:schemeClr>
+                </a:solidFill>
+                <a:latin typeface="Roboto" panose="02000000000000000000" pitchFamily="2" charset="0"/>
+                <a:ea typeface="Roboto" panose="02000000000000000000" pitchFamily="2" charset="0"/>
+              </a:rPr>
+              <a:t>]</a:t>
+            </a:r>
+            <a:r>
+              <a:rPr lang="es-MX" sz="4000" dirty="0" smtClean="0">
+                <a:solidFill>
+                  <a:schemeClr val="bg1">
+                    <a:lumMod val="85000"/>
+                  </a:schemeClr>
+                </a:solidFill>
+                <a:latin typeface="Roboto" panose="02000000000000000000" pitchFamily="2" charset="0"/>
+                <a:ea typeface="Roboto" panose="02000000000000000000" pitchFamily="2" charset="0"/>
+              </a:rPr>
+              <a:t> </a:t>
+            </a:r>
+            <a:endParaRPr lang="es-MX" sz="4000" dirty="0">
+              <a:solidFill>
+                <a:schemeClr val="bg1">
+                  <a:lumMod val="85000"/>
+                </a:schemeClr>
+              </a:solidFill>
+              <a:latin typeface="Roboto" panose="02000000000000000000" pitchFamily="2" charset="0"/>
+              <a:ea typeface="Roboto" panose="02000000000000000000" pitchFamily="2" charset="0"/>
+            </a:endParaRPr>
+          </a:p>
+        </p:txBody>
+      </p:sp>
+      <p:sp>
+        <p:nvSpPr>
+          <p:cNvPr id="3" name="Marcador de contenido 2"/>
+          <p:cNvSpPr>
+            <a:spLocks noGrp="1"/>
+          </p:cNvSpPr>
+          <p:nvPr>
+            <p:ph idx="1"/>
+          </p:nvPr>
+        </p:nvSpPr>
+        <p:spPr>
+          <a:xfrm>
+            <a:off x="838200" y="1895690"/>
+            <a:ext cx="10515600" cy="2190321"/>
+          </a:xfrm>
+        </p:spPr>
+        <p:txBody>
+          <a:bodyPr>
+            <a:noAutofit/>
+          </a:bodyPr>
+          <a:lstStyle/>
+          <a:p>
+            <a:pPr marL="0" indent="0">
+              <a:buNone/>
+            </a:pPr>
+            <a:r>
+              <a:rPr lang="es-MX" sz="2200" dirty="0" smtClean="0">
+                <a:solidFill>
+                  <a:schemeClr val="bg1">
+                    <a:lumMod val="75000"/>
+                  </a:schemeClr>
+                </a:solidFill>
+                <a:latin typeface="Roboto" panose="02000000000000000000" pitchFamily="2" charset="0"/>
+                <a:ea typeface="Roboto" panose="02000000000000000000" pitchFamily="2" charset="0"/>
+              </a:rPr>
+              <a:t>Probando conexión</a:t>
+            </a:r>
+          </a:p>
+          <a:p>
+            <a:pPr marL="0" indent="0">
+              <a:buNone/>
+            </a:pPr>
+            <a:r>
+              <a:rPr lang="es-MX" sz="2400" u="sng" dirty="0" err="1">
+                <a:solidFill>
+                  <a:schemeClr val="bg1">
+                    <a:lumMod val="50000"/>
+                  </a:schemeClr>
+                </a:solidFill>
+                <a:latin typeface="Roboto" panose="02000000000000000000" pitchFamily="2" charset="0"/>
+                <a:ea typeface="Roboto" panose="02000000000000000000" pitchFamily="2" charset="0"/>
+              </a:rPr>
+              <a:t>s</a:t>
+            </a:r>
+            <a:r>
+              <a:rPr lang="es-MX" sz="2400" u="sng" dirty="0" err="1" smtClean="0">
+                <a:solidFill>
+                  <a:schemeClr val="bg1">
+                    <a:lumMod val="50000"/>
+                  </a:schemeClr>
+                </a:solidFill>
+                <a:latin typeface="Roboto" panose="02000000000000000000" pitchFamily="2" charset="0"/>
+                <a:ea typeface="Roboto" panose="02000000000000000000" pitchFamily="2" charset="0"/>
+              </a:rPr>
+              <a:t>sh</a:t>
+            </a:r>
+            <a:r>
+              <a:rPr lang="es-MX" sz="2400" u="sng" dirty="0" smtClean="0">
+                <a:solidFill>
+                  <a:schemeClr val="bg1">
+                    <a:lumMod val="50000"/>
+                  </a:schemeClr>
+                </a:solidFill>
+                <a:latin typeface="Roboto" panose="02000000000000000000" pitchFamily="2" charset="0"/>
+                <a:ea typeface="Roboto" panose="02000000000000000000" pitchFamily="2" charset="0"/>
+              </a:rPr>
+              <a:t> –T git@github.com</a:t>
+            </a:r>
+            <a:endParaRPr lang="es-MX" sz="2400" dirty="0" smtClean="0">
+              <a:solidFill>
+                <a:schemeClr val="bg1">
+                  <a:lumMod val="50000"/>
+                </a:schemeClr>
+              </a:solidFill>
+              <a:latin typeface="Roboto" panose="02000000000000000000" pitchFamily="2" charset="0"/>
+              <a:ea typeface="Roboto" panose="02000000000000000000" pitchFamily="2" charset="0"/>
+            </a:endParaRPr>
+          </a:p>
+          <a:p>
+            <a:pPr marL="0" indent="0">
+              <a:buNone/>
+            </a:pPr>
+            <a:endParaRPr lang="es-MX" sz="2400" dirty="0" smtClean="0">
+              <a:solidFill>
+                <a:schemeClr val="bg1">
+                  <a:lumMod val="50000"/>
+                </a:schemeClr>
+              </a:solidFill>
+              <a:latin typeface="Roboto" panose="02000000000000000000" pitchFamily="2" charset="0"/>
+              <a:ea typeface="Roboto" panose="02000000000000000000" pitchFamily="2" charset="0"/>
+            </a:endParaRPr>
+          </a:p>
+          <a:p>
+            <a:pPr marL="0" indent="0">
+              <a:buNone/>
+            </a:pPr>
+            <a:endParaRPr lang="es-MX" sz="2500" dirty="0">
+              <a:solidFill>
+                <a:schemeClr val="bg1">
+                  <a:lumMod val="50000"/>
+                </a:schemeClr>
+              </a:solidFill>
+              <a:latin typeface="Roboto" panose="02000000000000000000" pitchFamily="2" charset="0"/>
+              <a:ea typeface="Roboto" panose="02000000000000000000" pitchFamily="2" charset="0"/>
+            </a:endParaRPr>
+          </a:p>
+        </p:txBody>
+      </p:sp>
+      <p:pic>
+        <p:nvPicPr>
+          <p:cNvPr id="4" name="Imagen 3"/>
+          <p:cNvPicPr>
+            <a:picLocks noChangeAspect="1"/>
+          </p:cNvPicPr>
+          <p:nvPr/>
+        </p:nvPicPr>
+        <p:blipFill>
+          <a:blip r:embed="rId2">
+            <a:extLst>
+              <a:ext uri="{28A0092B-C50C-407E-A947-70E740481C1C}">
+                <a14:useLocalDpi xmlns:a14="http://schemas.microsoft.com/office/drawing/2010/main" val="0"/>
+              </a:ext>
+            </a:extLst>
+          </a:blip>
+          <a:stretch>
+            <a:fillRect/>
+          </a:stretch>
+        </p:blipFill>
+        <p:spPr>
+          <a:xfrm>
+            <a:off x="4000500" y="3235926"/>
+            <a:ext cx="4191000" cy="2857500"/>
+          </a:xfrm>
+          <a:prstGeom prst="rect">
+            <a:avLst/>
+          </a:prstGeom>
+        </p:spPr>
+      </p:pic>
+    </p:spTree>
+    <p:extLst>
+      <p:ext uri="{BB962C8B-B14F-4D97-AF65-F5344CB8AC3E}">
+        <p14:creationId xmlns:p14="http://schemas.microsoft.com/office/powerpoint/2010/main" val="3360139183"/>
+      </p:ext>
+    </p:extLst>
+  </p:cSld>
+  <p:clrMapOvr>
+    <a:masterClrMapping/>
+  </p:clrMapOvr>
+  <p:timing>
+    <p:tnLst>
+      <p:par>
+        <p:cTn id="1" dur="indefinite" restart="never" nodeType="tmRoot"/>
+      </p:par>
+    </p:tnLst>
+  </p:timing>
+</p:sld>
+</file>
+
+<file path=ppt/slides/slide12.xml><?xml version="1.0" encoding="utf-8"?>
+<p:sld xmlns:a="http://schemas.openxmlformats.org/drawingml/2006/main" xmlns:r="http://schemas.openxmlformats.org/officeDocument/2006/relationships" xmlns:p="http://schemas.openxmlformats.org/presentationml/2006/main">
+  <p:cSld>
+    <p:spTree>
+      <p:nvGrpSpPr>
+        <p:cNvPr id="1" name=""/>
+        <p:cNvGrpSpPr/>
+        <p:nvPr/>
+      </p:nvGrpSpPr>
+      <p:grpSpPr>
+        <a:xfrm>
+          <a:off x="0" y="0"/>
+          <a:ext cx="0" cy="0"/>
+          <a:chOff x="0" y="0"/>
+          <a:chExt cx="0" cy="0"/>
+        </a:xfrm>
+      </p:grpSpPr>
+      <p:sp>
+        <p:nvSpPr>
+          <p:cNvPr id="3" name="Marcador de contenido 2"/>
+          <p:cNvSpPr>
+            <a:spLocks noGrp="1"/>
+          </p:cNvSpPr>
+          <p:nvPr>
+            <p:ph idx="1"/>
+          </p:nvPr>
+        </p:nvSpPr>
+        <p:spPr>
+          <a:xfrm>
+            <a:off x="862913" y="2333840"/>
+            <a:ext cx="10515600" cy="2190321"/>
+          </a:xfrm>
+        </p:spPr>
+        <p:txBody>
+          <a:bodyPr>
+            <a:noAutofit/>
+          </a:bodyPr>
+          <a:lstStyle/>
+          <a:p>
+            <a:pPr marL="0" indent="0">
+              <a:buNone/>
+            </a:pPr>
+            <a:r>
+              <a:rPr lang="es-MX" sz="2200" dirty="0">
+                <a:solidFill>
+                  <a:schemeClr val="bg1">
+                    <a:lumMod val="75000"/>
+                  </a:schemeClr>
+                </a:solidFill>
+                <a:latin typeface="Roboto" panose="02000000000000000000" pitchFamily="2" charset="0"/>
+                <a:ea typeface="Roboto" panose="02000000000000000000" pitchFamily="2" charset="0"/>
+              </a:rPr>
+              <a:t>Iniciar </a:t>
+            </a:r>
+            <a:r>
+              <a:rPr lang="es-MX" sz="2200" dirty="0" err="1">
+                <a:solidFill>
+                  <a:schemeClr val="bg1">
+                    <a:lumMod val="75000"/>
+                  </a:schemeClr>
+                </a:solidFill>
+                <a:latin typeface="Roboto" panose="02000000000000000000" pitchFamily="2" charset="0"/>
+                <a:ea typeface="Roboto" panose="02000000000000000000" pitchFamily="2" charset="0"/>
+              </a:rPr>
+              <a:t>git</a:t>
+            </a:r>
+            <a:r>
+              <a:rPr lang="es-MX" sz="2200" dirty="0">
+                <a:solidFill>
+                  <a:schemeClr val="bg1">
+                    <a:lumMod val="75000"/>
+                  </a:schemeClr>
+                </a:solidFill>
+                <a:latin typeface="Roboto" panose="02000000000000000000" pitchFamily="2" charset="0"/>
+                <a:ea typeface="Roboto" panose="02000000000000000000" pitchFamily="2" charset="0"/>
+              </a:rPr>
+              <a:t> en folder</a:t>
+            </a:r>
+          </a:p>
+          <a:p>
+            <a:pPr marL="0" indent="0">
+              <a:buNone/>
+            </a:pPr>
+            <a:r>
+              <a:rPr lang="es-MX" sz="2400" dirty="0" err="1">
+                <a:solidFill>
+                  <a:schemeClr val="bg1">
+                    <a:lumMod val="50000"/>
+                  </a:schemeClr>
+                </a:solidFill>
+                <a:latin typeface="Roboto" panose="02000000000000000000" pitchFamily="2" charset="0"/>
+                <a:ea typeface="Roboto" panose="02000000000000000000" pitchFamily="2" charset="0"/>
+              </a:rPr>
+              <a:t>git</a:t>
+            </a:r>
+            <a:r>
+              <a:rPr lang="es-MX" sz="2400" dirty="0">
+                <a:solidFill>
+                  <a:schemeClr val="bg1">
+                    <a:lumMod val="50000"/>
+                  </a:schemeClr>
+                </a:solidFill>
+                <a:latin typeface="Roboto" panose="02000000000000000000" pitchFamily="2" charset="0"/>
+                <a:ea typeface="Roboto" panose="02000000000000000000" pitchFamily="2" charset="0"/>
+              </a:rPr>
+              <a:t> </a:t>
+            </a:r>
+            <a:r>
+              <a:rPr lang="es-MX" sz="2400" dirty="0" err="1">
+                <a:solidFill>
+                  <a:schemeClr val="bg1">
+                    <a:lumMod val="50000"/>
+                  </a:schemeClr>
+                </a:solidFill>
+                <a:latin typeface="Roboto" panose="02000000000000000000" pitchFamily="2" charset="0"/>
+                <a:ea typeface="Roboto" panose="02000000000000000000" pitchFamily="2" charset="0"/>
+              </a:rPr>
+              <a:t>init</a:t>
+            </a:r>
+            <a:r>
+              <a:rPr lang="es-MX" sz="2400" dirty="0">
+                <a:solidFill>
+                  <a:schemeClr val="bg1">
+                    <a:lumMod val="50000"/>
+                  </a:schemeClr>
+                </a:solidFill>
+                <a:latin typeface="Roboto" panose="02000000000000000000" pitchFamily="2" charset="0"/>
+                <a:ea typeface="Roboto" panose="02000000000000000000" pitchFamily="2" charset="0"/>
+              </a:rPr>
+              <a:t> </a:t>
+            </a:r>
+            <a:r>
+              <a:rPr lang="es-MX" sz="2000" dirty="0">
+                <a:solidFill>
+                  <a:schemeClr val="bg1">
+                    <a:lumMod val="50000"/>
+                  </a:schemeClr>
+                </a:solidFill>
+                <a:latin typeface="Roboto" panose="02000000000000000000" pitchFamily="2" charset="0"/>
+                <a:ea typeface="Roboto" panose="02000000000000000000" pitchFamily="2" charset="0"/>
+              </a:rPr>
+              <a:t>[</a:t>
+            </a:r>
+            <a:r>
+              <a:rPr lang="es-MX" sz="2400" dirty="0">
+                <a:solidFill>
+                  <a:schemeClr val="bg1">
+                    <a:lumMod val="50000"/>
+                  </a:schemeClr>
+                </a:solidFill>
+                <a:latin typeface="Roboto" panose="02000000000000000000" pitchFamily="2" charset="0"/>
+                <a:ea typeface="Roboto" panose="02000000000000000000" pitchFamily="2" charset="0"/>
+              </a:rPr>
+              <a:t>nombre repo</a:t>
+            </a:r>
+            <a:r>
+              <a:rPr lang="es-MX" sz="2000" dirty="0" smtClean="0">
+                <a:solidFill>
+                  <a:schemeClr val="bg1">
+                    <a:lumMod val="50000"/>
+                  </a:schemeClr>
+                </a:solidFill>
+                <a:latin typeface="Roboto" panose="02000000000000000000" pitchFamily="2" charset="0"/>
+                <a:ea typeface="Roboto" panose="02000000000000000000" pitchFamily="2" charset="0"/>
+              </a:rPr>
+              <a:t>]</a:t>
+            </a:r>
+          </a:p>
+          <a:p>
+            <a:pPr marL="0" indent="0">
+              <a:buNone/>
+            </a:pPr>
+            <a:endParaRPr lang="es-MX" sz="2000" dirty="0">
+              <a:solidFill>
+                <a:schemeClr val="bg1">
+                  <a:lumMod val="50000"/>
+                </a:schemeClr>
+              </a:solidFill>
+              <a:latin typeface="Roboto" panose="02000000000000000000" pitchFamily="2" charset="0"/>
+              <a:ea typeface="Roboto" panose="02000000000000000000" pitchFamily="2" charset="0"/>
+            </a:endParaRPr>
+          </a:p>
+          <a:p>
+            <a:pPr marL="0" indent="0">
+              <a:buNone/>
+            </a:pPr>
+            <a:r>
+              <a:rPr lang="es-MX" sz="2200" dirty="0">
+                <a:solidFill>
+                  <a:schemeClr val="bg1">
+                    <a:lumMod val="75000"/>
+                  </a:schemeClr>
+                </a:solidFill>
+                <a:latin typeface="Roboto" panose="02000000000000000000" pitchFamily="2" charset="0"/>
+                <a:ea typeface="Roboto" panose="02000000000000000000" pitchFamily="2" charset="0"/>
+              </a:rPr>
+              <a:t>Agregar los archivos existentes</a:t>
+            </a:r>
+          </a:p>
+          <a:p>
+            <a:pPr marL="0" indent="0">
+              <a:buNone/>
+            </a:pPr>
+            <a:r>
+              <a:rPr lang="es-MX" sz="2400" dirty="0" err="1" smtClean="0">
+                <a:solidFill>
+                  <a:schemeClr val="bg1">
+                    <a:lumMod val="50000"/>
+                  </a:schemeClr>
+                </a:solidFill>
+                <a:latin typeface="Roboto" panose="02000000000000000000" pitchFamily="2" charset="0"/>
+                <a:ea typeface="Roboto" panose="02000000000000000000" pitchFamily="2" charset="0"/>
+              </a:rPr>
+              <a:t>git</a:t>
+            </a:r>
+            <a:r>
+              <a:rPr lang="es-MX" sz="2400" dirty="0" smtClean="0">
+                <a:solidFill>
+                  <a:schemeClr val="bg1">
+                    <a:lumMod val="50000"/>
+                  </a:schemeClr>
+                </a:solidFill>
+                <a:latin typeface="Roboto" panose="02000000000000000000" pitchFamily="2" charset="0"/>
+                <a:ea typeface="Roboto" panose="02000000000000000000" pitchFamily="2" charset="0"/>
+              </a:rPr>
+              <a:t> </a:t>
+            </a:r>
+            <a:r>
+              <a:rPr lang="es-MX" sz="2400" dirty="0" err="1">
+                <a:solidFill>
+                  <a:schemeClr val="bg1">
+                    <a:lumMod val="50000"/>
+                  </a:schemeClr>
+                </a:solidFill>
+                <a:latin typeface="Roboto" panose="02000000000000000000" pitchFamily="2" charset="0"/>
+                <a:ea typeface="Roboto" panose="02000000000000000000" pitchFamily="2" charset="0"/>
+              </a:rPr>
+              <a:t>add</a:t>
+            </a:r>
+            <a:r>
+              <a:rPr lang="es-MX" sz="2400" dirty="0">
+                <a:solidFill>
+                  <a:schemeClr val="bg1">
+                    <a:lumMod val="50000"/>
+                  </a:schemeClr>
+                </a:solidFill>
+                <a:latin typeface="Roboto" panose="02000000000000000000" pitchFamily="2" charset="0"/>
+                <a:ea typeface="Roboto" panose="02000000000000000000" pitchFamily="2" charset="0"/>
+              </a:rPr>
+              <a:t> </a:t>
+            </a:r>
+            <a:r>
+              <a:rPr lang="es-MX" sz="2400" dirty="0" smtClean="0">
+                <a:solidFill>
+                  <a:schemeClr val="bg1">
+                    <a:lumMod val="50000"/>
+                  </a:schemeClr>
+                </a:solidFill>
+                <a:latin typeface="Roboto" panose="02000000000000000000" pitchFamily="2" charset="0"/>
+                <a:ea typeface="Roboto" panose="02000000000000000000" pitchFamily="2" charset="0"/>
+              </a:rPr>
+              <a:t>. </a:t>
+            </a:r>
+            <a:r>
+              <a:rPr lang="es-MX" sz="2400" dirty="0">
+                <a:solidFill>
+                  <a:schemeClr val="bg1">
+                    <a:lumMod val="50000"/>
+                  </a:schemeClr>
+                </a:solidFill>
+                <a:latin typeface="Roboto" panose="02000000000000000000" pitchFamily="2" charset="0"/>
+                <a:ea typeface="Roboto" panose="02000000000000000000" pitchFamily="2" charset="0"/>
+              </a:rPr>
+              <a:t>	</a:t>
+            </a:r>
+            <a:r>
+              <a:rPr lang="es-MX" sz="2400" dirty="0" err="1">
+                <a:solidFill>
+                  <a:schemeClr val="bg1">
+                    <a:lumMod val="50000"/>
+                  </a:schemeClr>
+                </a:solidFill>
+                <a:latin typeface="Roboto" panose="02000000000000000000" pitchFamily="2" charset="0"/>
+                <a:ea typeface="Roboto" panose="02000000000000000000" pitchFamily="2" charset="0"/>
+              </a:rPr>
+              <a:t>g</a:t>
+            </a:r>
+            <a:r>
+              <a:rPr lang="es-MX" sz="2400" dirty="0" err="1" smtClean="0">
+                <a:solidFill>
+                  <a:schemeClr val="bg1">
+                    <a:lumMod val="50000"/>
+                  </a:schemeClr>
+                </a:solidFill>
+                <a:latin typeface="Roboto" panose="02000000000000000000" pitchFamily="2" charset="0"/>
+                <a:ea typeface="Roboto" panose="02000000000000000000" pitchFamily="2" charset="0"/>
+              </a:rPr>
+              <a:t>it</a:t>
+            </a:r>
+            <a:r>
+              <a:rPr lang="es-MX" sz="2400" dirty="0" smtClean="0">
+                <a:solidFill>
+                  <a:schemeClr val="bg1">
+                    <a:lumMod val="50000"/>
+                  </a:schemeClr>
+                </a:solidFill>
+                <a:latin typeface="Roboto" panose="02000000000000000000" pitchFamily="2" charset="0"/>
+                <a:ea typeface="Roboto" panose="02000000000000000000" pitchFamily="2" charset="0"/>
+              </a:rPr>
+              <a:t> </a:t>
+            </a:r>
+            <a:r>
+              <a:rPr lang="es-MX" sz="2400" dirty="0" err="1" smtClean="0">
+                <a:solidFill>
+                  <a:schemeClr val="bg1">
+                    <a:lumMod val="50000"/>
+                  </a:schemeClr>
+                </a:solidFill>
+                <a:latin typeface="Roboto" panose="02000000000000000000" pitchFamily="2" charset="0"/>
+                <a:ea typeface="Roboto" panose="02000000000000000000" pitchFamily="2" charset="0"/>
+              </a:rPr>
+              <a:t>add</a:t>
+            </a:r>
+            <a:r>
+              <a:rPr lang="es-MX" sz="2400" dirty="0" smtClean="0">
+                <a:solidFill>
+                  <a:schemeClr val="bg1">
+                    <a:lumMod val="50000"/>
+                  </a:schemeClr>
+                </a:solidFill>
+                <a:latin typeface="Roboto" panose="02000000000000000000" pitchFamily="2" charset="0"/>
+                <a:ea typeface="Roboto" panose="02000000000000000000" pitchFamily="2" charset="0"/>
+              </a:rPr>
+              <a:t> --</a:t>
+            </a:r>
+            <a:r>
+              <a:rPr lang="es-MX" sz="2400" dirty="0" err="1" smtClean="0">
+                <a:solidFill>
+                  <a:schemeClr val="bg1">
+                    <a:lumMod val="50000"/>
+                  </a:schemeClr>
+                </a:solidFill>
+                <a:latin typeface="Roboto" panose="02000000000000000000" pitchFamily="2" charset="0"/>
+                <a:ea typeface="Roboto" panose="02000000000000000000" pitchFamily="2" charset="0"/>
+              </a:rPr>
+              <a:t>all</a:t>
+            </a:r>
+            <a:r>
+              <a:rPr lang="es-MX" sz="2400" dirty="0">
+                <a:solidFill>
+                  <a:schemeClr val="bg1">
+                    <a:lumMod val="50000"/>
+                  </a:schemeClr>
+                </a:solidFill>
+                <a:latin typeface="Roboto" panose="02000000000000000000" pitchFamily="2" charset="0"/>
+                <a:ea typeface="Roboto" panose="02000000000000000000" pitchFamily="2" charset="0"/>
+              </a:rPr>
+              <a:t>	</a:t>
+            </a:r>
+            <a:r>
+              <a:rPr lang="es-MX" sz="2400" dirty="0" smtClean="0">
+                <a:solidFill>
+                  <a:schemeClr val="bg1">
+                    <a:lumMod val="50000"/>
+                  </a:schemeClr>
+                </a:solidFill>
+                <a:latin typeface="Roboto" panose="02000000000000000000" pitchFamily="2" charset="0"/>
+                <a:ea typeface="Roboto" panose="02000000000000000000" pitchFamily="2" charset="0"/>
+              </a:rPr>
+              <a:t>	</a:t>
+            </a:r>
+            <a:r>
+              <a:rPr lang="es-MX" sz="2400" dirty="0" err="1" smtClean="0">
+                <a:solidFill>
+                  <a:schemeClr val="bg1">
+                    <a:lumMod val="50000"/>
+                  </a:schemeClr>
+                </a:solidFill>
+                <a:latin typeface="Roboto" panose="02000000000000000000" pitchFamily="2" charset="0"/>
+                <a:ea typeface="Roboto" panose="02000000000000000000" pitchFamily="2" charset="0"/>
+              </a:rPr>
+              <a:t>git</a:t>
+            </a:r>
+            <a:r>
+              <a:rPr lang="es-MX" sz="2400" dirty="0" smtClean="0">
+                <a:solidFill>
+                  <a:schemeClr val="bg1">
+                    <a:lumMod val="50000"/>
+                  </a:schemeClr>
+                </a:solidFill>
+                <a:latin typeface="Roboto" panose="02000000000000000000" pitchFamily="2" charset="0"/>
+                <a:ea typeface="Roboto" panose="02000000000000000000" pitchFamily="2" charset="0"/>
+              </a:rPr>
+              <a:t> </a:t>
+            </a:r>
+            <a:r>
+              <a:rPr lang="es-MX" sz="2400" dirty="0" err="1" smtClean="0">
+                <a:solidFill>
+                  <a:schemeClr val="bg1">
+                    <a:lumMod val="50000"/>
+                  </a:schemeClr>
+                </a:solidFill>
+                <a:latin typeface="Roboto" panose="02000000000000000000" pitchFamily="2" charset="0"/>
+                <a:ea typeface="Roboto" panose="02000000000000000000" pitchFamily="2" charset="0"/>
+              </a:rPr>
+              <a:t>add</a:t>
+            </a:r>
+            <a:r>
+              <a:rPr lang="es-MX" sz="2400" dirty="0">
+                <a:solidFill>
+                  <a:schemeClr val="bg1">
+                    <a:lumMod val="50000"/>
+                  </a:schemeClr>
+                </a:solidFill>
+                <a:latin typeface="Roboto" panose="02000000000000000000" pitchFamily="2" charset="0"/>
+                <a:ea typeface="Roboto" panose="02000000000000000000" pitchFamily="2" charset="0"/>
+              </a:rPr>
+              <a:t> </a:t>
+            </a:r>
+            <a:r>
+              <a:rPr lang="es-MX" sz="2400" dirty="0" smtClean="0">
+                <a:solidFill>
+                  <a:schemeClr val="bg1">
+                    <a:lumMod val="50000"/>
+                  </a:schemeClr>
+                </a:solidFill>
+                <a:latin typeface="Roboto" panose="02000000000000000000" pitchFamily="2" charset="0"/>
+                <a:ea typeface="Roboto" panose="02000000000000000000" pitchFamily="2" charset="0"/>
+              </a:rPr>
+              <a:t>--u</a:t>
+            </a:r>
+          </a:p>
+          <a:p>
+            <a:pPr marL="0" indent="0">
+              <a:buNone/>
+            </a:pPr>
+            <a:endParaRPr lang="es-MX" sz="2400" dirty="0" smtClean="0">
+              <a:solidFill>
+                <a:schemeClr val="bg1">
+                  <a:lumMod val="50000"/>
+                </a:schemeClr>
+              </a:solidFill>
+              <a:latin typeface="Roboto" panose="02000000000000000000" pitchFamily="2" charset="0"/>
+              <a:ea typeface="Roboto" panose="02000000000000000000" pitchFamily="2" charset="0"/>
+            </a:endParaRPr>
+          </a:p>
+          <a:p>
+            <a:pPr marL="0" indent="0">
+              <a:buNone/>
+            </a:pPr>
+            <a:endParaRPr lang="es-MX" sz="2400" dirty="0">
+              <a:solidFill>
+                <a:schemeClr val="bg1">
+                  <a:lumMod val="50000"/>
+                </a:schemeClr>
+              </a:solidFill>
+              <a:latin typeface="Roboto" panose="02000000000000000000" pitchFamily="2" charset="0"/>
+              <a:ea typeface="Roboto" panose="02000000000000000000" pitchFamily="2" charset="0"/>
+            </a:endParaRPr>
+          </a:p>
+          <a:p>
+            <a:pPr marL="0" indent="0">
+              <a:buNone/>
+            </a:pPr>
+            <a:endParaRPr lang="es-MX" dirty="0">
+              <a:solidFill>
+                <a:schemeClr val="bg1">
+                  <a:lumMod val="75000"/>
+                </a:schemeClr>
+              </a:solidFill>
+              <a:latin typeface="Roboto" panose="02000000000000000000" pitchFamily="2" charset="0"/>
+              <a:ea typeface="Roboto" panose="02000000000000000000" pitchFamily="2" charset="0"/>
+            </a:endParaRPr>
+          </a:p>
+          <a:p>
+            <a:pPr marL="0" indent="0">
+              <a:buNone/>
+            </a:pPr>
+            <a:endParaRPr lang="es-MX" dirty="0"/>
+          </a:p>
+        </p:txBody>
+      </p:sp>
+      <p:sp>
+        <p:nvSpPr>
+          <p:cNvPr id="4" name="Título 1"/>
+          <p:cNvSpPr txBox="1">
+            <a:spLocks/>
+          </p:cNvSpPr>
+          <p:nvPr/>
+        </p:nvSpPr>
+        <p:spPr>
+          <a:xfrm>
+            <a:off x="862913" y="393956"/>
+            <a:ext cx="10515600" cy="1325563"/>
+          </a:xfrm>
+          <a:prstGeom prst="rect">
+            <a:avLst/>
+          </a:prstGeom>
+        </p:spPr>
+        <p:txBody>
+          <a:bodyPr vert="horz" lIns="91440" tIns="45720" rIns="91440" bIns="45720" rtlCol="0" anchor="ctr">
+            <a:normAutofit/>
+          </a:bodyPr>
+          <a:lstStyle>
+            <a:lvl1pPr algn="l" defTabSz="914400" rtl="0" eaLnBrk="1" latinLnBrk="0" hangingPunct="1">
+              <a:lnSpc>
+                <a:spcPct val="90000"/>
+              </a:lnSpc>
+              <a:spcBef>
+                <a:spcPct val="0"/>
+              </a:spcBef>
+              <a:buNone/>
+              <a:defRPr sz="4400" kern="1200">
+                <a:solidFill>
+                  <a:schemeClr val="tx1"/>
+                </a:solidFill>
+                <a:latin typeface="+mj-lt"/>
+                <a:ea typeface="+mj-ea"/>
+                <a:cs typeface="+mj-cs"/>
+              </a:defRPr>
+            </a:lvl1pPr>
+          </a:lstStyle>
+          <a:p>
+            <a:r>
+              <a:rPr lang="es-MX" sz="5000" dirty="0">
+                <a:solidFill>
+                  <a:srgbClr val="D50F2E"/>
+                </a:solidFill>
+                <a:latin typeface="Roboto Black" panose="02000000000000000000" pitchFamily="2" charset="0"/>
+                <a:ea typeface="Roboto Black" panose="02000000000000000000" pitchFamily="2" charset="0"/>
+              </a:rPr>
+              <a:t>Crear repositorio </a:t>
+            </a:r>
+            <a:r>
+              <a:rPr lang="es-MX" sz="2500" dirty="0">
+                <a:solidFill>
+                  <a:schemeClr val="bg1">
+                    <a:lumMod val="85000"/>
+                  </a:schemeClr>
+                </a:solidFill>
+                <a:latin typeface="Roboto" panose="02000000000000000000" pitchFamily="2" charset="0"/>
+                <a:ea typeface="Roboto" panose="02000000000000000000" pitchFamily="2" charset="0"/>
+              </a:rPr>
+              <a:t>[</a:t>
+            </a:r>
+            <a:r>
+              <a:rPr lang="es-MX" sz="3000" dirty="0" smtClean="0">
+                <a:solidFill>
+                  <a:schemeClr val="bg1">
+                    <a:lumMod val="85000"/>
+                  </a:schemeClr>
+                </a:solidFill>
+                <a:latin typeface="Roboto" panose="02000000000000000000" pitchFamily="2" charset="0"/>
+                <a:ea typeface="Roboto" panose="02000000000000000000" pitchFamily="2" charset="0"/>
+              </a:rPr>
+              <a:t> </a:t>
+            </a:r>
+            <a:r>
+              <a:rPr lang="es-MX" sz="3000" dirty="0" err="1">
+                <a:solidFill>
+                  <a:schemeClr val="bg1">
+                    <a:lumMod val="85000"/>
+                  </a:schemeClr>
+                </a:solidFill>
+                <a:latin typeface="Roboto" panose="02000000000000000000" pitchFamily="2" charset="0"/>
+                <a:ea typeface="Roboto" panose="02000000000000000000" pitchFamily="2" charset="0"/>
+              </a:rPr>
+              <a:t>git</a:t>
+            </a:r>
+            <a:r>
+              <a:rPr lang="es-MX" sz="4000" dirty="0" smtClean="0">
+                <a:solidFill>
+                  <a:schemeClr val="bg1">
+                    <a:lumMod val="85000"/>
+                  </a:schemeClr>
+                </a:solidFill>
+                <a:latin typeface="Roboto" panose="02000000000000000000" pitchFamily="2" charset="0"/>
+                <a:ea typeface="Roboto" panose="02000000000000000000" pitchFamily="2" charset="0"/>
+              </a:rPr>
+              <a:t> </a:t>
+            </a:r>
+            <a:r>
+              <a:rPr lang="es-MX" sz="2500" dirty="0">
+                <a:solidFill>
+                  <a:schemeClr val="bg1">
+                    <a:lumMod val="85000"/>
+                  </a:schemeClr>
+                </a:solidFill>
+                <a:latin typeface="Roboto" panose="02000000000000000000" pitchFamily="2" charset="0"/>
+                <a:ea typeface="Roboto" panose="02000000000000000000" pitchFamily="2" charset="0"/>
+              </a:rPr>
+              <a:t>]</a:t>
+            </a:r>
+            <a:r>
+              <a:rPr lang="es-MX" sz="4000" dirty="0" smtClean="0">
+                <a:solidFill>
+                  <a:schemeClr val="bg1">
+                    <a:lumMod val="85000"/>
+                  </a:schemeClr>
+                </a:solidFill>
+                <a:latin typeface="Roboto" panose="02000000000000000000" pitchFamily="2" charset="0"/>
+                <a:ea typeface="Roboto" panose="02000000000000000000" pitchFamily="2" charset="0"/>
+              </a:rPr>
+              <a:t> </a:t>
+            </a:r>
+            <a:endParaRPr lang="es-MX" sz="4000" dirty="0">
+              <a:solidFill>
+                <a:schemeClr val="bg1">
+                  <a:lumMod val="85000"/>
+                </a:schemeClr>
+              </a:solidFill>
+              <a:latin typeface="Roboto" panose="02000000000000000000" pitchFamily="2" charset="0"/>
+              <a:ea typeface="Roboto" panose="02000000000000000000" pitchFamily="2" charset="0"/>
+            </a:endParaRPr>
+          </a:p>
+        </p:txBody>
+      </p:sp>
+    </p:spTree>
+    <p:extLst>
+      <p:ext uri="{BB962C8B-B14F-4D97-AF65-F5344CB8AC3E}">
+        <p14:creationId xmlns:p14="http://schemas.microsoft.com/office/powerpoint/2010/main" val="2285823744"/>
+      </p:ext>
+    </p:extLst>
+  </p:cSld>
+  <p:clrMapOvr>
+    <a:masterClrMapping/>
+  </p:clrMapOvr>
+  <p:timing>
+    <p:tnLst>
+      <p:par>
+        <p:cTn id="1" dur="indefinite" restart="never" nodeType="tmRoot"/>
+      </p:par>
+    </p:tnLst>
+  </p:timing>
+</p:sld>
+</file>
+
+<file path=ppt/slides/slide13.xml><?xml version="1.0" encoding="utf-8"?>
+<p:sld xmlns:a="http://schemas.openxmlformats.org/drawingml/2006/main" xmlns:r="http://schemas.openxmlformats.org/officeDocument/2006/relationships" xmlns:p="http://schemas.openxmlformats.org/presentationml/2006/main">
+  <p:cSld>
+    <p:spTree>
+      <p:nvGrpSpPr>
+        <p:cNvPr id="1" name=""/>
+        <p:cNvGrpSpPr/>
+        <p:nvPr/>
+      </p:nvGrpSpPr>
+      <p:grpSpPr>
+        <a:xfrm>
+          <a:off x="0" y="0"/>
+          <a:ext cx="0" cy="0"/>
+          <a:chOff x="0" y="0"/>
+          <a:chExt cx="0" cy="0"/>
+        </a:xfrm>
+      </p:grpSpPr>
+      <p:sp>
+        <p:nvSpPr>
+          <p:cNvPr id="4" name="Título 1"/>
+          <p:cNvSpPr txBox="1">
+            <a:spLocks/>
+          </p:cNvSpPr>
+          <p:nvPr/>
+        </p:nvSpPr>
+        <p:spPr>
+          <a:xfrm>
+            <a:off x="862913" y="393956"/>
+            <a:ext cx="8639433" cy="1325563"/>
+          </a:xfrm>
+          <a:prstGeom prst="rect">
+            <a:avLst/>
+          </a:prstGeom>
+        </p:spPr>
+        <p:txBody>
+          <a:bodyPr vert="horz" lIns="91440" tIns="45720" rIns="91440" bIns="45720" rtlCol="0" anchor="ctr">
+            <a:normAutofit/>
+          </a:bodyPr>
+          <a:lstStyle>
+            <a:lvl1pPr algn="l" defTabSz="914400" rtl="0" eaLnBrk="1" latinLnBrk="0" hangingPunct="1">
+              <a:lnSpc>
+                <a:spcPct val="90000"/>
+              </a:lnSpc>
+              <a:spcBef>
+                <a:spcPct val="0"/>
+              </a:spcBef>
+              <a:buNone/>
+              <a:defRPr sz="4400" kern="1200">
+                <a:solidFill>
+                  <a:schemeClr val="tx1"/>
+                </a:solidFill>
+                <a:latin typeface="+mj-lt"/>
+                <a:ea typeface="+mj-ea"/>
+                <a:cs typeface="+mj-cs"/>
+              </a:defRPr>
+            </a:lvl1pPr>
+          </a:lstStyle>
+          <a:p>
+            <a:r>
+              <a:rPr lang="es-MX" sz="5000" dirty="0">
+                <a:solidFill>
+                  <a:srgbClr val="D50F2E"/>
+                </a:solidFill>
+                <a:latin typeface="Roboto Black" panose="02000000000000000000" pitchFamily="2" charset="0"/>
+                <a:ea typeface="Roboto Black" panose="02000000000000000000" pitchFamily="2" charset="0"/>
+              </a:rPr>
+              <a:t>Hacer cambios </a:t>
+            </a:r>
+            <a:r>
+              <a:rPr lang="es-MX" sz="2500" dirty="0">
+                <a:solidFill>
+                  <a:schemeClr val="bg1">
+                    <a:lumMod val="85000"/>
+                  </a:schemeClr>
+                </a:solidFill>
+                <a:latin typeface="Roboto" panose="02000000000000000000" pitchFamily="2" charset="0"/>
+                <a:ea typeface="Roboto" panose="02000000000000000000" pitchFamily="2" charset="0"/>
+              </a:rPr>
+              <a:t>[</a:t>
+            </a:r>
+            <a:r>
+              <a:rPr lang="es-MX" sz="3000" dirty="0" smtClean="0">
+                <a:solidFill>
+                  <a:schemeClr val="bg1">
+                    <a:lumMod val="85000"/>
+                  </a:schemeClr>
+                </a:solidFill>
+                <a:latin typeface="Roboto" panose="02000000000000000000" pitchFamily="2" charset="0"/>
+                <a:ea typeface="Roboto" panose="02000000000000000000" pitchFamily="2" charset="0"/>
+              </a:rPr>
+              <a:t> </a:t>
+            </a:r>
+            <a:r>
+              <a:rPr lang="es-MX" sz="3000" dirty="0" err="1" smtClean="0">
+                <a:solidFill>
+                  <a:schemeClr val="bg1">
+                    <a:lumMod val="85000"/>
+                  </a:schemeClr>
+                </a:solidFill>
+                <a:latin typeface="Roboto" panose="02000000000000000000" pitchFamily="2" charset="0"/>
+                <a:ea typeface="Roboto" panose="02000000000000000000" pitchFamily="2" charset="0"/>
+              </a:rPr>
+              <a:t>git</a:t>
+            </a:r>
+            <a:r>
+              <a:rPr lang="es-MX" sz="3000" dirty="0" smtClean="0">
+                <a:solidFill>
+                  <a:schemeClr val="bg1">
+                    <a:lumMod val="85000"/>
+                  </a:schemeClr>
+                </a:solidFill>
+                <a:latin typeface="Roboto" panose="02000000000000000000" pitchFamily="2" charset="0"/>
+                <a:ea typeface="Roboto" panose="02000000000000000000" pitchFamily="2" charset="0"/>
+              </a:rPr>
+              <a:t> </a:t>
+            </a:r>
+            <a:r>
+              <a:rPr lang="es-MX" sz="2500" dirty="0" smtClean="0">
+                <a:solidFill>
+                  <a:schemeClr val="bg1">
+                    <a:lumMod val="85000"/>
+                  </a:schemeClr>
+                </a:solidFill>
+                <a:latin typeface="Roboto" panose="02000000000000000000" pitchFamily="2" charset="0"/>
+                <a:ea typeface="Roboto" panose="02000000000000000000" pitchFamily="2" charset="0"/>
+              </a:rPr>
+              <a:t>]</a:t>
+            </a:r>
+            <a:r>
+              <a:rPr lang="es-MX" sz="3000" dirty="0" smtClean="0">
+                <a:solidFill>
+                  <a:schemeClr val="bg1">
+                    <a:lumMod val="85000"/>
+                  </a:schemeClr>
+                </a:solidFill>
+                <a:latin typeface="Roboto" panose="02000000000000000000" pitchFamily="2" charset="0"/>
+                <a:ea typeface="Roboto" panose="02000000000000000000" pitchFamily="2" charset="0"/>
+              </a:rPr>
+              <a:t> </a:t>
+            </a:r>
+            <a:endParaRPr lang="es-MX" sz="3000" dirty="0">
+              <a:solidFill>
+                <a:schemeClr val="bg1">
+                  <a:lumMod val="85000"/>
+                </a:schemeClr>
+              </a:solidFill>
+              <a:latin typeface="Roboto" panose="02000000000000000000" pitchFamily="2" charset="0"/>
+              <a:ea typeface="Roboto" panose="02000000000000000000" pitchFamily="2" charset="0"/>
+            </a:endParaRPr>
+          </a:p>
+        </p:txBody>
+      </p:sp>
+      <p:sp>
+        <p:nvSpPr>
+          <p:cNvPr id="5" name="Marcador de contenido 2"/>
+          <p:cNvSpPr>
+            <a:spLocks noGrp="1"/>
+          </p:cNvSpPr>
+          <p:nvPr>
+            <p:ph idx="1"/>
+          </p:nvPr>
+        </p:nvSpPr>
+        <p:spPr>
+          <a:xfrm>
+            <a:off x="862913" y="2333840"/>
+            <a:ext cx="10515600" cy="4524160"/>
+          </a:xfrm>
+        </p:spPr>
+        <p:txBody>
+          <a:bodyPr>
+            <a:normAutofit/>
+          </a:bodyPr>
+          <a:lstStyle/>
+          <a:p>
+            <a:pPr marL="0" indent="0">
+              <a:buNone/>
+            </a:pPr>
+            <a:r>
+              <a:rPr lang="es-MX" sz="2200" dirty="0" smtClean="0">
+                <a:solidFill>
+                  <a:schemeClr val="bg1">
+                    <a:lumMod val="75000"/>
+                  </a:schemeClr>
+                </a:solidFill>
+                <a:latin typeface="Roboto" panose="02000000000000000000" pitchFamily="2" charset="0"/>
+                <a:ea typeface="Roboto" panose="02000000000000000000" pitchFamily="2" charset="0"/>
+              </a:rPr>
+              <a:t>Registrar </a:t>
+            </a:r>
+            <a:r>
+              <a:rPr lang="es-MX" sz="2200" dirty="0">
+                <a:solidFill>
+                  <a:schemeClr val="bg1">
+                    <a:lumMod val="75000"/>
+                  </a:schemeClr>
+                </a:solidFill>
+                <a:latin typeface="Roboto" panose="02000000000000000000" pitchFamily="2" charset="0"/>
+                <a:ea typeface="Roboto" panose="02000000000000000000" pitchFamily="2" charset="0"/>
+              </a:rPr>
+              <a:t>cambios</a:t>
+            </a:r>
+          </a:p>
+          <a:p>
+            <a:pPr marL="0" indent="0">
+              <a:buNone/>
+            </a:pPr>
+            <a:r>
+              <a:rPr lang="es-MX" sz="2400" dirty="0" err="1" smtClean="0">
+                <a:solidFill>
+                  <a:schemeClr val="bg1">
+                    <a:lumMod val="50000"/>
+                  </a:schemeClr>
+                </a:solidFill>
+                <a:latin typeface="Roboto" panose="02000000000000000000" pitchFamily="2" charset="0"/>
+                <a:ea typeface="Roboto" panose="02000000000000000000" pitchFamily="2" charset="0"/>
+              </a:rPr>
+              <a:t>git</a:t>
+            </a:r>
+            <a:r>
+              <a:rPr lang="es-MX" sz="2400" dirty="0" smtClean="0">
+                <a:solidFill>
+                  <a:schemeClr val="bg1">
+                    <a:lumMod val="50000"/>
+                  </a:schemeClr>
+                </a:solidFill>
+                <a:latin typeface="Roboto" panose="02000000000000000000" pitchFamily="2" charset="0"/>
+                <a:ea typeface="Roboto" panose="02000000000000000000" pitchFamily="2" charset="0"/>
+              </a:rPr>
+              <a:t> </a:t>
+            </a:r>
+            <a:r>
+              <a:rPr lang="es-MX" sz="2400" dirty="0" err="1" smtClean="0">
+                <a:solidFill>
+                  <a:schemeClr val="bg1">
+                    <a:lumMod val="50000"/>
+                  </a:schemeClr>
+                </a:solidFill>
+                <a:latin typeface="Roboto" panose="02000000000000000000" pitchFamily="2" charset="0"/>
+                <a:ea typeface="Roboto" panose="02000000000000000000" pitchFamily="2" charset="0"/>
+              </a:rPr>
+              <a:t>commit</a:t>
+            </a:r>
+            <a:r>
+              <a:rPr lang="es-MX" sz="2400" dirty="0">
+                <a:solidFill>
+                  <a:schemeClr val="bg1">
+                    <a:lumMod val="50000"/>
+                  </a:schemeClr>
+                </a:solidFill>
+                <a:latin typeface="Roboto" panose="02000000000000000000" pitchFamily="2" charset="0"/>
+                <a:ea typeface="Roboto" panose="02000000000000000000" pitchFamily="2" charset="0"/>
+              </a:rPr>
+              <a:t>	</a:t>
+            </a:r>
+            <a:r>
+              <a:rPr lang="es-MX" sz="2400" dirty="0" err="1" smtClean="0">
+                <a:solidFill>
+                  <a:schemeClr val="bg1">
+                    <a:lumMod val="50000"/>
+                  </a:schemeClr>
+                </a:solidFill>
+                <a:latin typeface="Roboto" panose="02000000000000000000" pitchFamily="2" charset="0"/>
+                <a:ea typeface="Roboto" panose="02000000000000000000" pitchFamily="2" charset="0"/>
+              </a:rPr>
+              <a:t>git</a:t>
+            </a:r>
+            <a:r>
+              <a:rPr lang="es-MX" sz="2400" dirty="0" smtClean="0">
+                <a:solidFill>
+                  <a:schemeClr val="bg1">
+                    <a:lumMod val="50000"/>
+                  </a:schemeClr>
+                </a:solidFill>
+                <a:latin typeface="Roboto" panose="02000000000000000000" pitchFamily="2" charset="0"/>
+                <a:ea typeface="Roboto" panose="02000000000000000000" pitchFamily="2" charset="0"/>
+              </a:rPr>
+              <a:t> </a:t>
+            </a:r>
+            <a:r>
+              <a:rPr lang="es-MX" sz="2400" dirty="0" err="1" smtClean="0">
+                <a:solidFill>
+                  <a:schemeClr val="bg1">
+                    <a:lumMod val="50000"/>
+                  </a:schemeClr>
+                </a:solidFill>
+                <a:latin typeface="Roboto" panose="02000000000000000000" pitchFamily="2" charset="0"/>
+                <a:ea typeface="Roboto" panose="02000000000000000000" pitchFamily="2" charset="0"/>
+              </a:rPr>
+              <a:t>commit</a:t>
+            </a:r>
+            <a:r>
+              <a:rPr lang="es-MX" sz="2400" dirty="0" smtClean="0">
+                <a:solidFill>
+                  <a:schemeClr val="bg1">
+                    <a:lumMod val="50000"/>
+                  </a:schemeClr>
+                </a:solidFill>
+                <a:latin typeface="Roboto" panose="02000000000000000000" pitchFamily="2" charset="0"/>
+                <a:ea typeface="Roboto" panose="02000000000000000000" pitchFamily="2" charset="0"/>
+              </a:rPr>
+              <a:t> -m “</a:t>
+            </a:r>
+            <a:r>
+              <a:rPr lang="es-MX" sz="2000" dirty="0" smtClean="0">
+                <a:solidFill>
+                  <a:schemeClr val="bg1">
+                    <a:lumMod val="50000"/>
+                  </a:schemeClr>
+                </a:solidFill>
+                <a:latin typeface="Roboto" panose="02000000000000000000" pitchFamily="2" charset="0"/>
+                <a:ea typeface="Roboto" panose="02000000000000000000" pitchFamily="2" charset="0"/>
+              </a:rPr>
+              <a:t>[</a:t>
+            </a:r>
+            <a:r>
+              <a:rPr lang="es-MX" sz="2400" dirty="0" smtClean="0">
+                <a:solidFill>
+                  <a:schemeClr val="bg1">
+                    <a:lumMod val="50000"/>
+                  </a:schemeClr>
+                </a:solidFill>
+                <a:latin typeface="Roboto" panose="02000000000000000000" pitchFamily="2" charset="0"/>
+                <a:ea typeface="Roboto" panose="02000000000000000000" pitchFamily="2" charset="0"/>
+              </a:rPr>
+              <a:t>descripción</a:t>
+            </a:r>
+            <a:r>
+              <a:rPr lang="es-MX" sz="2000" dirty="0" smtClean="0">
+                <a:solidFill>
+                  <a:schemeClr val="bg1">
+                    <a:lumMod val="50000"/>
+                  </a:schemeClr>
+                </a:solidFill>
+                <a:latin typeface="Roboto" panose="02000000000000000000" pitchFamily="2" charset="0"/>
+                <a:ea typeface="Roboto" panose="02000000000000000000" pitchFamily="2" charset="0"/>
+              </a:rPr>
+              <a:t>]</a:t>
+            </a:r>
+            <a:r>
+              <a:rPr lang="es-MX" sz="2400" dirty="0" smtClean="0">
+                <a:solidFill>
+                  <a:schemeClr val="bg1">
+                    <a:lumMod val="50000"/>
+                  </a:schemeClr>
+                </a:solidFill>
+                <a:latin typeface="Roboto" panose="02000000000000000000" pitchFamily="2" charset="0"/>
+                <a:ea typeface="Roboto" panose="02000000000000000000" pitchFamily="2" charset="0"/>
+              </a:rPr>
+              <a:t>”</a:t>
+            </a:r>
+          </a:p>
+          <a:p>
+            <a:pPr marL="0" indent="0">
+              <a:buNone/>
+            </a:pPr>
+            <a:endParaRPr lang="es-MX" sz="2400" dirty="0">
+              <a:solidFill>
+                <a:schemeClr val="bg1">
+                  <a:lumMod val="50000"/>
+                </a:schemeClr>
+              </a:solidFill>
+              <a:latin typeface="Roboto" panose="02000000000000000000" pitchFamily="2" charset="0"/>
+              <a:ea typeface="Roboto" panose="02000000000000000000" pitchFamily="2" charset="0"/>
+            </a:endParaRPr>
+          </a:p>
+          <a:p>
+            <a:pPr marL="0" indent="0">
+              <a:buNone/>
+            </a:pPr>
+            <a:endParaRPr lang="es-MX" sz="2400" dirty="0" smtClean="0">
+              <a:solidFill>
+                <a:schemeClr val="bg1">
+                  <a:lumMod val="50000"/>
+                </a:schemeClr>
+              </a:solidFill>
+              <a:latin typeface="Roboto" panose="02000000000000000000" pitchFamily="2" charset="0"/>
+              <a:ea typeface="Roboto" panose="02000000000000000000" pitchFamily="2" charset="0"/>
+            </a:endParaRPr>
+          </a:p>
+          <a:p>
+            <a:pPr marL="0" indent="0">
+              <a:buNone/>
+            </a:pPr>
+            <a:endParaRPr lang="es-MX" sz="2400" dirty="0">
+              <a:solidFill>
+                <a:schemeClr val="bg1">
+                  <a:lumMod val="50000"/>
+                </a:schemeClr>
+              </a:solidFill>
+              <a:latin typeface="Roboto" panose="02000000000000000000" pitchFamily="2" charset="0"/>
+              <a:ea typeface="Roboto" panose="02000000000000000000" pitchFamily="2" charset="0"/>
+            </a:endParaRPr>
+          </a:p>
+          <a:p>
+            <a:pPr marL="0" indent="0">
+              <a:buNone/>
+            </a:pPr>
+            <a:endParaRPr lang="es-MX" sz="2400" b="1" dirty="0" smtClean="0">
+              <a:solidFill>
+                <a:schemeClr val="bg1">
+                  <a:lumMod val="50000"/>
+                </a:schemeClr>
+              </a:solidFill>
+              <a:latin typeface="Roboto" panose="02000000000000000000" pitchFamily="2" charset="0"/>
+              <a:ea typeface="Roboto" panose="02000000000000000000" pitchFamily="2" charset="0"/>
+            </a:endParaRPr>
+          </a:p>
+          <a:p>
+            <a:pPr marL="0" indent="0">
+              <a:buNone/>
+            </a:pPr>
+            <a:endParaRPr lang="es-MX" sz="2400" dirty="0" smtClean="0">
+              <a:solidFill>
+                <a:schemeClr val="bg1">
+                  <a:lumMod val="50000"/>
+                </a:schemeClr>
+              </a:solidFill>
+              <a:latin typeface="Roboto" panose="02000000000000000000" pitchFamily="2" charset="0"/>
+              <a:ea typeface="Roboto" panose="02000000000000000000" pitchFamily="2" charset="0"/>
+            </a:endParaRPr>
+          </a:p>
+          <a:p>
+            <a:pPr marL="0" indent="0">
+              <a:buNone/>
+            </a:pPr>
+            <a:endParaRPr lang="es-MX" sz="2400" dirty="0">
+              <a:solidFill>
+                <a:schemeClr val="bg1">
+                  <a:lumMod val="50000"/>
+                </a:schemeClr>
+              </a:solidFill>
+              <a:latin typeface="Roboto" panose="02000000000000000000" pitchFamily="2" charset="0"/>
+              <a:ea typeface="Roboto" panose="02000000000000000000" pitchFamily="2" charset="0"/>
+            </a:endParaRPr>
+          </a:p>
+          <a:p>
+            <a:pPr marL="0" indent="0">
+              <a:buNone/>
+            </a:pPr>
+            <a:endParaRPr lang="es-MX" dirty="0">
+              <a:solidFill>
+                <a:schemeClr val="bg1">
+                  <a:lumMod val="75000"/>
+                </a:schemeClr>
+              </a:solidFill>
+              <a:latin typeface="Roboto" panose="02000000000000000000" pitchFamily="2" charset="0"/>
+              <a:ea typeface="Roboto" panose="02000000000000000000" pitchFamily="2" charset="0"/>
+            </a:endParaRPr>
+          </a:p>
+          <a:p>
+            <a:pPr marL="0" indent="0">
+              <a:buNone/>
+            </a:pPr>
+            <a:endParaRPr lang="es-MX" dirty="0"/>
+          </a:p>
+        </p:txBody>
+      </p:sp>
+    </p:spTree>
+    <p:extLst>
+      <p:ext uri="{BB962C8B-B14F-4D97-AF65-F5344CB8AC3E}">
+        <p14:creationId xmlns:p14="http://schemas.microsoft.com/office/powerpoint/2010/main" val="1393074935"/>
+      </p:ext>
+    </p:extLst>
+  </p:cSld>
+  <p:clrMapOvr>
+    <a:masterClrMapping/>
+  </p:clrMapOvr>
+  <p:timing>
+    <p:tnLst>
+      <p:par>
+        <p:cTn id="1" dur="indefinite" restart="never" nodeType="tmRoot"/>
+      </p:par>
+    </p:tnLst>
+  </p:timing>
+</p:sld>
+</file>
+
+<file path=ppt/slides/slide14.xml><?xml version="1.0" encoding="utf-8"?>
+<p:sld xmlns:a="http://schemas.openxmlformats.org/drawingml/2006/main" xmlns:r="http://schemas.openxmlformats.org/officeDocument/2006/relationships" xmlns:p="http://schemas.openxmlformats.org/presentationml/2006/main">
+  <p:cSld>
+    <p:spTree>
+      <p:nvGrpSpPr>
+        <p:cNvPr id="1" name=""/>
+        <p:cNvGrpSpPr/>
+        <p:nvPr/>
+      </p:nvGrpSpPr>
+      <p:grpSpPr>
+        <a:xfrm>
+          <a:off x="0" y="0"/>
+          <a:ext cx="0" cy="0"/>
+          <a:chOff x="0" y="0"/>
+          <a:chExt cx="0" cy="0"/>
+        </a:xfrm>
+      </p:grpSpPr>
+      <p:sp>
+        <p:nvSpPr>
+          <p:cNvPr id="4" name="Título 1"/>
+          <p:cNvSpPr txBox="1">
+            <a:spLocks/>
+          </p:cNvSpPr>
+          <p:nvPr/>
+        </p:nvSpPr>
+        <p:spPr>
+          <a:xfrm>
+            <a:off x="862913" y="393956"/>
+            <a:ext cx="8639433" cy="1325563"/>
+          </a:xfrm>
+          <a:prstGeom prst="rect">
+            <a:avLst/>
+          </a:prstGeom>
+        </p:spPr>
+        <p:txBody>
+          <a:bodyPr vert="horz" lIns="91440" tIns="45720" rIns="91440" bIns="45720" rtlCol="0" anchor="ctr">
+            <a:normAutofit/>
+          </a:bodyPr>
+          <a:lstStyle>
+            <a:lvl1pPr algn="l" defTabSz="914400" rtl="0" eaLnBrk="1" latinLnBrk="0" hangingPunct="1">
+              <a:lnSpc>
+                <a:spcPct val="90000"/>
+              </a:lnSpc>
+              <a:spcBef>
+                <a:spcPct val="0"/>
+              </a:spcBef>
+              <a:buNone/>
+              <a:defRPr sz="4400" kern="1200">
+                <a:solidFill>
+                  <a:schemeClr val="tx1"/>
+                </a:solidFill>
+                <a:latin typeface="+mj-lt"/>
+                <a:ea typeface="+mj-ea"/>
+                <a:cs typeface="+mj-cs"/>
+              </a:defRPr>
+            </a:lvl1pPr>
+          </a:lstStyle>
+          <a:p>
+            <a:r>
+              <a:rPr lang="es-MX" sz="5000" dirty="0" smtClean="0">
+                <a:solidFill>
+                  <a:srgbClr val="D50F2E"/>
+                </a:solidFill>
+                <a:latin typeface="Roboto Black" panose="02000000000000000000" pitchFamily="2" charset="0"/>
+                <a:ea typeface="Roboto Black" panose="02000000000000000000" pitchFamily="2" charset="0"/>
+              </a:rPr>
+              <a:t>GitHub Repo </a:t>
+            </a:r>
+            <a:r>
+              <a:rPr lang="es-MX" sz="2500" dirty="0">
+                <a:solidFill>
+                  <a:schemeClr val="bg1">
+                    <a:lumMod val="85000"/>
+                  </a:schemeClr>
+                </a:solidFill>
+                <a:latin typeface="Roboto" panose="02000000000000000000" pitchFamily="2" charset="0"/>
+                <a:ea typeface="Roboto" panose="02000000000000000000" pitchFamily="2" charset="0"/>
+              </a:rPr>
+              <a:t>[</a:t>
+            </a:r>
+            <a:r>
+              <a:rPr lang="es-MX" sz="3000" dirty="0" smtClean="0">
+                <a:solidFill>
+                  <a:schemeClr val="bg1">
+                    <a:lumMod val="85000"/>
+                  </a:schemeClr>
+                </a:solidFill>
+                <a:latin typeface="Roboto" panose="02000000000000000000" pitchFamily="2" charset="0"/>
+                <a:ea typeface="Roboto" panose="02000000000000000000" pitchFamily="2" charset="0"/>
+              </a:rPr>
+              <a:t> </a:t>
+            </a:r>
+            <a:r>
+              <a:rPr lang="es-MX" sz="3000" dirty="0" err="1" smtClean="0">
+                <a:solidFill>
+                  <a:schemeClr val="bg1">
+                    <a:lumMod val="85000"/>
+                  </a:schemeClr>
+                </a:solidFill>
+                <a:latin typeface="Roboto" panose="02000000000000000000" pitchFamily="2" charset="0"/>
+                <a:ea typeface="Roboto" panose="02000000000000000000" pitchFamily="2" charset="0"/>
+              </a:rPr>
+              <a:t>git</a:t>
+            </a:r>
+            <a:r>
+              <a:rPr lang="es-MX" sz="3000" dirty="0" smtClean="0">
+                <a:solidFill>
+                  <a:schemeClr val="bg1">
+                    <a:lumMod val="85000"/>
+                  </a:schemeClr>
+                </a:solidFill>
+                <a:latin typeface="Roboto" panose="02000000000000000000" pitchFamily="2" charset="0"/>
+                <a:ea typeface="Roboto" panose="02000000000000000000" pitchFamily="2" charset="0"/>
+              </a:rPr>
+              <a:t> </a:t>
+            </a:r>
+            <a:r>
+              <a:rPr lang="es-MX" sz="2500" dirty="0" smtClean="0">
+                <a:solidFill>
+                  <a:schemeClr val="bg1">
+                    <a:lumMod val="85000"/>
+                  </a:schemeClr>
+                </a:solidFill>
+                <a:latin typeface="Roboto" panose="02000000000000000000" pitchFamily="2" charset="0"/>
+                <a:ea typeface="Roboto" panose="02000000000000000000" pitchFamily="2" charset="0"/>
+              </a:rPr>
+              <a:t>]</a:t>
+            </a:r>
+            <a:r>
+              <a:rPr lang="es-MX" sz="3000" dirty="0" smtClean="0">
+                <a:solidFill>
+                  <a:schemeClr val="bg1">
+                    <a:lumMod val="85000"/>
+                  </a:schemeClr>
+                </a:solidFill>
+                <a:latin typeface="Roboto" panose="02000000000000000000" pitchFamily="2" charset="0"/>
+                <a:ea typeface="Roboto" panose="02000000000000000000" pitchFamily="2" charset="0"/>
+              </a:rPr>
+              <a:t> </a:t>
+            </a:r>
+            <a:endParaRPr lang="es-MX" sz="3000" dirty="0">
+              <a:solidFill>
+                <a:schemeClr val="bg1">
+                  <a:lumMod val="85000"/>
+                </a:schemeClr>
+              </a:solidFill>
+              <a:latin typeface="Roboto" panose="02000000000000000000" pitchFamily="2" charset="0"/>
+              <a:ea typeface="Roboto" panose="02000000000000000000" pitchFamily="2" charset="0"/>
+            </a:endParaRPr>
+          </a:p>
+        </p:txBody>
+      </p:sp>
+      <p:sp>
+        <p:nvSpPr>
+          <p:cNvPr id="2" name="Marcador de contenido 1"/>
+          <p:cNvSpPr>
+            <a:spLocks noGrp="1"/>
+          </p:cNvSpPr>
+          <p:nvPr>
+            <p:ph idx="1"/>
+          </p:nvPr>
+        </p:nvSpPr>
+        <p:spPr/>
+        <p:txBody>
+          <a:bodyPr>
+            <a:normAutofit lnSpcReduction="10000"/>
+          </a:bodyPr>
+          <a:lstStyle/>
+          <a:p>
+            <a:pPr marL="0" indent="0">
+              <a:buNone/>
+            </a:pPr>
+            <a:r>
+              <a:rPr lang="es-MX" sz="2200" dirty="0" smtClean="0">
+                <a:solidFill>
+                  <a:schemeClr val="bg1">
+                    <a:lumMod val="75000"/>
+                  </a:schemeClr>
+                </a:solidFill>
+                <a:latin typeface="Roboto" panose="02000000000000000000" pitchFamily="2" charset="0"/>
+                <a:ea typeface="Roboto" panose="02000000000000000000" pitchFamily="2" charset="0"/>
+              </a:rPr>
+              <a:t>Crear repo en GitHub</a:t>
+            </a:r>
+          </a:p>
+          <a:p>
+            <a:pPr marL="0" indent="0">
+              <a:buNone/>
+            </a:pPr>
+            <a:endParaRPr lang="es-MX" sz="2200" dirty="0">
+              <a:solidFill>
+                <a:schemeClr val="bg1">
+                  <a:lumMod val="75000"/>
+                </a:schemeClr>
+              </a:solidFill>
+              <a:latin typeface="Roboto" panose="02000000000000000000" pitchFamily="2" charset="0"/>
+              <a:ea typeface="Roboto" panose="02000000000000000000" pitchFamily="2" charset="0"/>
+            </a:endParaRPr>
+          </a:p>
+          <a:p>
+            <a:pPr marL="0" indent="0">
+              <a:buNone/>
+            </a:pPr>
+            <a:r>
+              <a:rPr lang="es-MX" sz="2200" dirty="0" smtClean="0">
+                <a:solidFill>
+                  <a:schemeClr val="bg1">
+                    <a:lumMod val="75000"/>
+                  </a:schemeClr>
+                </a:solidFill>
+                <a:latin typeface="Roboto" panose="02000000000000000000" pitchFamily="2" charset="0"/>
+                <a:ea typeface="Roboto" panose="02000000000000000000" pitchFamily="2" charset="0"/>
+              </a:rPr>
+              <a:t>Agregando </a:t>
+            </a:r>
+            <a:r>
+              <a:rPr lang="es-MX" sz="2200" dirty="0">
+                <a:solidFill>
+                  <a:schemeClr val="bg1">
+                    <a:lumMod val="75000"/>
+                  </a:schemeClr>
+                </a:solidFill>
+                <a:latin typeface="Roboto" panose="02000000000000000000" pitchFamily="2" charset="0"/>
+                <a:ea typeface="Roboto" panose="02000000000000000000" pitchFamily="2" charset="0"/>
+              </a:rPr>
+              <a:t>el acceso al repo remoto</a:t>
+            </a:r>
+          </a:p>
+          <a:p>
+            <a:pPr marL="0" indent="0">
+              <a:buNone/>
+            </a:pPr>
+            <a:r>
+              <a:rPr lang="es-MX" sz="2400" dirty="0" err="1" smtClean="0">
+                <a:solidFill>
+                  <a:schemeClr val="bg1">
+                    <a:lumMod val="50000"/>
+                  </a:schemeClr>
+                </a:solidFill>
+                <a:latin typeface="Roboto" panose="02000000000000000000" pitchFamily="2" charset="0"/>
+                <a:ea typeface="Roboto" panose="02000000000000000000" pitchFamily="2" charset="0"/>
+              </a:rPr>
+              <a:t>git</a:t>
+            </a:r>
+            <a:r>
+              <a:rPr lang="es-MX" sz="2400" dirty="0" smtClean="0">
+                <a:solidFill>
+                  <a:schemeClr val="bg1">
+                    <a:lumMod val="50000"/>
+                  </a:schemeClr>
+                </a:solidFill>
+                <a:latin typeface="Roboto" panose="02000000000000000000" pitchFamily="2" charset="0"/>
+                <a:ea typeface="Roboto" panose="02000000000000000000" pitchFamily="2" charset="0"/>
+              </a:rPr>
+              <a:t> </a:t>
+            </a:r>
+            <a:r>
+              <a:rPr lang="es-MX" sz="2400" dirty="0" err="1">
+                <a:solidFill>
+                  <a:schemeClr val="bg1">
+                    <a:lumMod val="50000"/>
+                  </a:schemeClr>
+                </a:solidFill>
+                <a:latin typeface="Roboto" panose="02000000000000000000" pitchFamily="2" charset="0"/>
+                <a:ea typeface="Roboto" panose="02000000000000000000" pitchFamily="2" charset="0"/>
+              </a:rPr>
+              <a:t>remote</a:t>
+            </a:r>
+            <a:r>
+              <a:rPr lang="es-MX" sz="2400" dirty="0">
+                <a:solidFill>
+                  <a:schemeClr val="bg1">
+                    <a:lumMod val="50000"/>
+                  </a:schemeClr>
+                </a:solidFill>
+                <a:latin typeface="Roboto" panose="02000000000000000000" pitchFamily="2" charset="0"/>
+                <a:ea typeface="Roboto" panose="02000000000000000000" pitchFamily="2" charset="0"/>
+              </a:rPr>
+              <a:t> </a:t>
+            </a:r>
+            <a:r>
+              <a:rPr lang="es-MX" sz="2400" dirty="0" err="1">
+                <a:solidFill>
+                  <a:schemeClr val="bg1">
+                    <a:lumMod val="50000"/>
+                  </a:schemeClr>
+                </a:solidFill>
+                <a:latin typeface="Roboto" panose="02000000000000000000" pitchFamily="2" charset="0"/>
+                <a:ea typeface="Roboto" panose="02000000000000000000" pitchFamily="2" charset="0"/>
+              </a:rPr>
+              <a:t>add</a:t>
+            </a:r>
+            <a:r>
+              <a:rPr lang="es-MX" sz="2400" dirty="0">
+                <a:solidFill>
+                  <a:schemeClr val="bg1">
+                    <a:lumMod val="50000"/>
+                  </a:schemeClr>
+                </a:solidFill>
+                <a:latin typeface="Roboto" panose="02000000000000000000" pitchFamily="2" charset="0"/>
+                <a:ea typeface="Roboto" panose="02000000000000000000" pitchFamily="2" charset="0"/>
+              </a:rPr>
+              <a:t> </a:t>
+            </a:r>
+            <a:r>
+              <a:rPr lang="es-MX" sz="2400" dirty="0" err="1">
+                <a:solidFill>
+                  <a:schemeClr val="bg1">
+                    <a:lumMod val="50000"/>
+                  </a:schemeClr>
+                </a:solidFill>
+                <a:latin typeface="Roboto" panose="02000000000000000000" pitchFamily="2" charset="0"/>
+                <a:ea typeface="Roboto" panose="02000000000000000000" pitchFamily="2" charset="0"/>
+              </a:rPr>
+              <a:t>origin</a:t>
+            </a:r>
+            <a:r>
+              <a:rPr lang="es-MX" sz="2400" dirty="0">
+                <a:solidFill>
+                  <a:schemeClr val="bg1">
+                    <a:lumMod val="50000"/>
+                  </a:schemeClr>
+                </a:solidFill>
+                <a:latin typeface="Roboto" panose="02000000000000000000" pitchFamily="2" charset="0"/>
+                <a:ea typeface="Roboto" panose="02000000000000000000" pitchFamily="2" charset="0"/>
+              </a:rPr>
+              <a:t> </a:t>
+            </a:r>
+            <a:r>
+              <a:rPr lang="es-MX" sz="2400" dirty="0" smtClean="0">
+                <a:solidFill>
+                  <a:schemeClr val="bg1">
+                    <a:lumMod val="50000"/>
+                  </a:schemeClr>
+                </a:solidFill>
+                <a:latin typeface="Roboto" panose="02000000000000000000" pitchFamily="2" charset="0"/>
+                <a:ea typeface="Roboto" panose="02000000000000000000" pitchFamily="2" charset="0"/>
+              </a:rPr>
+              <a:t>[ </a:t>
+            </a:r>
+            <a:r>
+              <a:rPr lang="es-MX" sz="2400" dirty="0" err="1" smtClean="0">
+                <a:solidFill>
+                  <a:schemeClr val="bg1">
+                    <a:lumMod val="50000"/>
+                  </a:schemeClr>
+                </a:solidFill>
+                <a:latin typeface="Roboto" panose="02000000000000000000" pitchFamily="2" charset="0"/>
+                <a:ea typeface="Roboto" panose="02000000000000000000" pitchFamily="2" charset="0"/>
+              </a:rPr>
+              <a:t>url</a:t>
+            </a:r>
+            <a:r>
+              <a:rPr lang="es-MX" sz="2400" dirty="0" smtClean="0">
+                <a:solidFill>
+                  <a:schemeClr val="bg1">
+                    <a:lumMod val="50000"/>
+                  </a:schemeClr>
+                </a:solidFill>
+                <a:latin typeface="Roboto" panose="02000000000000000000" pitchFamily="2" charset="0"/>
+                <a:ea typeface="Roboto" panose="02000000000000000000" pitchFamily="2" charset="0"/>
+              </a:rPr>
+              <a:t> ]</a:t>
+            </a:r>
+          </a:p>
+          <a:p>
+            <a:pPr marL="0" indent="0">
+              <a:buNone/>
+            </a:pPr>
+            <a:endParaRPr lang="es-MX" sz="2400" dirty="0">
+              <a:solidFill>
+                <a:schemeClr val="bg1">
+                  <a:lumMod val="50000"/>
+                </a:schemeClr>
+              </a:solidFill>
+              <a:latin typeface="Roboto" panose="02000000000000000000" pitchFamily="2" charset="0"/>
+              <a:ea typeface="Roboto" panose="02000000000000000000" pitchFamily="2" charset="0"/>
+            </a:endParaRPr>
+          </a:p>
+          <a:p>
+            <a:pPr marL="0" indent="0">
+              <a:buNone/>
+            </a:pPr>
+            <a:r>
+              <a:rPr lang="es-MX" sz="2200" dirty="0">
+                <a:solidFill>
+                  <a:schemeClr val="bg1">
+                    <a:lumMod val="75000"/>
+                  </a:schemeClr>
+                </a:solidFill>
+                <a:latin typeface="Roboto" panose="02000000000000000000" pitchFamily="2" charset="0"/>
+                <a:ea typeface="Roboto" panose="02000000000000000000" pitchFamily="2" charset="0"/>
+              </a:rPr>
+              <a:t>Ver todas las conexiones a remoto</a:t>
+            </a:r>
+          </a:p>
+          <a:p>
+            <a:pPr marL="0" indent="0">
+              <a:buNone/>
+            </a:pPr>
+            <a:r>
+              <a:rPr lang="es-MX" sz="2400" dirty="0" err="1" smtClean="0">
+                <a:solidFill>
+                  <a:schemeClr val="bg1">
+                    <a:lumMod val="50000"/>
+                  </a:schemeClr>
+                </a:solidFill>
+                <a:latin typeface="Roboto" panose="02000000000000000000" pitchFamily="2" charset="0"/>
+                <a:ea typeface="Roboto" panose="02000000000000000000" pitchFamily="2" charset="0"/>
+              </a:rPr>
+              <a:t>git</a:t>
+            </a:r>
+            <a:r>
+              <a:rPr lang="es-MX" sz="2400" dirty="0" smtClean="0">
+                <a:solidFill>
+                  <a:schemeClr val="bg1">
+                    <a:lumMod val="50000"/>
+                  </a:schemeClr>
+                </a:solidFill>
+                <a:latin typeface="Roboto" panose="02000000000000000000" pitchFamily="2" charset="0"/>
+                <a:ea typeface="Roboto" panose="02000000000000000000" pitchFamily="2" charset="0"/>
+              </a:rPr>
+              <a:t> </a:t>
+            </a:r>
+            <a:r>
+              <a:rPr lang="es-MX" sz="2400" dirty="0" err="1" smtClean="0">
+                <a:solidFill>
+                  <a:schemeClr val="bg1">
+                    <a:lumMod val="50000"/>
+                  </a:schemeClr>
+                </a:solidFill>
+                <a:latin typeface="Roboto" panose="02000000000000000000" pitchFamily="2" charset="0"/>
+                <a:ea typeface="Roboto" panose="02000000000000000000" pitchFamily="2" charset="0"/>
+              </a:rPr>
+              <a:t>remote</a:t>
+            </a:r>
+            <a:r>
+              <a:rPr lang="es-MX" sz="2400" dirty="0" smtClean="0">
+                <a:solidFill>
+                  <a:schemeClr val="bg1">
+                    <a:lumMod val="50000"/>
+                  </a:schemeClr>
+                </a:solidFill>
+                <a:latin typeface="Roboto" panose="02000000000000000000" pitchFamily="2" charset="0"/>
+                <a:ea typeface="Roboto" panose="02000000000000000000" pitchFamily="2" charset="0"/>
+              </a:rPr>
+              <a:t> –v</a:t>
+            </a:r>
+          </a:p>
+          <a:p>
+            <a:pPr marL="0" indent="0">
+              <a:buNone/>
+            </a:pPr>
+            <a:endParaRPr lang="es-MX" sz="2400" dirty="0">
+              <a:solidFill>
+                <a:schemeClr val="bg1">
+                  <a:lumMod val="50000"/>
+                </a:schemeClr>
+              </a:solidFill>
+              <a:latin typeface="Roboto" panose="02000000000000000000" pitchFamily="2" charset="0"/>
+              <a:ea typeface="Roboto" panose="02000000000000000000" pitchFamily="2" charset="0"/>
+            </a:endParaRPr>
+          </a:p>
+          <a:p>
+            <a:pPr marL="0" indent="0">
+              <a:buNone/>
+            </a:pPr>
+            <a:r>
+              <a:rPr lang="es-MX" sz="2200" dirty="0">
+                <a:solidFill>
+                  <a:schemeClr val="bg1">
+                    <a:lumMod val="75000"/>
+                  </a:schemeClr>
+                </a:solidFill>
+                <a:latin typeface="Roboto" panose="02000000000000000000" pitchFamily="2" charset="0"/>
+                <a:ea typeface="Roboto" panose="02000000000000000000" pitchFamily="2" charset="0"/>
+              </a:rPr>
+              <a:t>Publicar cambios</a:t>
+            </a:r>
+          </a:p>
+          <a:p>
+            <a:pPr marL="0" indent="0">
+              <a:buNone/>
+            </a:pPr>
+            <a:r>
+              <a:rPr lang="es-MX" sz="2400" dirty="0" err="1">
+                <a:solidFill>
+                  <a:schemeClr val="bg1">
+                    <a:lumMod val="50000"/>
+                  </a:schemeClr>
+                </a:solidFill>
+                <a:latin typeface="Roboto" panose="02000000000000000000" pitchFamily="2" charset="0"/>
+                <a:ea typeface="Roboto" panose="02000000000000000000" pitchFamily="2" charset="0"/>
+              </a:rPr>
+              <a:t>g</a:t>
+            </a:r>
+            <a:r>
+              <a:rPr lang="es-MX" sz="2400" dirty="0" err="1" smtClean="0">
+                <a:solidFill>
+                  <a:schemeClr val="bg1">
+                    <a:lumMod val="50000"/>
+                  </a:schemeClr>
+                </a:solidFill>
+                <a:latin typeface="Roboto" panose="02000000000000000000" pitchFamily="2" charset="0"/>
+                <a:ea typeface="Roboto" panose="02000000000000000000" pitchFamily="2" charset="0"/>
+              </a:rPr>
+              <a:t>it</a:t>
+            </a:r>
+            <a:r>
+              <a:rPr lang="es-MX" sz="2400" dirty="0" smtClean="0">
+                <a:solidFill>
+                  <a:schemeClr val="bg1">
+                    <a:lumMod val="50000"/>
+                  </a:schemeClr>
+                </a:solidFill>
+                <a:latin typeface="Roboto" panose="02000000000000000000" pitchFamily="2" charset="0"/>
+                <a:ea typeface="Roboto" panose="02000000000000000000" pitchFamily="2" charset="0"/>
+              </a:rPr>
+              <a:t> </a:t>
+            </a:r>
+            <a:r>
+              <a:rPr lang="es-MX" sz="2400" dirty="0" err="1" smtClean="0">
+                <a:solidFill>
+                  <a:schemeClr val="bg1">
+                    <a:lumMod val="50000"/>
+                  </a:schemeClr>
+                </a:solidFill>
+                <a:latin typeface="Roboto" panose="02000000000000000000" pitchFamily="2" charset="0"/>
+                <a:ea typeface="Roboto" panose="02000000000000000000" pitchFamily="2" charset="0"/>
+              </a:rPr>
+              <a:t>push</a:t>
+            </a:r>
+            <a:r>
+              <a:rPr lang="es-MX" sz="2400" dirty="0" smtClean="0">
+                <a:solidFill>
+                  <a:schemeClr val="bg1">
+                    <a:lumMod val="50000"/>
+                  </a:schemeClr>
+                </a:solidFill>
+                <a:latin typeface="Roboto" panose="02000000000000000000" pitchFamily="2" charset="0"/>
+                <a:ea typeface="Roboto" panose="02000000000000000000" pitchFamily="2" charset="0"/>
+              </a:rPr>
+              <a:t> –u </a:t>
+            </a:r>
+            <a:r>
+              <a:rPr lang="es-MX" sz="2400" dirty="0" err="1" smtClean="0">
+                <a:solidFill>
+                  <a:schemeClr val="bg1">
+                    <a:lumMod val="50000"/>
+                  </a:schemeClr>
+                </a:solidFill>
+                <a:latin typeface="Roboto" panose="02000000000000000000" pitchFamily="2" charset="0"/>
+                <a:ea typeface="Roboto" panose="02000000000000000000" pitchFamily="2" charset="0"/>
+              </a:rPr>
+              <a:t>origin</a:t>
+            </a:r>
+            <a:r>
+              <a:rPr lang="es-MX" sz="2400" dirty="0" smtClean="0">
+                <a:solidFill>
+                  <a:schemeClr val="bg1">
+                    <a:lumMod val="50000"/>
+                  </a:schemeClr>
+                </a:solidFill>
+                <a:latin typeface="Roboto" panose="02000000000000000000" pitchFamily="2" charset="0"/>
+                <a:ea typeface="Roboto" panose="02000000000000000000" pitchFamily="2" charset="0"/>
+              </a:rPr>
+              <a:t> master</a:t>
+            </a:r>
+            <a:endParaRPr lang="es-MX" sz="2400" dirty="0">
+              <a:solidFill>
+                <a:schemeClr val="bg1">
+                  <a:lumMod val="50000"/>
+                </a:schemeClr>
+              </a:solidFill>
+              <a:latin typeface="Roboto" panose="02000000000000000000" pitchFamily="2" charset="0"/>
+              <a:ea typeface="Roboto" panose="02000000000000000000" pitchFamily="2" charset="0"/>
+            </a:endParaRPr>
+          </a:p>
+        </p:txBody>
+      </p:sp>
+    </p:spTree>
+    <p:extLst>
+      <p:ext uri="{BB962C8B-B14F-4D97-AF65-F5344CB8AC3E}">
+        <p14:creationId xmlns:p14="http://schemas.microsoft.com/office/powerpoint/2010/main" val="1060063928"/>
+      </p:ext>
+    </p:extLst>
+  </p:cSld>
+  <p:clrMapOvr>
+    <a:masterClrMapping/>
+  </p:clrMapOvr>
+  <p:timing>
+    <p:tnLst>
+      <p:par>
+        <p:cTn id="1" dur="indefinite" restart="never" nodeType="tmRoot"/>
+      </p:par>
+    </p:tnLst>
+  </p:timing>
+</p:sld>
+</file>
+
+<file path=ppt/slides/slide15.xml><?xml version="1.0" encoding="utf-8"?>
+<p:sld xmlns:a="http://schemas.openxmlformats.org/drawingml/2006/main" xmlns:r="http://schemas.openxmlformats.org/officeDocument/2006/relationships" xmlns:p="http://schemas.openxmlformats.org/presentationml/2006/main">
+  <p:cSld>
+    <p:spTree>
+      <p:nvGrpSpPr>
+        <p:cNvPr id="1" name=""/>
+        <p:cNvGrpSpPr/>
+        <p:nvPr/>
+      </p:nvGrpSpPr>
+      <p:grpSpPr>
+        <a:xfrm>
+          <a:off x="0" y="0"/>
+          <a:ext cx="0" cy="0"/>
+          <a:chOff x="0" y="0"/>
+          <a:chExt cx="0" cy="0"/>
+        </a:xfrm>
+      </p:grpSpPr>
+      <p:sp>
+        <p:nvSpPr>
+          <p:cNvPr id="2" name="Título 1"/>
+          <p:cNvSpPr>
+            <a:spLocks noGrp="1"/>
+          </p:cNvSpPr>
+          <p:nvPr>
+            <p:ph type="title"/>
+          </p:nvPr>
+        </p:nvSpPr>
+        <p:spPr/>
+        <p:txBody>
+          <a:bodyPr/>
+          <a:lstStyle/>
+          <a:p>
             <a:endParaRPr lang="es-MX" dirty="0"/>
           </a:p>
         </p:txBody>
@@ -3317,6 +5667,13 @@
   <p:clrMapOvr>
     <a:masterClrMapping/>
   </p:clrMapOvr>
+  <p:timing>
+    <p:tnLst>
+      <p:par>
+        <p:cTn id="1" dur="indefinite" restart="never" nodeType="tmRoot"/>
+      </p:par>
+    </p:tnLst>
+  </p:timing>
 </p:sld>
 </file>
 
@@ -3357,25 +5714,25 @@
             <a:r>
               <a:rPr lang="es-MX" sz="5000" dirty="0" smtClean="0">
                 <a:solidFill>
+                  <a:srgbClr val="D50F2E"/>
+                </a:solidFill>
+                <a:latin typeface="Roboto Black" panose="02000000000000000000" pitchFamily="2" charset="0"/>
+                <a:ea typeface="Roboto Black" panose="02000000000000000000" pitchFamily="2" charset="0"/>
+              </a:rPr>
+              <a:t>Datos</a:t>
+            </a:r>
+            <a:r>
+              <a:rPr lang="es-MX" sz="4000" dirty="0" smtClean="0">
+                <a:solidFill>
                   <a:srgbClr val="6A3093"/>
                 </a:solidFill>
                 <a:latin typeface="Roboto" panose="02000000000000000000" pitchFamily="2" charset="0"/>
                 <a:ea typeface="Roboto" panose="02000000000000000000" pitchFamily="2" charset="0"/>
               </a:rPr>
-              <a:t>Datos</a:t>
-            </a:r>
-            <a:r>
-              <a:rPr lang="es-MX" sz="4000" dirty="0" smtClean="0">
-                <a:solidFill>
-                  <a:srgbClr val="6A3093"/>
-                </a:solidFill>
-                <a:latin typeface="Roboto" panose="02000000000000000000" pitchFamily="2" charset="0"/>
-                <a:ea typeface="Roboto" panose="02000000000000000000" pitchFamily="2" charset="0"/>
-              </a:rPr>
               <a:t> </a:t>
             </a:r>
             <a:r>
-              <a:rPr lang="es-MX" sz="3000" dirty="0">
+              <a:rPr lang="es-MX" sz="2500" dirty="0">
                 <a:solidFill>
                   <a:schemeClr val="bg1">
                     <a:lumMod val="85000"/>
@@ -3399,7 +5756,7 @@
               <a:t> </a:t>
             </a:r>
             <a:r>
-              <a:rPr lang="es-MX" sz="4000" dirty="0" err="1" smtClean="0">
+              <a:rPr lang="es-MX" sz="3000" dirty="0" err="1">
                 <a:solidFill>
                   <a:schemeClr val="bg1">
                     <a:lumMod val="85000"/>
@@ -3420,9 +5777,21 @@
                 <a:latin typeface="Roboto" panose="02000000000000000000" pitchFamily="2" charset="0"/>
                 <a:ea typeface="Roboto" panose="02000000000000000000" pitchFamily="2" charset="0"/>
               </a:rPr>
-              <a:t> ]</a:t>
-            </a:r>
-            <a:endParaRPr lang="es-MX" sz="3000" dirty="0">
+              <a:t> </a:t>
+            </a:r>
+            <a:r>
+              <a:rPr lang="es-MX" sz="2500" dirty="0">
+                <a:solidFill>
+                  <a:schemeClr val="bg1">
+                    <a:lumMod val="85000"/>
+                  </a:schemeClr>
+                </a:solidFill>
+                <a:latin typeface="Roboto" panose="02000000000000000000" pitchFamily="2" charset="0"/>
+                <a:ea typeface="Roboto" panose="02000000000000000000" pitchFamily="2" charset="0"/>
+              </a:rPr>
+              <a:t>]</a:t>
+            </a:r>
+            <a:endParaRPr lang="es-MX" sz="2500" dirty="0">
               <a:solidFill>
                 <a:schemeClr val="bg1">
                   <a:lumMod val="85000"/>
@@ -3841,12 +6210,22 @@
             <a:r>
               <a:rPr lang="es-MX" sz="8000" dirty="0" smtClean="0">
                 <a:solidFill>
+                  <a:srgbClr val="D50F2E"/>
+                </a:solidFill>
+                <a:latin typeface="Roboto" panose="02000000000000000000" pitchFamily="2" charset="0"/>
+                <a:ea typeface="Roboto" panose="02000000000000000000" pitchFamily="2" charset="0"/>
+              </a:rPr>
+              <a:t>Instalación</a:t>
+            </a:r>
+            <a:r>
+              <a:rPr lang="es-MX" sz="8000" dirty="0" smtClean="0">
+                <a:solidFill>
                   <a:srgbClr val="6A3093"/>
                 </a:solidFill>
                 <a:latin typeface="Roboto" panose="02000000000000000000" pitchFamily="2" charset="0"/>
                 <a:ea typeface="Roboto" panose="02000000000000000000" pitchFamily="2" charset="0"/>
               </a:rPr>
-              <a:t>Instalación </a:t>
+              <a:t> </a:t>
             </a:r>
             <a:br>
               <a:rPr lang="es-MX" sz="8000" dirty="0" smtClean="0">
@@ -4169,19 +6548,7 @@
                   <a:latin typeface="Roboto" panose="02000000000000000000" pitchFamily="2" charset="0"/>
                   <a:ea typeface="Roboto" panose="02000000000000000000" pitchFamily="2" charset="0"/>
                 </a:rPr>
-                <a:t>G</a:t>
-              </a:r>
-              <a:r>
-                <a:rPr lang="es-MX" sz="2500" dirty="0" err="1">
-                  <a:solidFill>
-                    <a:schemeClr val="bg1">
-                      <a:lumMod val="65000"/>
-                    </a:schemeClr>
-                  </a:solidFill>
-                  <a:latin typeface="Roboto" panose="02000000000000000000" pitchFamily="2" charset="0"/>
-                  <a:ea typeface="Roboto" panose="02000000000000000000" pitchFamily="2" charset="0"/>
-                </a:rPr>
-                <a:t>it</a:t>
+                <a:t>Git</a:t>
               </a:r>
               <a:r>
                 <a:rPr lang="es-MX" sz="2500" dirty="0">
@@ -4508,26 +6875,38 @@
           <a:lstStyle/>
           <a:p>
             <a:r>
-              <a:rPr lang="es-MX" sz="5000" dirty="0" err="1" smtClean="0">
+              <a:rPr lang="es-MX" sz="5000" dirty="0" err="1">
+                <a:solidFill>
+                  <a:srgbClr val="D50F2E"/>
+                </a:solidFill>
+                <a:latin typeface="Roboto Black" panose="02000000000000000000" pitchFamily="2" charset="0"/>
+                <a:ea typeface="Roboto Black" panose="02000000000000000000" pitchFamily="2" charset="0"/>
+              </a:rPr>
+              <a:t>Config</a:t>
+            </a:r>
+            <a:r>
+              <a:rPr lang="es-MX" sz="5000" dirty="0" smtClean="0">
                 <a:solidFill>
                   <a:srgbClr val="6A3093"/>
                 </a:solidFill>
                 <a:latin typeface="Roboto" panose="02000000000000000000" pitchFamily="2" charset="0"/>
                 <a:ea typeface="Roboto" panose="02000000000000000000" pitchFamily="2" charset="0"/>
               </a:rPr>
-              <a:t>Config</a:t>
-            </a:r>
-            <a:r>
-              <a:rPr lang="es-MX" sz="5000" dirty="0" smtClean="0">
-                <a:solidFill>
-                  <a:srgbClr val="6A3093"/>
-                </a:solidFill>
-                <a:latin typeface="Roboto" panose="02000000000000000000" pitchFamily="2" charset="0"/>
-                <a:ea typeface="Roboto" panose="02000000000000000000" pitchFamily="2" charset="0"/>
-              </a:rPr>
               <a:t> </a:t>
             </a:r>
             <a:r>
+              <a:rPr lang="es-MX" sz="2500" dirty="0">
+                <a:solidFill>
+                  <a:schemeClr val="bg1">
+                    <a:lumMod val="85000"/>
+                  </a:schemeClr>
+                </a:solidFill>
+                <a:latin typeface="Roboto" panose="02000000000000000000" pitchFamily="2" charset="0"/>
+                <a:ea typeface="Roboto" panose="02000000000000000000" pitchFamily="2" charset="0"/>
+              </a:rPr>
+              <a:t>[</a:t>
+            </a:r>
+            <a:r>
               <a:rPr lang="es-MX" sz="3000" dirty="0" smtClean="0">
                 <a:solidFill>
                   <a:schemeClr val="bg1">
@@ -4537,10 +6916,10 @@
                 <a:latin typeface="Roboto" panose="02000000000000000000" pitchFamily="2" charset="0"/>
                 <a:ea typeface="Roboto" panose="02000000000000000000" pitchFamily="2" charset="0"/>
               </a:rPr>
-              <a:t>[ </a:t>
-            </a:r>
-            <a:r>
-              <a:rPr lang="es-MX" sz="4000" dirty="0" err="1" smtClean="0">
+              <a:t> </a:t>
+            </a:r>
+            <a:r>
+              <a:rPr lang="es-MX" sz="3000" dirty="0" err="1" smtClean="0">
                 <a:solidFill>
                   <a:schemeClr val="bg1">
                     <a:lumMod val="85000"/>
@@ -4564,7 +6943,7 @@
               <a:t> </a:t>
             </a:r>
             <a:r>
-              <a:rPr lang="es-MX" sz="3000" dirty="0" smtClean="0">
+              <a:rPr lang="es-MX" sz="2500" dirty="0" smtClean="0">
                 <a:solidFill>
                   <a:schemeClr val="bg1">
                     <a:lumMod val="85000"/>
@@ -4617,7 +6996,7 @@
         </p:spPr>
         <p:txBody>
           <a:bodyPr>
-            <a:normAutofit/>
+            <a:noAutofit/>
           </a:bodyPr>
           <a:lstStyle/>
           <a:p>
@@ -4980,6 +7359,135 @@
       </p:grpSpPr>
       <p:sp>
         <p:nvSpPr>
+          <p:cNvPr id="2" name="Título 1"/>
+          <p:cNvSpPr>
+            <a:spLocks noGrp="1"/>
+          </p:cNvSpPr>
+          <p:nvPr>
+            <p:ph type="title"/>
+          </p:nvPr>
+        </p:nvSpPr>
+        <p:spPr/>
+        <p:txBody>
+          <a:bodyPr/>
+          <a:lstStyle/>
+          <a:p>
+            <a:r>
+              <a:rPr lang="es-MX" sz="5000" dirty="0" err="1" smtClean="0">
+                <a:solidFill>
+                  <a:srgbClr val="D50F2E"/>
+                </a:solidFill>
+                <a:latin typeface="Roboto Black" panose="02000000000000000000" pitchFamily="2" charset="0"/>
+                <a:ea typeface="Roboto Black" panose="02000000000000000000" pitchFamily="2" charset="0"/>
+              </a:rPr>
+              <a:t>Check</a:t>
+            </a:r>
+            <a:r>
+              <a:rPr lang="es-MX" sz="5000" dirty="0" smtClean="0">
+                <a:solidFill>
+                  <a:srgbClr val="D50F2E"/>
+                </a:solidFill>
+                <a:latin typeface="Roboto Black" panose="02000000000000000000" pitchFamily="2" charset="0"/>
+                <a:ea typeface="Roboto Black" panose="02000000000000000000" pitchFamily="2" charset="0"/>
+              </a:rPr>
+              <a:t> SSH </a:t>
+            </a:r>
+            <a:r>
+              <a:rPr lang="es-MX" sz="5000" dirty="0" smtClean="0">
+                <a:solidFill>
+                  <a:srgbClr val="6A3093"/>
+                </a:solidFill>
+                <a:latin typeface="Roboto" panose="02000000000000000000" pitchFamily="2" charset="0"/>
+                <a:ea typeface="Roboto" panose="02000000000000000000" pitchFamily="2" charset="0"/>
+              </a:rPr>
+              <a:t> </a:t>
+            </a:r>
+            <a:r>
+              <a:rPr lang="es-MX" sz="2500" dirty="0">
+                <a:solidFill>
+                  <a:schemeClr val="bg1">
+                    <a:lumMod val="85000"/>
+                  </a:schemeClr>
+                </a:solidFill>
+                <a:latin typeface="Roboto" panose="02000000000000000000" pitchFamily="2" charset="0"/>
+                <a:ea typeface="Roboto" panose="02000000000000000000" pitchFamily="2" charset="0"/>
+              </a:rPr>
+              <a:t>[</a:t>
+            </a:r>
+            <a:r>
+              <a:rPr lang="es-MX" sz="3000" dirty="0" smtClean="0">
+                <a:solidFill>
+                  <a:schemeClr val="bg1">
+                    <a:lumMod val="85000"/>
+                  </a:schemeClr>
+                </a:solidFill>
+                <a:latin typeface="Roboto" panose="02000000000000000000" pitchFamily="2" charset="0"/>
+                <a:ea typeface="Roboto" panose="02000000000000000000" pitchFamily="2" charset="0"/>
+              </a:rPr>
+              <a:t> </a:t>
+            </a:r>
+            <a:r>
+              <a:rPr lang="es-MX" sz="3000" dirty="0" err="1" smtClean="0">
+                <a:solidFill>
+                  <a:schemeClr val="bg1">
+                    <a:lumMod val="85000"/>
+                  </a:schemeClr>
+                </a:solidFill>
+                <a:latin typeface="Roboto" panose="02000000000000000000" pitchFamily="2" charset="0"/>
+                <a:ea typeface="Roboto" panose="02000000000000000000" pitchFamily="2" charset="0"/>
+              </a:rPr>
+              <a:t>git</a:t>
+            </a:r>
+            <a:r>
+              <a:rPr lang="es-MX" sz="4000" dirty="0" smtClean="0">
+                <a:solidFill>
+                  <a:schemeClr val="bg1">
+                    <a:lumMod val="85000"/>
+                  </a:schemeClr>
+                </a:solidFill>
+                <a:latin typeface="Roboto" panose="02000000000000000000" pitchFamily="2" charset="0"/>
+                <a:ea typeface="Roboto" panose="02000000000000000000" pitchFamily="2" charset="0"/>
+              </a:rPr>
+              <a:t> </a:t>
+            </a:r>
+            <a:r>
+              <a:rPr lang="es-MX" sz="2500" dirty="0" smtClean="0">
+                <a:solidFill>
+                  <a:schemeClr val="bg1">
+                    <a:lumMod val="85000"/>
+                  </a:schemeClr>
+                </a:solidFill>
+                <a:latin typeface="Roboto" panose="02000000000000000000" pitchFamily="2" charset="0"/>
+                <a:ea typeface="Roboto" panose="02000000000000000000" pitchFamily="2" charset="0"/>
+              </a:rPr>
+              <a:t>]</a:t>
+            </a:r>
+            <a:r>
+              <a:rPr lang="es-MX" sz="4000" dirty="0" smtClean="0">
+                <a:solidFill>
+                  <a:schemeClr val="bg1">
+                    <a:lumMod val="85000"/>
+                  </a:schemeClr>
+                </a:solidFill>
+                <a:latin typeface="Roboto" panose="02000000000000000000" pitchFamily="2" charset="0"/>
+                <a:ea typeface="Roboto" panose="02000000000000000000" pitchFamily="2" charset="0"/>
+              </a:rPr>
+              <a:t> </a:t>
+            </a:r>
+            <a:endParaRPr lang="es-MX" sz="4000" dirty="0">
+              <a:solidFill>
+                <a:schemeClr val="bg1">
+                  <a:lumMod val="85000"/>
+                </a:schemeClr>
+              </a:solidFill>
+              <a:latin typeface="Roboto" panose="02000000000000000000" pitchFamily="2" charset="0"/>
+              <a:ea typeface="Roboto" panose="02000000000000000000" pitchFamily="2" charset="0"/>
+            </a:endParaRPr>
+          </a:p>
+        </p:txBody>
+      </p:sp>
+      <p:sp>
+        <p:nvSpPr>
           <p:cNvPr id="3" name="Marcador de contenido 2"/>
           <p:cNvSpPr>
             <a:spLocks noGrp="1"/>
@@ -4990,19 +7498,21 @@
         </p:nvSpPr>
         <p:spPr>
           <a:xfrm>
-            <a:off x="862913" y="2333840"/>
+            <a:off x="838200" y="2333840"/>
             <a:ext cx="10515600" cy="2190321"/>
           </a:xfrm>
         </p:spPr>
         <p:txBody>
-          <a:bodyPr/>
+          <a:bodyPr>
+            <a:noAutofit/>
+          </a:bodyPr>
           <a:lstStyle/>
           <a:p>
             <a:pPr marL="0" indent="0">
               <a:buNone/>
             </a:pPr>
             <a:r>
-              <a:rPr lang="es-MX" sz="2200" dirty="0">
+              <a:rPr lang="es-MX" sz="2200" dirty="0" smtClean="0">
                 <a:solidFill>
                   <a:schemeClr val="bg1">
                     <a:lumMod val="75000"/>
@@ -5011,127 +7521,59 @@
                 <a:latin typeface="Roboto" panose="02000000000000000000" pitchFamily="2" charset="0"/>
                 <a:ea typeface="Roboto" panose="02000000000000000000" pitchFamily="2" charset="0"/>
               </a:rPr>
-              <a:t>Iniciar </a:t>
-            </a:r>
-            <a:r>
-              <a:rPr lang="es-MX" sz="2200" dirty="0" err="1">
-                <a:solidFill>
-                  <a:schemeClr val="bg1">
-                    <a:lumMod val="75000"/>
-                  </a:schemeClr>
-                </a:solidFill>
-                <a:latin typeface="Roboto" panose="02000000000000000000" pitchFamily="2" charset="0"/>
-                <a:ea typeface="Roboto" panose="02000000000000000000" pitchFamily="2" charset="0"/>
-              </a:rPr>
-              <a:t>git</a:t>
-            </a:r>
-            <a:r>
-              <a:rPr lang="es-MX" sz="2200" dirty="0">
-                <a:solidFill>
-                  <a:schemeClr val="bg1">
-                    <a:lumMod val="75000"/>
-                  </a:schemeClr>
-                </a:solidFill>
-                <a:latin typeface="Roboto" panose="02000000000000000000" pitchFamily="2" charset="0"/>
-                <a:ea typeface="Roboto" panose="02000000000000000000" pitchFamily="2" charset="0"/>
-              </a:rPr>
-              <a:t> en folder</a:t>
-            </a:r>
+              <a:t>Checar claves</a:t>
+            </a:r>
+            <a:endParaRPr lang="es-MX" sz="2200" dirty="0" smtClean="0">
+              <a:solidFill>
+                <a:schemeClr val="bg1">
+                  <a:lumMod val="75000"/>
+                </a:schemeClr>
+              </a:solidFill>
+              <a:latin typeface="Roboto" panose="02000000000000000000" pitchFamily="2" charset="0"/>
+              <a:ea typeface="Roboto" panose="02000000000000000000" pitchFamily="2" charset="0"/>
+            </a:endParaRPr>
           </a:p>
           <a:p>
             <a:pPr marL="0" indent="0">
               <a:buNone/>
             </a:pPr>
             <a:r>
-              <a:rPr lang="es-MX" sz="2400" dirty="0" err="1">
-                <a:solidFill>
-                  <a:schemeClr val="bg1">
-                    <a:lumMod val="50000"/>
-                  </a:schemeClr>
-                </a:solidFill>
-                <a:latin typeface="Roboto" panose="02000000000000000000" pitchFamily="2" charset="0"/>
-                <a:ea typeface="Roboto" panose="02000000000000000000" pitchFamily="2" charset="0"/>
-              </a:rPr>
-              <a:t>git</a:t>
-            </a:r>
-            <a:r>
-              <a:rPr lang="es-MX" sz="2400" dirty="0">
-                <a:solidFill>
-                  <a:schemeClr val="bg1">
-                    <a:lumMod val="50000"/>
-                  </a:schemeClr>
-                </a:solidFill>
-                <a:latin typeface="Roboto" panose="02000000000000000000" pitchFamily="2" charset="0"/>
-                <a:ea typeface="Roboto" panose="02000000000000000000" pitchFamily="2" charset="0"/>
-              </a:rPr>
-              <a:t> </a:t>
-            </a:r>
-            <a:r>
-              <a:rPr lang="es-MX" sz="2400" dirty="0" err="1">
-                <a:solidFill>
-                  <a:schemeClr val="bg1">
-                    <a:lumMod val="50000"/>
-                  </a:schemeClr>
-                </a:solidFill>
-                <a:latin typeface="Roboto" panose="02000000000000000000" pitchFamily="2" charset="0"/>
-                <a:ea typeface="Roboto" panose="02000000000000000000" pitchFamily="2" charset="0"/>
-              </a:rPr>
-              <a:t>init</a:t>
-            </a:r>
-            <a:r>
-              <a:rPr lang="es-MX" sz="2400" dirty="0">
-                <a:solidFill>
-                  <a:schemeClr val="bg1">
-                    <a:lumMod val="50000"/>
-                  </a:schemeClr>
-                </a:solidFill>
-                <a:latin typeface="Roboto" panose="02000000000000000000" pitchFamily="2" charset="0"/>
-                <a:ea typeface="Roboto" panose="02000000000000000000" pitchFamily="2" charset="0"/>
-              </a:rPr>
-              <a:t> </a:t>
-            </a:r>
-            <a:r>
-              <a:rPr lang="es-MX" sz="2000" dirty="0">
-                <a:solidFill>
-                  <a:schemeClr val="bg1">
-                    <a:lumMod val="50000"/>
-                  </a:schemeClr>
-                </a:solidFill>
-                <a:latin typeface="Roboto" panose="02000000000000000000" pitchFamily="2" charset="0"/>
-                <a:ea typeface="Roboto" panose="02000000000000000000" pitchFamily="2" charset="0"/>
-              </a:rPr>
-              <a:t>[</a:t>
-            </a:r>
-            <a:r>
-              <a:rPr lang="es-MX" sz="2400" dirty="0">
-                <a:solidFill>
-                  <a:schemeClr val="bg1">
-                    <a:lumMod val="50000"/>
-                  </a:schemeClr>
-                </a:solidFill>
-                <a:latin typeface="Roboto" panose="02000000000000000000" pitchFamily="2" charset="0"/>
-                <a:ea typeface="Roboto" panose="02000000000000000000" pitchFamily="2" charset="0"/>
-              </a:rPr>
-              <a:t>nombre repo</a:t>
-            </a:r>
-            <a:r>
-              <a:rPr lang="es-MX" sz="2000" dirty="0" smtClean="0">
-                <a:solidFill>
-                  <a:schemeClr val="bg1">
-                    <a:lumMod val="50000"/>
-                  </a:schemeClr>
-                </a:solidFill>
-                <a:latin typeface="Roboto" panose="02000000000000000000" pitchFamily="2" charset="0"/>
-                <a:ea typeface="Roboto" panose="02000000000000000000" pitchFamily="2" charset="0"/>
-              </a:rPr>
-              <a:t>]</a:t>
-            </a:r>
-          </a:p>
-          <a:p>
-            <a:pPr marL="0" indent="0">
-              <a:buNone/>
-            </a:pPr>
-            <a:endParaRPr lang="es-MX" sz="2000" dirty="0">
+              <a:rPr lang="es-MX" sz="2400" dirty="0" err="1" smtClean="0">
+                <a:solidFill>
+                  <a:schemeClr val="bg1">
+                    <a:lumMod val="50000"/>
+                  </a:schemeClr>
+                </a:solidFill>
+                <a:latin typeface="Roboto" panose="02000000000000000000" pitchFamily="2" charset="0"/>
+                <a:ea typeface="Roboto" panose="02000000000000000000" pitchFamily="2" charset="0"/>
+              </a:rPr>
+              <a:t>ls</a:t>
+            </a:r>
+            <a:r>
+              <a:rPr lang="es-MX" sz="2400" dirty="0" smtClean="0">
+                <a:solidFill>
+                  <a:schemeClr val="bg1">
+                    <a:lumMod val="50000"/>
+                  </a:schemeClr>
+                </a:solidFill>
+                <a:latin typeface="Roboto" panose="02000000000000000000" pitchFamily="2" charset="0"/>
+                <a:ea typeface="Roboto" panose="02000000000000000000" pitchFamily="2" charset="0"/>
+              </a:rPr>
+              <a:t> –al ~/.</a:t>
+            </a:r>
+            <a:r>
+              <a:rPr lang="es-MX" sz="2400" dirty="0" err="1" smtClean="0">
+                <a:solidFill>
+                  <a:schemeClr val="bg1">
+                    <a:lumMod val="50000"/>
+                  </a:schemeClr>
+                </a:solidFill>
+                <a:latin typeface="Roboto" panose="02000000000000000000" pitchFamily="2" charset="0"/>
+                <a:ea typeface="Roboto" panose="02000000000000000000" pitchFamily="2" charset="0"/>
+              </a:rPr>
+              <a:t>ssh</a:t>
+            </a:r>
+            <a:endParaRPr lang="es-MX" sz="2400" dirty="0" smtClean="0">
               <a:solidFill>
                 <a:schemeClr val="bg1">
                   <a:lumMod val="50000"/>
@@ -5142,24 +7584,24 @@
             </a:endParaRPr>
           </a:p>
           <a:p>
-            <a:pPr marL="0" indent="0">
+            <a:pPr marL="457200" lvl="1" indent="0" fontAlgn="base">
               <a:buNone/>
             </a:pPr>
             <a:r>
-              <a:rPr lang="es-MX" sz="2200" dirty="0">
-                <a:solidFill>
-                  <a:schemeClr val="bg1">
+              <a:rPr lang="es-MX" dirty="0" smtClean="0">
+                <a:solidFill>
+                  <a:schemeClr val="accent2">
                     <a:lumMod val="75000"/>
                   </a:schemeClr>
                 </a:solidFill>
                 <a:latin typeface="Roboto" panose="02000000000000000000" pitchFamily="2" charset="0"/>
                 <a:ea typeface="Roboto" panose="02000000000000000000" pitchFamily="2" charset="0"/>
               </a:rPr>
-              <a:t>Agregar los archivos existentes</a:t>
-            </a:r>
-            <a:endParaRPr lang="es-MX" sz="2200" dirty="0">
+              <a:t>&gt; id_dsa.pub</a:t>
+            </a:r>
+            <a:endParaRPr lang="es-MX" dirty="0">
               <a:solidFill>
-                <a:schemeClr val="bg1">
+                <a:schemeClr val="accent2">
                   <a:lumMod val="75000"/>
                 </a:schemeClr>
               </a:solidFill>
@@ -5168,246 +7610,77 @@
             </a:endParaRPr>
           </a:p>
           <a:p>
-            <a:pPr marL="0" indent="0">
+            <a:pPr marL="457200" lvl="1" indent="0" fontAlgn="base">
               <a:buNone/>
             </a:pPr>
             <a:r>
-              <a:rPr lang="es-MX" sz="2400" dirty="0" err="1" smtClean="0">
-                <a:solidFill>
-                  <a:schemeClr val="bg1">
-                    <a:lumMod val="50000"/>
-                  </a:schemeClr>
-                </a:solidFill>
-                <a:latin typeface="Roboto" panose="02000000000000000000" pitchFamily="2" charset="0"/>
-                <a:ea typeface="Roboto" panose="02000000000000000000" pitchFamily="2" charset="0"/>
-              </a:rPr>
-              <a:t>git</a:t>
-            </a:r>
-            <a:r>
-              <a:rPr lang="es-MX" sz="2400" dirty="0" smtClean="0">
-                <a:solidFill>
-                  <a:schemeClr val="bg1">
-                    <a:lumMod val="50000"/>
-                  </a:schemeClr>
-                </a:solidFill>
-                <a:latin typeface="Roboto" panose="02000000000000000000" pitchFamily="2" charset="0"/>
-                <a:ea typeface="Roboto" panose="02000000000000000000" pitchFamily="2" charset="0"/>
-              </a:rPr>
-              <a:t> </a:t>
-            </a:r>
-            <a:r>
-              <a:rPr lang="es-MX" sz="2400" dirty="0" err="1">
-                <a:solidFill>
-                  <a:schemeClr val="bg1">
-                    <a:lumMod val="50000"/>
-                  </a:schemeClr>
-                </a:solidFill>
-                <a:latin typeface="Roboto" panose="02000000000000000000" pitchFamily="2" charset="0"/>
-                <a:ea typeface="Roboto" panose="02000000000000000000" pitchFamily="2" charset="0"/>
-              </a:rPr>
-              <a:t>add</a:t>
-            </a:r>
-            <a:r>
-              <a:rPr lang="es-MX" sz="2400" dirty="0">
-                <a:solidFill>
-                  <a:schemeClr val="bg1">
-                    <a:lumMod val="50000"/>
-                  </a:schemeClr>
-                </a:solidFill>
-                <a:latin typeface="Roboto" panose="02000000000000000000" pitchFamily="2" charset="0"/>
-                <a:ea typeface="Roboto" panose="02000000000000000000" pitchFamily="2" charset="0"/>
-              </a:rPr>
-              <a:t> </a:t>
-            </a:r>
-            <a:r>
-              <a:rPr lang="es-MX" sz="2400" dirty="0" smtClean="0">
-                <a:solidFill>
-                  <a:schemeClr val="bg1">
-                    <a:lumMod val="50000"/>
-                  </a:schemeClr>
-                </a:solidFill>
-                <a:latin typeface="Roboto" panose="02000000000000000000" pitchFamily="2" charset="0"/>
-                <a:ea typeface="Roboto" panose="02000000000000000000" pitchFamily="2" charset="0"/>
-              </a:rPr>
-              <a:t>. </a:t>
-            </a:r>
-            <a:r>
-              <a:rPr lang="es-MX" sz="2400" dirty="0">
-                <a:solidFill>
-                  <a:schemeClr val="bg1">
-                    <a:lumMod val="50000"/>
-                  </a:schemeClr>
-                </a:solidFill>
-                <a:latin typeface="Roboto" panose="02000000000000000000" pitchFamily="2" charset="0"/>
-                <a:ea typeface="Roboto" panose="02000000000000000000" pitchFamily="2" charset="0"/>
-              </a:rPr>
-              <a:t>	</a:t>
-            </a:r>
-            <a:r>
-              <a:rPr lang="es-MX" sz="2400" dirty="0" err="1">
-                <a:solidFill>
-                  <a:schemeClr val="bg1">
-                    <a:lumMod val="50000"/>
-                  </a:schemeClr>
-                </a:solidFill>
-                <a:latin typeface="Roboto" panose="02000000000000000000" pitchFamily="2" charset="0"/>
-                <a:ea typeface="Roboto" panose="02000000000000000000" pitchFamily="2" charset="0"/>
-              </a:rPr>
-              <a:t>g</a:t>
-            </a:r>
-            <a:r>
-              <a:rPr lang="es-MX" sz="2400" dirty="0" err="1" smtClean="0">
-                <a:solidFill>
-                  <a:schemeClr val="bg1">
-                    <a:lumMod val="50000"/>
-                  </a:schemeClr>
-                </a:solidFill>
-                <a:latin typeface="Roboto" panose="02000000000000000000" pitchFamily="2" charset="0"/>
-                <a:ea typeface="Roboto" panose="02000000000000000000" pitchFamily="2" charset="0"/>
-              </a:rPr>
-              <a:t>it</a:t>
-            </a:r>
-            <a:r>
-              <a:rPr lang="es-MX" sz="2400" dirty="0" smtClean="0">
-                <a:solidFill>
-                  <a:schemeClr val="bg1">
-                    <a:lumMod val="50000"/>
-                  </a:schemeClr>
-                </a:solidFill>
-                <a:latin typeface="Roboto" panose="02000000000000000000" pitchFamily="2" charset="0"/>
-                <a:ea typeface="Roboto" panose="02000000000000000000" pitchFamily="2" charset="0"/>
-              </a:rPr>
-              <a:t> </a:t>
-            </a:r>
-            <a:r>
-              <a:rPr lang="es-MX" sz="2400" dirty="0" err="1" smtClean="0">
-                <a:solidFill>
-                  <a:schemeClr val="bg1">
-                    <a:lumMod val="50000"/>
-                  </a:schemeClr>
-                </a:solidFill>
-                <a:latin typeface="Roboto" panose="02000000000000000000" pitchFamily="2" charset="0"/>
-                <a:ea typeface="Roboto" panose="02000000000000000000" pitchFamily="2" charset="0"/>
-              </a:rPr>
-              <a:t>add</a:t>
-            </a:r>
-            <a:r>
-              <a:rPr lang="es-MX" sz="2400" dirty="0" smtClean="0">
-                <a:solidFill>
-                  <a:schemeClr val="bg1">
-                    <a:lumMod val="50000"/>
-                  </a:schemeClr>
-                </a:solidFill>
-                <a:latin typeface="Roboto" panose="02000000000000000000" pitchFamily="2" charset="0"/>
-                <a:ea typeface="Roboto" panose="02000000000000000000" pitchFamily="2" charset="0"/>
-              </a:rPr>
-              <a:t> --</a:t>
-            </a:r>
-            <a:r>
-              <a:rPr lang="es-MX" sz="2400" dirty="0" err="1" smtClean="0">
-                <a:solidFill>
-                  <a:schemeClr val="bg1">
-                    <a:lumMod val="50000"/>
-                  </a:schemeClr>
-                </a:solidFill>
-                <a:latin typeface="Roboto" panose="02000000000000000000" pitchFamily="2" charset="0"/>
-                <a:ea typeface="Roboto" panose="02000000000000000000" pitchFamily="2" charset="0"/>
-              </a:rPr>
-              <a:t>all</a:t>
-            </a:r>
-            <a:r>
-              <a:rPr lang="es-MX" sz="2400" dirty="0">
-                <a:solidFill>
-                  <a:schemeClr val="bg1">
-                    <a:lumMod val="50000"/>
-                  </a:schemeClr>
-                </a:solidFill>
-                <a:latin typeface="Roboto" panose="02000000000000000000" pitchFamily="2" charset="0"/>
-                <a:ea typeface="Roboto" panose="02000000000000000000" pitchFamily="2" charset="0"/>
-              </a:rPr>
-              <a:t>	</a:t>
-            </a:r>
-            <a:r>
-              <a:rPr lang="es-MX" sz="2400" dirty="0" smtClean="0">
-                <a:solidFill>
-                  <a:schemeClr val="bg1">
-                    <a:lumMod val="50000"/>
-                  </a:schemeClr>
-                </a:solidFill>
-                <a:latin typeface="Roboto" panose="02000000000000000000" pitchFamily="2" charset="0"/>
-                <a:ea typeface="Roboto" panose="02000000000000000000" pitchFamily="2" charset="0"/>
-              </a:rPr>
-              <a:t>	</a:t>
-            </a:r>
-            <a:r>
-              <a:rPr lang="es-MX" sz="2400" dirty="0" err="1" smtClean="0">
-                <a:solidFill>
-                  <a:schemeClr val="bg1">
-                    <a:lumMod val="50000"/>
-                  </a:schemeClr>
-                </a:solidFill>
-                <a:latin typeface="Roboto" panose="02000000000000000000" pitchFamily="2" charset="0"/>
-                <a:ea typeface="Roboto" panose="02000000000000000000" pitchFamily="2" charset="0"/>
-              </a:rPr>
-              <a:t>git</a:t>
-            </a:r>
-            <a:r>
-              <a:rPr lang="es-MX" sz="2400" dirty="0" smtClean="0">
-                <a:solidFill>
-                  <a:schemeClr val="bg1">
-                    <a:lumMod val="50000"/>
-                  </a:schemeClr>
-                </a:solidFill>
-                <a:latin typeface="Roboto" panose="02000000000000000000" pitchFamily="2" charset="0"/>
-                <a:ea typeface="Roboto" panose="02000000000000000000" pitchFamily="2" charset="0"/>
-              </a:rPr>
-              <a:t> </a:t>
-            </a:r>
-            <a:r>
-              <a:rPr lang="es-MX" sz="2400" dirty="0" err="1" smtClean="0">
-                <a:solidFill>
-                  <a:schemeClr val="bg1">
-                    <a:lumMod val="50000"/>
-                  </a:schemeClr>
-                </a:solidFill>
-                <a:latin typeface="Roboto" panose="02000000000000000000" pitchFamily="2" charset="0"/>
-                <a:ea typeface="Roboto" panose="02000000000000000000" pitchFamily="2" charset="0"/>
-              </a:rPr>
-              <a:t>add</a:t>
-            </a:r>
-            <a:r>
-              <a:rPr lang="es-MX" sz="2400" dirty="0">
-                <a:solidFill>
-                  <a:schemeClr val="bg1">
-                    <a:lumMod val="50000"/>
-                  </a:schemeClr>
-                </a:solidFill>
-                <a:latin typeface="Roboto" panose="02000000000000000000" pitchFamily="2" charset="0"/>
-                <a:ea typeface="Roboto" panose="02000000000000000000" pitchFamily="2" charset="0"/>
-              </a:rPr>
-              <a:t> </a:t>
-            </a:r>
-            <a:r>
-              <a:rPr lang="es-MX" sz="2400" dirty="0" smtClean="0">
-                <a:solidFill>
-                  <a:schemeClr val="bg1">
-                    <a:lumMod val="50000"/>
-                  </a:schemeClr>
-                </a:solidFill>
-                <a:latin typeface="Roboto" panose="02000000000000000000" pitchFamily="2" charset="0"/>
-                <a:ea typeface="Roboto" panose="02000000000000000000" pitchFamily="2" charset="0"/>
-              </a:rPr>
-              <a:t>--u</a:t>
-            </a:r>
-          </a:p>
-          <a:p>
-            <a:pPr marL="0" indent="0">
+              <a:rPr lang="es-MX" dirty="0" smtClean="0">
+                <a:solidFill>
+                  <a:schemeClr val="accent2">
+                    <a:lumMod val="75000"/>
+                  </a:schemeClr>
+                </a:solidFill>
+                <a:latin typeface="Roboto" panose="02000000000000000000" pitchFamily="2" charset="0"/>
+                <a:ea typeface="Roboto" panose="02000000000000000000" pitchFamily="2" charset="0"/>
+              </a:rPr>
+              <a:t>&gt; id_ecdsa.pub</a:t>
+            </a:r>
+            <a:endParaRPr lang="es-MX" dirty="0">
+              <a:solidFill>
+                <a:schemeClr val="accent2">
+                  <a:lumMod val="75000"/>
+                </a:schemeClr>
+              </a:solidFill>
+              <a:latin typeface="Roboto" panose="02000000000000000000" pitchFamily="2" charset="0"/>
+              <a:ea typeface="Roboto" panose="02000000000000000000" pitchFamily="2" charset="0"/>
+            </a:endParaRPr>
+          </a:p>
+          <a:p>
+            <a:pPr marL="457200" lvl="1" indent="0" fontAlgn="base">
               <a:buNone/>
             </a:pPr>
-            <a:endParaRPr lang="es-MX" sz="2400" dirty="0" smtClean="0">
+            <a:r>
+              <a:rPr lang="es-MX" dirty="0" smtClean="0">
+                <a:solidFill>
+                  <a:schemeClr val="accent2">
+                    <a:lumMod val="75000"/>
+                  </a:schemeClr>
+                </a:solidFill>
+                <a:latin typeface="Roboto" panose="02000000000000000000" pitchFamily="2" charset="0"/>
+                <a:ea typeface="Roboto" panose="02000000000000000000" pitchFamily="2" charset="0"/>
+              </a:rPr>
+              <a:t>&gt; id_ed25519.pub</a:t>
+            </a:r>
+            <a:endParaRPr lang="es-MX" dirty="0">
               <a:solidFill>
-                <a:schemeClr val="bg1">
-                  <a:lumMod val="50000"/>
+                <a:schemeClr val="accent2">
+                  <a:lumMod val="75000"/>
+                </a:schemeClr>
+              </a:solidFill>
+              <a:latin typeface="Roboto" panose="02000000000000000000" pitchFamily="2" charset="0"/>
+              <a:ea typeface="Roboto" panose="02000000000000000000" pitchFamily="2" charset="0"/>
+            </a:endParaRPr>
+          </a:p>
+          <a:p>
+            <a:pPr marL="457200" lvl="1" indent="0" fontAlgn="base">
+              <a:buNone/>
+            </a:pPr>
+            <a:r>
+              <a:rPr lang="es-MX" dirty="0" smtClean="0">
+                <a:solidFill>
+                  <a:schemeClr val="accent2">
+                    <a:lumMod val="75000"/>
+                  </a:schemeClr>
+                </a:solidFill>
+                <a:latin typeface="Roboto" panose="02000000000000000000" pitchFamily="2" charset="0"/>
+                <a:ea typeface="Roboto" panose="02000000000000000000" pitchFamily="2" charset="0"/>
+              </a:rPr>
+              <a:t>&gt; id_rsa.pub</a:t>
+            </a:r>
+            <a:endParaRPr lang="es-MX" dirty="0">
+              <a:solidFill>
+                <a:schemeClr val="accent2">
+                  <a:lumMod val="75000"/>
                 </a:schemeClr>
               </a:solidFill>
               <a:latin typeface="Roboto" panose="02000000000000000000" pitchFamily="2" charset="0"/>
@@ -5428,155 +7701,12 @@
               <a:ea typeface="Roboto" panose="02000000000000000000" pitchFamily="2" charset="0"/>
             </a:endParaRPr>
           </a:p>
-          <a:p>
-            <a:pPr marL="0" indent="0">
-              <a:buNone/>
-            </a:pPr>
-            <a:endParaRPr lang="es-MX" dirty="0">
-              <a:solidFill>
-                <a:schemeClr val="bg1">
-                  <a:lumMod val="75000"/>
-                </a:schemeClr>
-              </a:solidFill>
-              <a:latin typeface="Roboto" panose="02000000000000000000" pitchFamily="2" charset="0"/>
-              <a:ea typeface="Roboto" panose="02000000000000000000" pitchFamily="2" charset="0"/>
-            </a:endParaRPr>
-          </a:p>
-          <a:p>
-            <a:pPr marL="0" indent="0">
-              <a:buNone/>
-            </a:pPr>
-            <a:endParaRPr lang="es-MX" dirty="0"/>
-          </a:p>
-        </p:txBody>
-      </p:sp>
-      <p:sp>
-        <p:nvSpPr>
-          <p:cNvPr id="4" name="Título 1"/>
-          <p:cNvSpPr txBox="1">
-            <a:spLocks/>
-          </p:cNvSpPr>
-          <p:nvPr/>
-        </p:nvSpPr>
-        <p:spPr>
-          <a:xfrm>
-            <a:off x="862913" y="393956"/>
-            <a:ext cx="10515600" cy="1325563"/>
-          </a:xfrm>
-          <a:prstGeom prst="rect">
-            <a:avLst/>
-          </a:prstGeom>
-        </p:spPr>
-        <p:txBody>
-          <a:bodyPr vert="horz" lIns="91440" tIns="45720" rIns="91440" bIns="45720" rtlCol="0" anchor="ctr">
-            <a:normAutofit/>
-          </a:bodyPr>
-          <a:lstStyle>
-            <a:lvl1pPr algn="l" defTabSz="914400" rtl="0" eaLnBrk="1" latinLnBrk="0" hangingPunct="1">
-              <a:lnSpc>
-                <a:spcPct val="90000"/>
-              </a:lnSpc>
-              <a:spcBef>
-                <a:spcPct val="0"/>
-              </a:spcBef>
-              <a:buNone/>
-              <a:defRPr sz="4400" kern="1200">
-                <a:solidFill>
-                  <a:schemeClr val="tx1"/>
-                </a:solidFill>
-                <a:latin typeface="+mj-lt"/>
-                <a:ea typeface="+mj-ea"/>
-                <a:cs typeface="+mj-cs"/>
-              </a:defRPr>
-            </a:lvl1pPr>
-          </a:lstStyle>
-          <a:p>
-            <a:r>
-              <a:rPr lang="es-MX" sz="5000" dirty="0">
-                <a:solidFill>
-                  <a:srgbClr val="6A3093"/>
-                </a:solidFill>
-                <a:latin typeface="Roboto" panose="02000000000000000000" pitchFamily="2" charset="0"/>
-                <a:ea typeface="Roboto" panose="02000000000000000000" pitchFamily="2" charset="0"/>
-              </a:rPr>
-              <a:t>Crear repositorio </a:t>
-            </a:r>
-            <a:r>
-              <a:rPr lang="es-MX" sz="3000" dirty="0" smtClean="0">
-                <a:solidFill>
-                  <a:schemeClr val="bg1">
-                    <a:lumMod val="85000"/>
-                  </a:schemeClr>
-                </a:solidFill>
-                <a:latin typeface="Roboto" panose="02000000000000000000" pitchFamily="2" charset="0"/>
-                <a:ea typeface="Roboto" panose="02000000000000000000" pitchFamily="2" charset="0"/>
-              </a:rPr>
-              <a:t>[ </a:t>
-            </a:r>
-            <a:r>
-              <a:rPr lang="es-MX" sz="4000" dirty="0" err="1" smtClean="0">
-                <a:solidFill>
-                  <a:schemeClr val="bg1">
-                    <a:lumMod val="85000"/>
-                  </a:schemeClr>
-                </a:solidFill>
-                <a:latin typeface="Roboto" panose="02000000000000000000" pitchFamily="2" charset="0"/>
-                <a:ea typeface="Roboto" panose="02000000000000000000" pitchFamily="2" charset="0"/>
-              </a:rPr>
-              <a:t>git</a:t>
-            </a:r>
-            <a:r>
-              <a:rPr lang="es-MX" sz="4000" dirty="0" smtClean="0">
-                <a:solidFill>
-                  <a:schemeClr val="bg1">
-                    <a:lumMod val="85000"/>
-                  </a:schemeClr>
-                </a:solidFill>
-                <a:latin typeface="Roboto" panose="02000000000000000000" pitchFamily="2" charset="0"/>
-                <a:ea typeface="Roboto" panose="02000000000000000000" pitchFamily="2" charset="0"/>
-              </a:rPr>
-              <a:t> </a:t>
-            </a:r>
-            <a:r>
-              <a:rPr lang="es-MX" sz="3000" dirty="0" smtClean="0">
-                <a:solidFill>
-                  <a:schemeClr val="bg1">
-                    <a:lumMod val="85000"/>
-                  </a:schemeClr>
-                </a:solidFill>
-                <a:latin typeface="Roboto" panose="02000000000000000000" pitchFamily="2" charset="0"/>
-                <a:ea typeface="Roboto" panose="02000000000000000000" pitchFamily="2" charset="0"/>
-              </a:rPr>
-              <a:t>]</a:t>
-            </a:r>
-            <a:r>
-              <a:rPr lang="es-MX" sz="4000" dirty="0" smtClean="0">
-                <a:solidFill>
-                  <a:schemeClr val="bg1">
-                    <a:lumMod val="85000"/>
-                  </a:schemeClr>
-                </a:solidFill>
-                <a:latin typeface="Roboto" panose="02000000000000000000" pitchFamily="2" charset="0"/>
-                <a:ea typeface="Roboto" panose="02000000000000000000" pitchFamily="2" charset="0"/>
-              </a:rPr>
-              <a:t> </a:t>
-            </a:r>
-            <a:endParaRPr lang="es-MX" sz="4000" dirty="0">
-              <a:solidFill>
-                <a:schemeClr val="bg1">
-                  <a:lumMod val="85000"/>
-                </a:schemeClr>
-              </a:solidFill>
-              <a:latin typeface="Roboto" panose="02000000000000000000" pitchFamily="2" charset="0"/>
-              <a:ea typeface="Roboto" panose="02000000000000000000" pitchFamily="2" charset="0"/>
-            </a:endParaRPr>
-          </a:p>
         </p:txBody>
       </p:sp>
     </p:spTree>
     <p:extLst>
       <p:ext uri="{BB962C8B-B14F-4D97-AF65-F5344CB8AC3E}">
-        <p14:creationId xmlns:p14="http://schemas.microsoft.com/office/powerpoint/2010/main" val="2285823744"/>
+        <p14:creationId xmlns:p14="http://schemas.microsoft.com/office/powerpoint/2010/main" val="903624983"/>
       </p:ext>
     </p:extLst>
   </p:cSld>
@@ -5612,54 +7742,50 @@
       </p:grpSpPr>
       <p:sp>
         <p:nvSpPr>
-          <p:cNvPr id="4" name="Título 1"/>
-          <p:cNvSpPr txBox="1">
-            <a:spLocks/>
-          </p:cNvSpPr>
-          <p:nvPr/>
-        </p:nvSpPr>
-        <p:spPr>
-          <a:xfrm>
-            <a:off x="862913" y="393956"/>
-            <a:ext cx="8639433" cy="1325563"/>
-          </a:xfrm>
-          <a:prstGeom prst="rect">
-            <a:avLst/>
-          </a:prstGeom>
-        </p:spPr>
-        <p:txBody>
-          <a:bodyPr vert="horz" lIns="91440" tIns="45720" rIns="91440" bIns="45720" rtlCol="0" anchor="ctr">
-            <a:normAutofit/>
-          </a:bodyPr>
-          <a:lstStyle>
-            <a:lvl1pPr algn="l" defTabSz="914400" rtl="0" eaLnBrk="1" latinLnBrk="0" hangingPunct="1">
-              <a:lnSpc>
-                <a:spcPct val="90000"/>
-              </a:lnSpc>
-              <a:spcBef>
-                <a:spcPct val="0"/>
-              </a:spcBef>
-              <a:buNone/>
-              <a:defRPr sz="4400" kern="1200">
-                <a:solidFill>
-                  <a:schemeClr val="tx1"/>
-                </a:solidFill>
-                <a:latin typeface="+mj-lt"/>
-                <a:ea typeface="+mj-ea"/>
-                <a:cs typeface="+mj-cs"/>
-              </a:defRPr>
-            </a:lvl1pPr>
-          </a:lstStyle>
+          <p:cNvPr id="2" name="Título 1"/>
+          <p:cNvSpPr>
+            <a:spLocks noGrp="1"/>
+          </p:cNvSpPr>
+          <p:nvPr>
+            <p:ph type="title"/>
+          </p:nvPr>
+        </p:nvSpPr>
+        <p:spPr/>
+        <p:txBody>
+          <a:bodyPr/>
+          <a:lstStyle/>
           <a:p>
             <a:r>
               <a:rPr lang="es-MX" sz="5000" dirty="0" smtClean="0">
                 <a:solidFill>
+                  <a:srgbClr val="D50F2E"/>
+                </a:solidFill>
+                <a:latin typeface="Roboto Black" panose="02000000000000000000" pitchFamily="2" charset="0"/>
+                <a:ea typeface="Roboto Black" panose="02000000000000000000" pitchFamily="2" charset="0"/>
+              </a:rPr>
+              <a:t>SSH </a:t>
+            </a:r>
+            <a:r>
+              <a:rPr lang="es-MX" sz="5000" dirty="0" smtClean="0">
+                <a:solidFill>
                   <a:srgbClr val="6A3093"/>
                 </a:solidFill>
                 <a:latin typeface="Roboto" panose="02000000000000000000" pitchFamily="2" charset="0"/>
                 <a:ea typeface="Roboto" panose="02000000000000000000" pitchFamily="2" charset="0"/>
               </a:rPr>
-              <a:t>Hacer cambios </a:t>
+              <a:t> </a:t>
+            </a:r>
+            <a:r>
+              <a:rPr lang="es-MX" sz="2500" dirty="0">
+                <a:solidFill>
+                  <a:schemeClr val="bg1">
+                    <a:lumMod val="85000"/>
+                  </a:schemeClr>
+                </a:solidFill>
+                <a:latin typeface="Roboto" panose="02000000000000000000" pitchFamily="2" charset="0"/>
+                <a:ea typeface="Roboto" panose="02000000000000000000" pitchFamily="2" charset="0"/>
+              </a:rPr>
+              <a:t>[</a:t>
             </a:r>
             <a:r>
               <a:rPr lang="es-MX" sz="3000" dirty="0" smtClean="0">
@@ -5671,10 +7797,10 @@
                 <a:latin typeface="Roboto" panose="02000000000000000000" pitchFamily="2" charset="0"/>
                 <a:ea typeface="Roboto" panose="02000000000000000000" pitchFamily="2" charset="0"/>
               </a:rPr>
-              <a:t>[ </a:t>
-            </a:r>
-            <a:r>
-              <a:rPr lang="es-MX" sz="4000" dirty="0" err="1" smtClean="0">
+              <a:t> </a:t>
+            </a:r>
+            <a:r>
+              <a:rPr lang="es-MX" sz="3000" dirty="0" err="1" smtClean="0">
                 <a:solidFill>
                   <a:schemeClr val="bg1">
                     <a:lumMod val="85000"/>
@@ -5698,7 +7824,7 @@
               <a:t> </a:t>
             </a:r>
             <a:r>
-              <a:rPr lang="es-MX" sz="3000" dirty="0" smtClean="0">
+              <a:rPr lang="es-MX" sz="2500" dirty="0" smtClean="0">
                 <a:solidFill>
                   <a:schemeClr val="bg1">
                     <a:lumMod val="85000"/>
@@ -5735,7 +7861,7 @@
       </p:sp>
       <p:sp>
         <p:nvSpPr>
-          <p:cNvPr id="5" name="Marcador de contenido 2"/>
+          <p:cNvPr id="3" name="Marcador de contenido 2"/>
           <p:cNvSpPr>
             <a:spLocks noGrp="1"/>
           </p:cNvSpPr>
@@ -5745,13 +7871,13 @@
         </p:nvSpPr>
         <p:spPr>
           <a:xfrm>
-            <a:off x="862913" y="2333840"/>
-            <a:ext cx="10515600" cy="4524160"/>
+            <a:off x="838200" y="1895690"/>
+            <a:ext cx="10515600" cy="2190321"/>
           </a:xfrm>
         </p:spPr>
         <p:txBody>
           <a:bodyPr>
-            <a:normAutofit/>
+            <a:noAutofit/>
           </a:bodyPr>
           <a:lstStyle/>
           <a:p>
@@ -5759,7 +7885,7 @@
               <a:buNone/>
             </a:pPr>
             <a:r>
-              <a:rPr lang="es-MX" sz="2200" smtClean="0">
+              <a:rPr lang="es-MX" sz="2200" dirty="0" smtClean="0">
                 <a:solidFill>
                   <a:schemeClr val="bg1">
                     <a:lumMod val="75000"/>
@@ -5768,20 +7894,17 @@
                 <a:latin typeface="Roboto" panose="02000000000000000000" pitchFamily="2" charset="0"/>
                 <a:ea typeface="Roboto" panose="02000000000000000000" pitchFamily="2" charset="0"/>
               </a:rPr>
-              <a:t>Registrar </a:t>
-            </a:r>
-            <a:r>
-              <a:rPr lang="es-MX" sz="2200" dirty="0">
-                <a:solidFill>
-                  <a:schemeClr val="bg1">
-                    <a:lumMod val="75000"/>
-                  </a:schemeClr>
-                </a:solidFill>
-                <a:latin typeface="Roboto" panose="02000000000000000000" pitchFamily="2" charset="0"/>
-                <a:ea typeface="Roboto" panose="02000000000000000000" pitchFamily="2" charset="0"/>
-              </a:rPr>
-              <a:t>cambios</a:t>
-            </a:r>
+              <a:t>Comando para generar clave SSH</a:t>
+            </a:r>
+            <a:endParaRPr lang="es-MX" sz="2200" dirty="0" smtClean="0">
+              <a:solidFill>
+                <a:schemeClr val="bg1">
+                  <a:lumMod val="75000"/>
+                </a:schemeClr>
+              </a:solidFill>
+              <a:latin typeface="Roboto" panose="02000000000000000000" pitchFamily="2" charset="0"/>
+              <a:ea typeface="Roboto" panose="02000000000000000000" pitchFamily="2" charset="0"/>
+            </a:endParaRPr>
           </a:p>
           <a:p>
             <a:pPr marL="0" indent="0">
@@ -5797,7 +7920,19 @@
                 <a:latin typeface="Roboto" panose="02000000000000000000" pitchFamily="2" charset="0"/>
                 <a:ea typeface="Roboto" panose="02000000000000000000" pitchFamily="2" charset="0"/>
               </a:rPr>
-              <a:t>git</a:t>
+              <a:t>s</a:t>
+            </a:r>
+            <a:r>
+              <a:rPr lang="es-MX" sz="2400" dirty="0" err="1" smtClean="0">
+                <a:solidFill>
+                  <a:schemeClr val="bg1">
+                    <a:lumMod val="50000"/>
+                  </a:schemeClr>
+                </a:solidFill>
+                <a:latin typeface="Roboto" panose="02000000000000000000" pitchFamily="2" charset="0"/>
+                <a:ea typeface="Roboto" panose="02000000000000000000" pitchFamily="2" charset="0"/>
+              </a:rPr>
+              <a:t>sh-keygen</a:t>
             </a:r>
             <a:r>
               <a:rPr lang="es-MX" sz="2400" dirty="0" smtClean="0">
@@ -5809,7 +7944,7 @@
                 <a:latin typeface="Roboto" panose="02000000000000000000" pitchFamily="2" charset="0"/>
                 <a:ea typeface="Roboto" panose="02000000000000000000" pitchFamily="2" charset="0"/>
               </a:rPr>
-              <a:t> </a:t>
+              <a:t> –t </a:t>
             </a:r>
             <a:r>
               <a:rPr lang="es-MX" sz="2400" dirty="0" err="1" smtClean="0">
@@ -5821,31 +7956,7 @@
                 <a:latin typeface="Roboto" panose="02000000000000000000" pitchFamily="2" charset="0"/>
                 <a:ea typeface="Roboto" panose="02000000000000000000" pitchFamily="2" charset="0"/>
               </a:rPr>
-              <a:t>commit</a:t>
-            </a:r>
-            <a:r>
-              <a:rPr lang="es-MX" sz="2400" dirty="0">
-                <a:solidFill>
-                  <a:schemeClr val="bg1">
-                    <a:lumMod val="50000"/>
-                  </a:schemeClr>
-                </a:solidFill>
-                <a:latin typeface="Roboto" panose="02000000000000000000" pitchFamily="2" charset="0"/>
-                <a:ea typeface="Roboto" panose="02000000000000000000" pitchFamily="2" charset="0"/>
-              </a:rPr>
-              <a:t>	</a:t>
-            </a:r>
-            <a:r>
-              <a:rPr lang="es-MX" sz="2400" dirty="0" err="1" smtClean="0">
-                <a:solidFill>
-                  <a:schemeClr val="bg1">
-                    <a:lumMod val="50000"/>
-                  </a:schemeClr>
-                </a:solidFill>
-                <a:latin typeface="Roboto" panose="02000000000000000000" pitchFamily="2" charset="0"/>
-                <a:ea typeface="Roboto" panose="02000000000000000000" pitchFamily="2" charset="0"/>
-              </a:rPr>
-              <a:t>git</a:t>
+              <a:t>rsa</a:t>
             </a:r>
             <a:r>
               <a:rPr lang="es-MX" sz="2400" dirty="0" smtClean="0">
@@ -5857,19 +7968,7 @@
                 <a:latin typeface="Roboto" panose="02000000000000000000" pitchFamily="2" charset="0"/>
                 <a:ea typeface="Roboto" panose="02000000000000000000" pitchFamily="2" charset="0"/>
               </a:rPr>
-              <a:t> </a:t>
-            </a:r>
-            <a:r>
-              <a:rPr lang="es-MX" sz="2400" dirty="0" err="1" smtClean="0">
-                <a:solidFill>
-                  <a:schemeClr val="bg1">
-                    <a:lumMod val="50000"/>
-                  </a:schemeClr>
-                </a:solidFill>
-                <a:latin typeface="Roboto" panose="02000000000000000000" pitchFamily="2" charset="0"/>
-                <a:ea typeface="Roboto" panose="02000000000000000000" pitchFamily="2" charset="0"/>
-              </a:rPr>
-              <a:t>commit</a:t>
+              <a:t> –b 4096 –C “</a:t>
             </a:r>
             <a:r>
               <a:rPr lang="es-MX" sz="2400" dirty="0" smtClean="0">
@@ -5881,19 +7980,7 @@
                 <a:latin typeface="Roboto" panose="02000000000000000000" pitchFamily="2" charset="0"/>
                 <a:ea typeface="Roboto" panose="02000000000000000000" pitchFamily="2" charset="0"/>
               </a:rPr>
-              <a:t> -m “</a:t>
-            </a:r>
-            <a:r>
-              <a:rPr lang="es-MX" sz="2000" dirty="0" smtClean="0">
-                <a:solidFill>
-                  <a:schemeClr val="bg1">
-                    <a:lumMod val="50000"/>
-                  </a:schemeClr>
-                </a:solidFill>
-                <a:latin typeface="Roboto" panose="02000000000000000000" pitchFamily="2" charset="0"/>
-                <a:ea typeface="Roboto" panose="02000000000000000000" pitchFamily="2" charset="0"/>
-              </a:rPr>
-              <a:t>[</a:t>
+              <a:t>G</a:t>
             </a:r>
             <a:r>
               <a:rPr lang="es-MX" sz="2400" dirty="0" smtClean="0">
@@ -5905,31 +7992,7 @@
                 <a:latin typeface="Roboto" panose="02000000000000000000" pitchFamily="2" charset="0"/>
                 <a:ea typeface="Roboto" panose="02000000000000000000" pitchFamily="2" charset="0"/>
               </a:rPr>
-              <a:t>descripción</a:t>
-            </a:r>
-            <a:r>
-              <a:rPr lang="es-MX" sz="2000" dirty="0" smtClean="0">
-                <a:solidFill>
-                  <a:schemeClr val="bg1">
-                    <a:lumMod val="50000"/>
-                  </a:schemeClr>
-                </a:solidFill>
-                <a:latin typeface="Roboto" panose="02000000000000000000" pitchFamily="2" charset="0"/>
-                <a:ea typeface="Roboto" panose="02000000000000000000" pitchFamily="2" charset="0"/>
-              </a:rPr>
-              <a:t>]</a:t>
-            </a:r>
-            <a:r>
-              <a:rPr lang="es-MX" sz="2400" dirty="0" smtClean="0">
-                <a:solidFill>
-                  <a:schemeClr val="bg1">
-                    <a:lumMod val="50000"/>
-                  </a:schemeClr>
-                </a:solidFill>
-                <a:latin typeface="Roboto" panose="02000000000000000000" pitchFamily="2" charset="0"/>
-                <a:ea typeface="Roboto" panose="02000000000000000000" pitchFamily="2" charset="0"/>
-              </a:rPr>
-              <a:t>”</a:t>
+              <a:t>itHub email”</a:t>
             </a:r>
           </a:p>
           <a:p>
@@ -5950,7 +8013,168 @@
             <a:pPr marL="0" indent="0">
               <a:buNone/>
             </a:pPr>
-            <a:endParaRPr lang="es-MX" sz="2400" dirty="0" smtClean="0">
+            <a:r>
+              <a:rPr lang="es-MX" sz="2200" dirty="0">
+                <a:solidFill>
+                  <a:schemeClr val="bg1">
+                    <a:lumMod val="75000"/>
+                  </a:schemeClr>
+                </a:solidFill>
+                <a:latin typeface="Roboto" panose="02000000000000000000" pitchFamily="2" charset="0"/>
+                <a:ea typeface="Roboto" panose="02000000000000000000" pitchFamily="2" charset="0"/>
+              </a:rPr>
+              <a:t>[</a:t>
+            </a:r>
+            <a:r>
+              <a:rPr lang="es-MX" sz="2200" dirty="0" err="1">
+                <a:solidFill>
+                  <a:schemeClr val="bg1">
+                    <a:lumMod val="75000"/>
+                  </a:schemeClr>
+                </a:solidFill>
+                <a:latin typeface="Roboto" panose="02000000000000000000" pitchFamily="2" charset="0"/>
+                <a:ea typeface="Roboto" panose="02000000000000000000" pitchFamily="2" charset="0"/>
+              </a:rPr>
+              <a:t>enter</a:t>
+            </a:r>
+            <a:r>
+              <a:rPr lang="es-MX" sz="2200" dirty="0">
+                <a:solidFill>
+                  <a:schemeClr val="bg1">
+                    <a:lumMod val="75000"/>
+                  </a:schemeClr>
+                </a:solidFill>
+                <a:latin typeface="Roboto" panose="02000000000000000000" pitchFamily="2" charset="0"/>
+                <a:ea typeface="Roboto" panose="02000000000000000000" pitchFamily="2" charset="0"/>
+              </a:rPr>
+              <a:t>] para generar clave con valores predeterminados</a:t>
+            </a:r>
+            <a:r>
+              <a:rPr lang="es-MX" sz="2200" dirty="0" smtClean="0">
+                <a:solidFill>
+                  <a:schemeClr val="bg1">
+                    <a:lumMod val="75000"/>
+                  </a:schemeClr>
+                </a:solidFill>
+                <a:latin typeface="Roboto" panose="02000000000000000000" pitchFamily="2" charset="0"/>
+                <a:ea typeface="Roboto" panose="02000000000000000000" pitchFamily="2" charset="0"/>
+              </a:rPr>
+              <a:t>.</a:t>
+            </a:r>
+          </a:p>
+          <a:p>
+            <a:pPr marL="0" indent="0">
+              <a:buNone/>
+            </a:pPr>
+            <a:endParaRPr lang="es-MX" sz="2200" dirty="0">
+              <a:solidFill>
+                <a:schemeClr val="bg1">
+                  <a:lumMod val="75000"/>
+                </a:schemeClr>
+              </a:solidFill>
+              <a:latin typeface="Roboto" panose="02000000000000000000" pitchFamily="2" charset="0"/>
+              <a:ea typeface="Roboto" panose="02000000000000000000" pitchFamily="2" charset="0"/>
+            </a:endParaRPr>
+          </a:p>
+          <a:p>
+            <a:pPr marL="0" indent="0">
+              <a:buNone/>
+            </a:pPr>
+            <a:r>
+              <a:rPr lang="es-MX" sz="2200" dirty="0" smtClean="0">
+                <a:solidFill>
+                  <a:schemeClr val="bg1">
+                    <a:lumMod val="75000"/>
+                  </a:schemeClr>
+                </a:solidFill>
+                <a:latin typeface="Roboto" panose="02000000000000000000" pitchFamily="2" charset="0"/>
+                <a:ea typeface="Roboto" panose="02000000000000000000" pitchFamily="2" charset="0"/>
+              </a:rPr>
+              <a:t>Iniciar agente SSH</a:t>
+            </a:r>
+          </a:p>
+          <a:p>
+            <a:pPr marL="0" indent="0">
+              <a:buNone/>
+            </a:pPr>
+            <a:r>
+              <a:rPr lang="es-MX" sz="2500" dirty="0" err="1" smtClean="0">
+                <a:solidFill>
+                  <a:schemeClr val="bg1">
+                    <a:lumMod val="50000"/>
+                  </a:schemeClr>
+                </a:solidFill>
+                <a:latin typeface="Roboto" panose="02000000000000000000" pitchFamily="2" charset="0"/>
+                <a:ea typeface="Roboto" panose="02000000000000000000" pitchFamily="2" charset="0"/>
+              </a:rPr>
+              <a:t>eval</a:t>
+            </a:r>
+            <a:r>
+              <a:rPr lang="es-MX" sz="2500" dirty="0" smtClean="0">
+                <a:solidFill>
+                  <a:schemeClr val="bg1">
+                    <a:lumMod val="50000"/>
+                  </a:schemeClr>
+                </a:solidFill>
+                <a:latin typeface="Roboto" panose="02000000000000000000" pitchFamily="2" charset="0"/>
+                <a:ea typeface="Roboto" panose="02000000000000000000" pitchFamily="2" charset="0"/>
+              </a:rPr>
+              <a:t> </a:t>
+            </a:r>
+            <a:r>
+              <a:rPr lang="es-MX" sz="2500" dirty="0">
+                <a:solidFill>
+                  <a:schemeClr val="bg1">
+                    <a:lumMod val="50000"/>
+                  </a:schemeClr>
+                </a:solidFill>
+                <a:latin typeface="Roboto" panose="02000000000000000000" pitchFamily="2" charset="0"/>
+                <a:ea typeface="Roboto" panose="02000000000000000000" pitchFamily="2" charset="0"/>
+              </a:rPr>
+              <a:t>$(</a:t>
+            </a:r>
+            <a:r>
+              <a:rPr lang="es-MX" sz="2500" dirty="0" err="1">
+                <a:solidFill>
+                  <a:schemeClr val="bg1">
+                    <a:lumMod val="50000"/>
+                  </a:schemeClr>
+                </a:solidFill>
+                <a:latin typeface="Roboto" panose="02000000000000000000" pitchFamily="2" charset="0"/>
+                <a:ea typeface="Roboto" panose="02000000000000000000" pitchFamily="2" charset="0"/>
+              </a:rPr>
+              <a:t>ssh-agent</a:t>
+            </a:r>
+            <a:r>
+              <a:rPr lang="es-MX" sz="2500" dirty="0">
+                <a:solidFill>
+                  <a:schemeClr val="bg1">
+                    <a:lumMod val="50000"/>
+                  </a:schemeClr>
+                </a:solidFill>
+                <a:latin typeface="Roboto" panose="02000000000000000000" pitchFamily="2" charset="0"/>
+                <a:ea typeface="Roboto" panose="02000000000000000000" pitchFamily="2" charset="0"/>
+              </a:rPr>
+              <a:t> –s</a:t>
+            </a:r>
+            <a:r>
+              <a:rPr lang="es-MX" sz="2500" dirty="0" smtClean="0">
+                <a:solidFill>
+                  <a:schemeClr val="bg1">
+                    <a:lumMod val="50000"/>
+                  </a:schemeClr>
+                </a:solidFill>
+                <a:latin typeface="Roboto" panose="02000000000000000000" pitchFamily="2" charset="0"/>
+                <a:ea typeface="Roboto" panose="02000000000000000000" pitchFamily="2" charset="0"/>
+              </a:rPr>
+              <a:t>)</a:t>
+            </a:r>
+          </a:p>
+          <a:p>
+            <a:pPr marL="0" indent="0">
+              <a:buNone/>
+            </a:pPr>
+            <a:endParaRPr lang="es-MX" sz="2500" dirty="0">
               <a:solidFill>
                 <a:schemeClr val="bg1">
                   <a:lumMod val="50000"/>
@@ -5964,7 +8188,101 @@
             <a:pPr marL="0" indent="0">
               <a:buNone/>
             </a:pPr>
-            <a:endParaRPr lang="es-MX" sz="2400" dirty="0">
+            <a:r>
+              <a:rPr lang="es-MX" sz="2200" dirty="0">
+                <a:solidFill>
+                  <a:schemeClr val="bg1">
+                    <a:lumMod val="75000"/>
+                  </a:schemeClr>
+                </a:solidFill>
+                <a:latin typeface="Roboto" panose="02000000000000000000" pitchFamily="2" charset="0"/>
+                <a:ea typeface="Roboto" panose="02000000000000000000" pitchFamily="2" charset="0"/>
+              </a:rPr>
+              <a:t>Agregar clave SSH a agente</a:t>
+            </a:r>
+          </a:p>
+          <a:p>
+            <a:pPr marL="0" indent="0">
+              <a:buNone/>
+            </a:pPr>
+            <a:r>
+              <a:rPr lang="es-MX" sz="2500" dirty="0" err="1" smtClean="0">
+                <a:solidFill>
+                  <a:schemeClr val="bg1">
+                    <a:lumMod val="50000"/>
+                  </a:schemeClr>
+                </a:solidFill>
+                <a:latin typeface="Roboto" panose="02000000000000000000" pitchFamily="2" charset="0"/>
+                <a:ea typeface="Roboto" panose="02000000000000000000" pitchFamily="2" charset="0"/>
+              </a:rPr>
+              <a:t>ssh-add</a:t>
+            </a:r>
+            <a:r>
+              <a:rPr lang="es-MX" sz="2500" dirty="0" smtClean="0">
+                <a:solidFill>
+                  <a:schemeClr val="bg1">
+                    <a:lumMod val="50000"/>
+                  </a:schemeClr>
+                </a:solidFill>
+                <a:latin typeface="Roboto" panose="02000000000000000000" pitchFamily="2" charset="0"/>
+                <a:ea typeface="Roboto" panose="02000000000000000000" pitchFamily="2" charset="0"/>
+              </a:rPr>
+              <a:t> ~/.</a:t>
+            </a:r>
+            <a:r>
+              <a:rPr lang="es-MX" sz="2500" dirty="0" err="1" smtClean="0">
+                <a:solidFill>
+                  <a:schemeClr val="bg1">
+                    <a:lumMod val="50000"/>
+                  </a:schemeClr>
+                </a:solidFill>
+                <a:latin typeface="Roboto" panose="02000000000000000000" pitchFamily="2" charset="0"/>
+                <a:ea typeface="Roboto" panose="02000000000000000000" pitchFamily="2" charset="0"/>
+              </a:rPr>
+              <a:t>ssh</a:t>
+            </a:r>
+            <a:r>
+              <a:rPr lang="es-MX" sz="2500" dirty="0" smtClean="0">
+                <a:solidFill>
+                  <a:schemeClr val="bg1">
+                    <a:lumMod val="50000"/>
+                  </a:schemeClr>
+                </a:solidFill>
+                <a:latin typeface="Roboto" panose="02000000000000000000" pitchFamily="2" charset="0"/>
+                <a:ea typeface="Roboto" panose="02000000000000000000" pitchFamily="2" charset="0"/>
+              </a:rPr>
+              <a:t>/&lt;clave </a:t>
+            </a:r>
+            <a:r>
+              <a:rPr lang="es-MX" sz="2500" dirty="0" err="1" smtClean="0">
+                <a:solidFill>
+                  <a:schemeClr val="bg1">
+                    <a:lumMod val="50000"/>
+                  </a:schemeClr>
+                </a:solidFill>
+                <a:latin typeface="Roboto" panose="02000000000000000000" pitchFamily="2" charset="0"/>
+                <a:ea typeface="Roboto" panose="02000000000000000000" pitchFamily="2" charset="0"/>
+              </a:rPr>
+              <a:t>ssh</a:t>
+            </a:r>
+            <a:r>
+              <a:rPr lang="es-MX" sz="2500" dirty="0" smtClean="0">
+                <a:solidFill>
+                  <a:schemeClr val="bg1">
+                    <a:lumMod val="50000"/>
+                  </a:schemeClr>
+                </a:solidFill>
+                <a:latin typeface="Roboto" panose="02000000000000000000" pitchFamily="2" charset="0"/>
+                <a:ea typeface="Roboto" panose="02000000000000000000" pitchFamily="2" charset="0"/>
+              </a:rPr>
+              <a:t>&gt;</a:t>
+            </a:r>
+          </a:p>
+          <a:p>
+            <a:pPr marL="0" indent="0">
+              <a:buNone/>
+            </a:pPr>
+            <a:endParaRPr lang="es-MX" sz="2500" dirty="0">
               <a:solidFill>
                 <a:schemeClr val="bg1">
                   <a:lumMod val="50000"/>
@@ -5978,7 +8296,7 @@
             <a:pPr marL="0" indent="0">
               <a:buNone/>
             </a:pPr>
-            <a:endParaRPr lang="es-MX" sz="2400" b="1" dirty="0" smtClean="0">
+            <a:endParaRPr lang="es-MX" sz="2500" dirty="0">
               <a:solidFill>
                 <a:schemeClr val="bg1">
                   <a:lumMod val="50000"/>
@@ -5988,66 +8306,25 @@
               <a:ea typeface="Roboto" panose="02000000000000000000" pitchFamily="2" charset="0"/>
             </a:endParaRPr>
           </a:p>
-          <a:p>
-            <a:pPr marL="0" indent="0">
-              <a:buNone/>
-            </a:pPr>
-            <a:endParaRPr lang="es-MX" sz="2400" dirty="0" smtClean="0">
-              <a:solidFill>
-                <a:schemeClr val="bg1">
-                  <a:lumMod val="50000"/>
-                </a:schemeClr>
-              </a:solidFill>
-              <a:latin typeface="Roboto" panose="02000000000000000000" pitchFamily="2" charset="0"/>
-              <a:ea typeface="Roboto" panose="02000000000000000000" pitchFamily="2" charset="0"/>
-            </a:endParaRPr>
-          </a:p>
-          <a:p>
-            <a:pPr marL="0" indent="0">
-              <a:buNone/>
-            </a:pPr>
-            <a:endParaRPr lang="es-MX" sz="2400" dirty="0">
-              <a:solidFill>
-                <a:schemeClr val="bg1">
-                  <a:lumMod val="50000"/>
-                </a:schemeClr>
-              </a:solidFill>
-              <a:latin typeface="Roboto" panose="02000000000000000000" pitchFamily="2" charset="0"/>
-              <a:ea typeface="Roboto" panose="02000000000000000000" pitchFamily="2" charset="0"/>
-            </a:endParaRPr>
-          </a:p>
-          <a:p>
-            <a:pPr marL="0" indent="0">
-              <a:buNone/>
-            </a:pPr>
-            <a:endParaRPr lang="es-MX" dirty="0">
-              <a:solidFill>
-                <a:schemeClr val="bg1">
-                  <a:lumMod val="75000"/>
-                </a:schemeClr>
-              </a:solidFill>
-              <a:latin typeface="Roboto" panose="02000000000000000000" pitchFamily="2" charset="0"/>
-              <a:ea typeface="Roboto" panose="02000000000000000000" pitchFamily="2" charset="0"/>
-            </a:endParaRPr>
-          </a:p>
-          <a:p>
-            <a:pPr marL="0" indent="0">
-              <a:buNone/>
-            </a:pPr>
-            <a:endParaRPr lang="es-MX" dirty="0"/>
-          </a:p>
         </p:txBody>
       </p:sp>
     </p:spTree>
     <p:extLst>
       <p:ext uri="{BB962C8B-B14F-4D97-AF65-F5344CB8AC3E}">
-        <p14:creationId xmlns:p14="http://schemas.microsoft.com/office/powerpoint/2010/main" val="1393074935"/>
+        <p14:creationId xmlns:p14="http://schemas.microsoft.com/office/powerpoint/2010/main" val="1223086477"/>
       </p:ext>
     </p:extLst>
   </p:cSld>
   <p:clrMapOvr>
     <a:masterClrMapping/>
   </p:clrMapOvr>
+  <p:timing>
+    <p:tnLst>
+      <p:par>
+        <p:cTn id="1" dur="indefinite" restart="never" nodeType="tmRoot"/>
+      </p:par>
+    </p:tnLst>
+  </p:timing>
 </p:sld>
 </file>
 

</xml_diff>

<commit_message>
Vi section almost done, exercises done
</commit_message>
<xml_diff>
--- a/2017/dec_7_Git_GitHub_WorkShop/DGO.pptx
+++ b/2017/dec_7_Git_GitHub_WorkShop/DGO.pptx
@@ -273,7 +273,7 @@
           <a:p>
             <a:fld id="{3FD3500F-8B60-4FBA-BC8A-72168F3C79F5}" type="datetimeFigureOut">
               <a:rPr lang="es-MX" smtClean="0"/>
-              <a:t>05/12/2017</a:t>
+              <a:t>06/12/2017</a:t>
             </a:fld>
             <a:endParaRPr lang="es-MX"/>
           </a:p>
@@ -443,7 +443,7 @@
           <a:p>
             <a:fld id="{3FD3500F-8B60-4FBA-BC8A-72168F3C79F5}" type="datetimeFigureOut">
               <a:rPr lang="es-MX" smtClean="0"/>
-              <a:t>05/12/2017</a:t>
+              <a:t>06/12/2017</a:t>
             </a:fld>
             <a:endParaRPr lang="es-MX"/>
           </a:p>
@@ -623,7 +623,7 @@
           <a:p>
             <a:fld id="{3FD3500F-8B60-4FBA-BC8A-72168F3C79F5}" type="datetimeFigureOut">
               <a:rPr lang="es-MX" smtClean="0"/>
-              <a:t>05/12/2017</a:t>
+              <a:t>06/12/2017</a:t>
             </a:fld>
             <a:endParaRPr lang="es-MX"/>
           </a:p>
@@ -793,7 +793,7 @@
           <a:p>
             <a:fld id="{3FD3500F-8B60-4FBA-BC8A-72168F3C79F5}" type="datetimeFigureOut">
               <a:rPr lang="es-MX" smtClean="0"/>
-              <a:t>05/12/2017</a:t>
+              <a:t>06/12/2017</a:t>
             </a:fld>
             <a:endParaRPr lang="es-MX"/>
           </a:p>
@@ -1039,7 +1039,7 @@
           <a:p>
             <a:fld id="{3FD3500F-8B60-4FBA-BC8A-72168F3C79F5}" type="datetimeFigureOut">
               <a:rPr lang="es-MX" smtClean="0"/>
-              <a:t>05/12/2017</a:t>
+              <a:t>06/12/2017</a:t>
             </a:fld>
             <a:endParaRPr lang="es-MX"/>
           </a:p>
@@ -1271,7 +1271,7 @@
           <a:p>
             <a:fld id="{3FD3500F-8B60-4FBA-BC8A-72168F3C79F5}" type="datetimeFigureOut">
               <a:rPr lang="es-MX" smtClean="0"/>
-              <a:t>05/12/2017</a:t>
+              <a:t>06/12/2017</a:t>
             </a:fld>
             <a:endParaRPr lang="es-MX"/>
           </a:p>
@@ -1638,7 +1638,7 @@
           <a:p>
             <a:fld id="{3FD3500F-8B60-4FBA-BC8A-72168F3C79F5}" type="datetimeFigureOut">
               <a:rPr lang="es-MX" smtClean="0"/>
-              <a:t>05/12/2017</a:t>
+              <a:t>06/12/2017</a:t>
             </a:fld>
             <a:endParaRPr lang="es-MX"/>
           </a:p>
@@ -1756,7 +1756,7 @@
           <a:p>
             <a:fld id="{3FD3500F-8B60-4FBA-BC8A-72168F3C79F5}" type="datetimeFigureOut">
               <a:rPr lang="es-MX" smtClean="0"/>
-              <a:t>05/12/2017</a:t>
+              <a:t>06/12/2017</a:t>
             </a:fld>
             <a:endParaRPr lang="es-MX"/>
           </a:p>
@@ -1851,7 +1851,7 @@
           <a:p>
             <a:fld id="{3FD3500F-8B60-4FBA-BC8A-72168F3C79F5}" type="datetimeFigureOut">
               <a:rPr lang="es-MX" smtClean="0"/>
-              <a:t>05/12/2017</a:t>
+              <a:t>06/12/2017</a:t>
             </a:fld>
             <a:endParaRPr lang="es-MX"/>
           </a:p>
@@ -2128,7 +2128,7 @@
           <a:p>
             <a:fld id="{3FD3500F-8B60-4FBA-BC8A-72168F3C79F5}" type="datetimeFigureOut">
               <a:rPr lang="es-MX" smtClean="0"/>
-              <a:t>05/12/2017</a:t>
+              <a:t>06/12/2017</a:t>
             </a:fld>
             <a:endParaRPr lang="es-MX"/>
           </a:p>
@@ -2385,7 +2385,7 @@
           <a:p>
             <a:fld id="{3FD3500F-8B60-4FBA-BC8A-72168F3C79F5}" type="datetimeFigureOut">
               <a:rPr lang="es-MX" smtClean="0"/>
-              <a:t>05/12/2017</a:t>
+              <a:t>06/12/2017</a:t>
             </a:fld>
             <a:endParaRPr lang="es-MX"/>
           </a:p>
@@ -2598,7 +2598,7 @@
           <a:p>
             <a:fld id="{3FD3500F-8B60-4FBA-BC8A-72168F3C79F5}" type="datetimeFigureOut">
               <a:rPr lang="es-MX" smtClean="0"/>
-              <a:t>05/12/2017</a:t>
+              <a:t>06/12/2017</a:t>
             </a:fld>
             <a:endParaRPr lang="es-MX"/>
           </a:p>
@@ -3046,18 +3046,7 @@
                 <a:ea typeface="Roboto Black" panose="02000000000000000000" pitchFamily="2" charset="0"/>
                 <a:cs typeface="Open Sans" panose="020B0606030504020204" pitchFamily="34" charset="0"/>
               </a:rPr>
-              <a:t> </a:t>
-            </a:r>
-            <a:r>
-              <a:rPr lang="es-MX" sz="11000" dirty="0" smtClean="0">
-                <a:solidFill>
-                  <a:srgbClr val="921429"/>
-                </a:solidFill>
-                <a:latin typeface="Roboto Black" panose="02000000000000000000" pitchFamily="2" charset="0"/>
-                <a:ea typeface="Roboto Black" panose="02000000000000000000" pitchFamily="2" charset="0"/>
-                <a:cs typeface="Open Sans" panose="020B0606030504020204" pitchFamily="34" charset="0"/>
-              </a:rPr>
-              <a:t>/ </a:t>
+              <a:t> / </a:t>
             </a:r>
             <a:r>
               <a:rPr lang="es-MX" sz="11000" dirty="0" smtClean="0">
@@ -4230,19 +4219,7 @@
                 <a:latin typeface="Roboto" panose="02000000000000000000" pitchFamily="2" charset="0"/>
                 <a:ea typeface="Roboto" panose="02000000000000000000" pitchFamily="2" charset="0"/>
               </a:rPr>
-              <a:t> </a:t>
-            </a:r>
-            <a:r>
-              <a:rPr lang="es-MX" sz="2400" dirty="0" smtClean="0">
-                <a:solidFill>
-                  <a:schemeClr val="bg1">
-                    <a:lumMod val="50000"/>
-                  </a:schemeClr>
-                </a:solidFill>
-                <a:latin typeface="Roboto" panose="02000000000000000000" pitchFamily="2" charset="0"/>
-                <a:ea typeface="Roboto" panose="02000000000000000000" pitchFamily="2" charset="0"/>
-              </a:rPr>
-              <a:t>–</a:t>
+              <a:t> –</a:t>
             </a:r>
             <a:r>
               <a:rPr lang="es-MX" sz="2400" dirty="0" err="1" smtClean="0">
@@ -5826,15 +5803,6 @@
                 </a:rPr>
                 <a:t> remoto</a:t>
               </a:r>
-              <a:endParaRPr lang="es-MX" sz="2500" b="1" dirty="0">
-                <a:solidFill>
-                  <a:schemeClr val="bg1">
-                    <a:lumMod val="95000"/>
-                  </a:schemeClr>
-                </a:solidFill>
-                <a:latin typeface="Roboto Light" panose="02000000000000000000" pitchFamily="2" charset="0"/>
-                <a:ea typeface="Roboto Light" panose="02000000000000000000" pitchFamily="2" charset="0"/>
-              </a:endParaRPr>
             </a:p>
           </p:txBody>
         </p:sp>
@@ -6727,25 +6695,8 @@
                   <a:latin typeface="Roboto" panose="02000000000000000000" pitchFamily="2" charset="0"/>
                   <a:ea typeface="Roboto" panose="02000000000000000000" pitchFamily="2" charset="0"/>
                 </a:rPr>
-                <a:t>línea </a:t>
-              </a:r>
-              <a:r>
-                <a:rPr lang="es-MX" sz="2200" b="1" dirty="0">
-                  <a:solidFill>
-                    <a:srgbClr val="FFC000"/>
-                  </a:solidFill>
-                  <a:latin typeface="Roboto" panose="02000000000000000000" pitchFamily="2" charset="0"/>
-                  <a:ea typeface="Roboto" panose="02000000000000000000" pitchFamily="2" charset="0"/>
-                </a:rPr>
-                <a:t>arriba</a:t>
-              </a:r>
-              <a:endParaRPr lang="es-MX" sz="2200" b="1" dirty="0">
-                <a:solidFill>
-                  <a:srgbClr val="FFC000"/>
-                </a:solidFill>
-                <a:latin typeface="Roboto" panose="02000000000000000000" pitchFamily="2" charset="0"/>
-                <a:ea typeface="Roboto" panose="02000000000000000000" pitchFamily="2" charset="0"/>
-              </a:endParaRPr>
+                <a:t>línea arriba</a:t>
+              </a:r>
             </a:p>
             <a:p>
               <a:r>
@@ -6887,25 +6838,8 @@
                   <a:latin typeface="Roboto" panose="02000000000000000000" pitchFamily="2" charset="0"/>
                   <a:ea typeface="Roboto" panose="02000000000000000000" pitchFamily="2" charset="0"/>
                 </a:rPr>
-                <a:t>letra a la </a:t>
-              </a:r>
-              <a:r>
-                <a:rPr lang="es-MX" sz="2200" b="1" dirty="0">
-                  <a:solidFill>
-                    <a:srgbClr val="FFC000"/>
-                  </a:solidFill>
-                  <a:latin typeface="Roboto" panose="02000000000000000000" pitchFamily="2" charset="0"/>
-                  <a:ea typeface="Roboto" panose="02000000000000000000" pitchFamily="2" charset="0"/>
-                </a:rPr>
-                <a:t>der</a:t>
-              </a:r>
-              <a:endParaRPr lang="es-MX" sz="2200" b="1" dirty="0">
-                <a:solidFill>
-                  <a:srgbClr val="FFC000"/>
-                </a:solidFill>
-                <a:latin typeface="Roboto" panose="02000000000000000000" pitchFamily="2" charset="0"/>
-                <a:ea typeface="Roboto" panose="02000000000000000000" pitchFamily="2" charset="0"/>
-              </a:endParaRPr>
+                <a:t>letra a la der</a:t>
+              </a:r>
             </a:p>
             <a:p>
               <a:r>
@@ -7065,9 +6999,9 @@
         <p:grpSpPr>
           <a:xfrm>
             <a:off x="830413" y="1505396"/>
-            <a:ext cx="10531175" cy="3847208"/>
+            <a:ext cx="10531175" cy="3939540"/>
             <a:chOff x="759125" y="1794293"/>
-            <a:chExt cx="10531175" cy="3847208"/>
+            <a:chExt cx="10531175" cy="3939540"/>
           </a:xfrm>
         </p:grpSpPr>
         <p:sp>
@@ -7165,13 +7099,6 @@
                 </a:rPr>
                 <a:t>anterior</a:t>
               </a:r>
-              <a:endParaRPr lang="es-MX" sz="2200" b="1" dirty="0">
-                <a:solidFill>
-                  <a:srgbClr val="FFC000"/>
-                </a:solidFill>
-                <a:latin typeface="Roboto" panose="02000000000000000000" pitchFamily="2" charset="0"/>
-                <a:ea typeface="Roboto" panose="02000000000000000000" pitchFamily="2" charset="0"/>
-              </a:endParaRPr>
             </a:p>
             <a:p>
               <a:r>
@@ -7305,15 +7232,6 @@
                 </a:rPr>
                 <a:t>0</a:t>
               </a:r>
-              <a:endParaRPr lang="es-MX" sz="2400" dirty="0">
-                <a:solidFill>
-                  <a:schemeClr val="bg1">
-                    <a:lumMod val="95000"/>
-                  </a:schemeClr>
-                </a:solidFill>
-                <a:latin typeface="Roboto" panose="02000000000000000000" pitchFamily="2" charset="0"/>
-                <a:ea typeface="Roboto" panose="02000000000000000000" pitchFamily="2" charset="0"/>
-              </a:endParaRPr>
             </a:p>
             <a:p>
               <a:endParaRPr lang="es-MX" dirty="0" smtClean="0"/>
@@ -7409,15 +7327,6 @@
                 </a:rPr>
                 <a:t>$</a:t>
               </a:r>
-              <a:endParaRPr lang="es-MX" sz="2400" dirty="0">
-                <a:solidFill>
-                  <a:schemeClr val="bg1">
-                    <a:lumMod val="95000"/>
-                  </a:schemeClr>
-                </a:solidFill>
-                <a:latin typeface="Roboto" panose="02000000000000000000" pitchFamily="2" charset="0"/>
-                <a:ea typeface="Roboto" panose="02000000000000000000" pitchFamily="2" charset="0"/>
-              </a:endParaRPr>
             </a:p>
           </p:txBody>
         </p:sp>
@@ -7430,7 +7339,7 @@
           <p:spPr>
             <a:xfrm>
               <a:off x="6817025" y="1794293"/>
-              <a:ext cx="4473275" cy="3847207"/>
+              <a:ext cx="4473275" cy="3939540"/>
             </a:xfrm>
             <a:prstGeom prst="rect">
               <a:avLst/>
@@ -7457,14 +7366,24 @@
                 <a:t>Cursor </a:t>
               </a:r>
               <a:r>
-                <a:rPr lang="es-MX" sz="2200" b="1" dirty="0" smtClean="0">
+                <a:rPr lang="es-MX" sz="2200" b="1" dirty="0">
                   <a:solidFill>
                     <a:srgbClr val="FFC000"/>
                   </a:solidFill>
                   <a:latin typeface="Roboto" panose="02000000000000000000" pitchFamily="2" charset="0"/>
                   <a:ea typeface="Roboto" panose="02000000000000000000" pitchFamily="2" charset="0"/>
                 </a:rPr>
-                <a:t>n </a:t>
+                <a:t>N</a:t>
+              </a:r>
+              <a:r>
+                <a:rPr lang="es-MX" sz="2200" b="1" dirty="0" smtClean="0">
+                  <a:solidFill>
+                    <a:srgbClr val="FFC000"/>
+                  </a:solidFill>
+                  <a:latin typeface="Roboto" panose="02000000000000000000" pitchFamily="2" charset="0"/>
+                  <a:ea typeface="Roboto" panose="02000000000000000000" pitchFamily="2" charset="0"/>
+                </a:rPr>
+                <a:t> </a:t>
               </a:r>
               <a:r>
                 <a:rPr lang="es-MX" sz="2200" b="1" dirty="0">
@@ -7524,7 +7443,7 @@
                   <a:latin typeface="Roboto" panose="02000000000000000000" pitchFamily="2" charset="0"/>
                   <a:ea typeface="Roboto" panose="02000000000000000000" pitchFamily="2" charset="0"/>
                 </a:rPr>
-                <a:t>:n</a:t>
+                <a:t>:N</a:t>
               </a:r>
               <a:endParaRPr lang="es-MX" sz="2400" dirty="0">
                 <a:solidFill>
@@ -7653,7 +7572,7 @@
                   <a:latin typeface="Roboto" panose="02000000000000000000" pitchFamily="2" charset="0"/>
                   <a:ea typeface="Roboto" panose="02000000000000000000" pitchFamily="2" charset="0"/>
                 </a:rPr>
-                <a:t>Desplazamiento una </a:t>
+                <a:t>Insertar texto </a:t>
               </a:r>
               <a:r>
                 <a:rPr lang="es-MX" sz="2200" b="1" dirty="0">
@@ -7663,7 +7582,7 @@
                   <a:latin typeface="Roboto" panose="02000000000000000000" pitchFamily="2" charset="0"/>
                   <a:ea typeface="Roboto" panose="02000000000000000000" pitchFamily="2" charset="0"/>
                 </a:rPr>
-                <a:t>letra a la </a:t>
+                <a:t>(después de ‘</a:t>
               </a:r>
               <a:r>
                 <a:rPr lang="es-MX" sz="2200" b="1" dirty="0" err="1">
@@ -7673,11 +7592,39 @@
                   <a:latin typeface="Roboto" panose="02000000000000000000" pitchFamily="2" charset="0"/>
                   <a:ea typeface="Roboto" panose="02000000000000000000" pitchFamily="2" charset="0"/>
                 </a:rPr>
-                <a:t>izq</a:t>
-              </a:r>
-              <a:endParaRPr lang="es-MX" sz="2200" b="1" dirty="0">
-                <a:solidFill>
-                  <a:srgbClr val="FFC000"/>
+                <a:t>esc</a:t>
+              </a:r>
+              <a:r>
+                <a:rPr lang="es-MX" sz="2200" b="1" dirty="0">
+                  <a:solidFill>
+                    <a:srgbClr val="FFC000"/>
+                  </a:solidFill>
+                  <a:latin typeface="Roboto" panose="02000000000000000000" pitchFamily="2" charset="0"/>
+                  <a:ea typeface="Roboto" panose="02000000000000000000" pitchFamily="2" charset="0"/>
+                </a:rPr>
+                <a:t>’)</a:t>
+              </a:r>
+            </a:p>
+            <a:p>
+              <a:r>
+                <a:rPr lang="es-MX" sz="2400" dirty="0">
+                  <a:solidFill>
+                    <a:schemeClr val="bg1">
+                      <a:lumMod val="95000"/>
+                    </a:schemeClr>
+                  </a:solidFill>
+                  <a:latin typeface="Roboto" panose="02000000000000000000" pitchFamily="2" charset="0"/>
+                  <a:ea typeface="Roboto" panose="02000000000000000000" pitchFamily="2" charset="0"/>
+                </a:rPr>
+                <a:t>	i</a:t>
+              </a:r>
+            </a:p>
+            <a:p>
+              <a:endParaRPr lang="es-MX" sz="2400" dirty="0">
+                <a:solidFill>
+                  <a:schemeClr val="bg1">
+                    <a:lumMod val="95000"/>
+                  </a:schemeClr>
                 </a:solidFill>
                 <a:latin typeface="Roboto" panose="02000000000000000000" pitchFamily="2" charset="0"/>
                 <a:ea typeface="Roboto" panose="02000000000000000000" pitchFamily="2" charset="0"/>
@@ -7685,43 +7632,15 @@
             </a:p>
             <a:p>
               <a:r>
-                <a:rPr lang="es-MX" dirty="0">
-                  <a:solidFill>
-                    <a:schemeClr val="bg1">
-                      <a:lumMod val="95000"/>
-                    </a:schemeClr>
+                <a:rPr lang="es-MX" sz="2200" b="1" dirty="0">
+                  <a:solidFill>
+                    <a:srgbClr val="FFC000"/>
                   </a:solidFill>
                   <a:latin typeface="Roboto" panose="02000000000000000000" pitchFamily="2" charset="0"/>
                   <a:ea typeface="Roboto" panose="02000000000000000000" pitchFamily="2" charset="0"/>
                 </a:rPr>
-                <a:t>	</a:t>
-              </a:r>
-              <a:r>
-                <a:rPr lang="es-MX" sz="2400" dirty="0" smtClean="0">
-                  <a:solidFill>
-                    <a:schemeClr val="bg1">
-                      <a:lumMod val="95000"/>
-                    </a:schemeClr>
-                  </a:solidFill>
-                  <a:latin typeface="Roboto" panose="02000000000000000000" pitchFamily="2" charset="0"/>
-                  <a:ea typeface="Roboto" panose="02000000000000000000" pitchFamily="2" charset="0"/>
-                </a:rPr>
-                <a:t>h ó →</a:t>
-              </a:r>
-              <a:endParaRPr lang="es-MX" sz="2400" dirty="0">
-                <a:solidFill>
-                  <a:schemeClr val="bg1">
-                    <a:lumMod val="95000"/>
-                  </a:schemeClr>
-                </a:solidFill>
-                <a:latin typeface="Roboto" panose="02000000000000000000" pitchFamily="2" charset="0"/>
-                <a:ea typeface="Roboto" panose="02000000000000000000" pitchFamily="2" charset="0"/>
-              </a:endParaRPr>
-            </a:p>
-            <a:p>
-              <a:endParaRPr lang="es-MX" dirty="0" smtClean="0"/>
-            </a:p>
-            <a:p>
+                <a:t>Reemplazar</a:t>
+              </a:r>
               <a:r>
                 <a:rPr lang="es-MX" sz="2200" dirty="0">
                   <a:solidFill>
@@ -7733,27 +7652,7 @@
                   <a:latin typeface="Roboto" panose="02000000000000000000" pitchFamily="2" charset="0"/>
                   <a:ea typeface="Roboto" panose="02000000000000000000" pitchFamily="2" charset="0"/>
                 </a:rPr>
-                <a:t>Desplazamiento una </a:t>
-              </a:r>
-              <a:r>
-                <a:rPr lang="es-MX" sz="2200" b="1" dirty="0">
-                  <a:solidFill>
-                    <a:srgbClr val="FFC000"/>
-                  </a:solidFill>
-                  <a:latin typeface="Roboto" panose="02000000000000000000" pitchFamily="2" charset="0"/>
-                  <a:ea typeface="Roboto" panose="02000000000000000000" pitchFamily="2" charset="0"/>
-                </a:rPr>
-                <a:t>letra a la </a:t>
-              </a:r>
-              <a:r>
-                <a:rPr lang="es-MX" sz="2200" b="1" dirty="0">
-                  <a:solidFill>
-                    <a:srgbClr val="FFC000"/>
-                  </a:solidFill>
-                  <a:latin typeface="Roboto" panose="02000000000000000000" pitchFamily="2" charset="0"/>
-                  <a:ea typeface="Roboto" panose="02000000000000000000" pitchFamily="2" charset="0"/>
-                </a:rPr>
-                <a:t>der</a:t>
+                <a:t> carácter </a:t>
               </a:r>
               <a:endParaRPr lang="es-MX" sz="2200" b="1" dirty="0">
                 <a:solidFill>
@@ -7765,17 +7664,7 @@
             </a:p>
             <a:p>
               <a:r>
-                <a:rPr lang="es-MX" sz="2200" b="1" dirty="0">
-                  <a:solidFill>
-                    <a:srgbClr val="FFC000"/>
-                  </a:solidFill>
-                  <a:latin typeface="Roboto" panose="02000000000000000000" pitchFamily="2" charset="0"/>
-                  <a:ea typeface="Roboto" panose="02000000000000000000" pitchFamily="2" charset="0"/>
-                </a:rPr>
-                <a:t>	</a:t>
-              </a:r>
-              <a:r>
-                <a:rPr lang="es-MX" sz="2400" dirty="0" smtClean="0">
+                <a:rPr lang="es-MX" sz="2400" dirty="0">
                   <a:solidFill>
                     <a:schemeClr val="bg1">
                       <a:lumMod val="95000"/>
@@ -7784,7 +7673,7 @@
                   <a:latin typeface="Roboto" panose="02000000000000000000" pitchFamily="2" charset="0"/>
                   <a:ea typeface="Roboto" panose="02000000000000000000" pitchFamily="2" charset="0"/>
                 </a:rPr>
-                <a:t>l ó ←</a:t>
+                <a:t>	* + a</a:t>
               </a:r>
               <a:endParaRPr lang="es-MX" sz="2400" dirty="0">
                 <a:solidFill>
@@ -7920,10 +7809,10 @@
         </p:nvGrpSpPr>
         <p:grpSpPr>
           <a:xfrm>
-            <a:off x="830413" y="1505396"/>
-            <a:ext cx="10531175" cy="3847208"/>
-            <a:chOff x="759125" y="1794293"/>
-            <a:chExt cx="10531175" cy="3847208"/>
+            <a:off x="830412" y="1505396"/>
+            <a:ext cx="10531176" cy="4278095"/>
+            <a:chOff x="759124" y="1794293"/>
+            <a:chExt cx="10531176" cy="4278095"/>
           </a:xfrm>
         </p:grpSpPr>
         <p:sp>
@@ -7934,8 +7823,8 @@
           </p:nvSpPr>
           <p:spPr>
             <a:xfrm>
-              <a:off x="759125" y="1794294"/>
-              <a:ext cx="4473275" cy="3847207"/>
+              <a:off x="759124" y="1794294"/>
+              <a:ext cx="5435917" cy="4278094"/>
             </a:xfrm>
             <a:prstGeom prst="rect">
               <a:avLst/>
@@ -7959,72 +7848,8 @@
                   <a:latin typeface="Roboto" panose="02000000000000000000" pitchFamily="2" charset="0"/>
                   <a:ea typeface="Roboto" panose="02000000000000000000" pitchFamily="2" charset="0"/>
                 </a:rPr>
-                <a:t>Insertar texto </a:t>
-              </a:r>
-              <a:r>
-                <a:rPr lang="es-MX" sz="2200" b="1" dirty="0">
-                  <a:solidFill>
-                    <a:srgbClr val="FFC000"/>
-                  </a:solidFill>
-                  <a:latin typeface="Roboto" panose="02000000000000000000" pitchFamily="2" charset="0"/>
-                  <a:ea typeface="Roboto" panose="02000000000000000000" pitchFamily="2" charset="0"/>
-                </a:rPr>
-                <a:t>(después de ‘</a:t>
-              </a:r>
-              <a:r>
-                <a:rPr lang="es-MX" sz="2200" b="1" dirty="0" err="1">
-                  <a:solidFill>
-                    <a:srgbClr val="FFC000"/>
-                  </a:solidFill>
-                  <a:latin typeface="Roboto" panose="02000000000000000000" pitchFamily="2" charset="0"/>
-                  <a:ea typeface="Roboto" panose="02000000000000000000" pitchFamily="2" charset="0"/>
-                </a:rPr>
-                <a:t>esc</a:t>
-              </a:r>
-              <a:r>
-                <a:rPr lang="es-MX" sz="2200" b="1" dirty="0">
-                  <a:solidFill>
-                    <a:srgbClr val="FFC000"/>
-                  </a:solidFill>
-                  <a:latin typeface="Roboto" panose="02000000000000000000" pitchFamily="2" charset="0"/>
-                  <a:ea typeface="Roboto" panose="02000000000000000000" pitchFamily="2" charset="0"/>
-                </a:rPr>
-                <a:t>’)</a:t>
-              </a:r>
-              <a:endParaRPr lang="es-MX" sz="2200" b="1" dirty="0">
-                <a:solidFill>
-                  <a:srgbClr val="FFC000"/>
-                </a:solidFill>
-                <a:latin typeface="Roboto" panose="02000000000000000000" pitchFamily="2" charset="0"/>
-                <a:ea typeface="Roboto" panose="02000000000000000000" pitchFamily="2" charset="0"/>
-              </a:endParaRPr>
-            </a:p>
-            <a:p>
-              <a:r>
-                <a:rPr lang="es-MX" sz="2400" dirty="0" smtClean="0">
-                  <a:solidFill>
-                    <a:schemeClr val="bg1">
-                      <a:lumMod val="95000"/>
-                    </a:schemeClr>
-                  </a:solidFill>
-                  <a:latin typeface="Roboto" panose="02000000000000000000" pitchFamily="2" charset="0"/>
-                  <a:ea typeface="Roboto" panose="02000000000000000000" pitchFamily="2" charset="0"/>
-                </a:rPr>
-                <a:t>	i</a:t>
-              </a:r>
-            </a:p>
-            <a:p>
-              <a:endParaRPr lang="es-MX" sz="2400" dirty="0" smtClean="0">
-                <a:solidFill>
-                  <a:schemeClr val="bg1">
-                    <a:lumMod val="95000"/>
-                  </a:schemeClr>
-                </a:solidFill>
-                <a:latin typeface="Roboto" panose="02000000000000000000" pitchFamily="2" charset="0"/>
-                <a:ea typeface="Roboto" panose="02000000000000000000" pitchFamily="2" charset="0"/>
-              </a:endParaRPr>
-            </a:p>
-            <a:p>
+                <a:t>Reemplazar </a:t>
+              </a:r>
               <a:r>
                 <a:rPr lang="es-MX" sz="2200" dirty="0" smtClean="0">
                   <a:solidFill>
@@ -8036,11 +7861,71 @@
                   <a:latin typeface="Roboto" panose="02000000000000000000" pitchFamily="2" charset="0"/>
                   <a:ea typeface="Roboto" panose="02000000000000000000" pitchFamily="2" charset="0"/>
                 </a:rPr>
-                <a:t>Reemplazar carácter </a:t>
-              </a:r>
-              <a:endParaRPr lang="es-MX" sz="2200" b="1" dirty="0">
-                <a:solidFill>
-                  <a:srgbClr val="FFC000"/>
+                <a:t>caracteres </a:t>
+              </a:r>
+              <a:r>
+                <a:rPr lang="es-MX" sz="2200" b="1" dirty="0">
+                  <a:solidFill>
+                    <a:srgbClr val="FFC000"/>
+                  </a:solidFill>
+                  <a:latin typeface="Roboto" panose="02000000000000000000" pitchFamily="2" charset="0"/>
+                  <a:ea typeface="Roboto" panose="02000000000000000000" pitchFamily="2" charset="0"/>
+                </a:rPr>
+                <a:t>hasta </a:t>
+              </a:r>
+              <a:r>
+                <a:rPr lang="es-MX" sz="2200" b="1" dirty="0" err="1">
+                  <a:solidFill>
+                    <a:srgbClr val="FFC000"/>
+                  </a:solidFill>
+                  <a:latin typeface="Roboto" panose="02000000000000000000" pitchFamily="2" charset="0"/>
+                  <a:ea typeface="Roboto" panose="02000000000000000000" pitchFamily="2" charset="0"/>
+                </a:rPr>
+                <a:t>esc</a:t>
+              </a:r>
+              <a:r>
+                <a:rPr lang="es-MX" sz="2200" b="1" dirty="0">
+                  <a:solidFill>
+                    <a:srgbClr val="FFC000"/>
+                  </a:solidFill>
+                  <a:latin typeface="Roboto" panose="02000000000000000000" pitchFamily="2" charset="0"/>
+                  <a:ea typeface="Roboto" panose="02000000000000000000" pitchFamily="2" charset="0"/>
+                </a:rPr>
+                <a:t> </a:t>
+              </a:r>
+            </a:p>
+            <a:p>
+              <a:r>
+                <a:rPr lang="es-MX" dirty="0">
+                  <a:solidFill>
+                    <a:schemeClr val="bg1">
+                      <a:lumMod val="95000"/>
+                    </a:schemeClr>
+                  </a:solidFill>
+                  <a:latin typeface="Roboto" panose="02000000000000000000" pitchFamily="2" charset="0"/>
+                  <a:ea typeface="Roboto" panose="02000000000000000000" pitchFamily="2" charset="0"/>
+                </a:rPr>
+                <a:t>	</a:t>
+              </a:r>
+              <a:r>
+                <a:rPr lang="es-MX" sz="2400" dirty="0" smtClean="0">
+                  <a:solidFill>
+                    <a:schemeClr val="bg1">
+                      <a:lumMod val="95000"/>
+                    </a:schemeClr>
+                  </a:solidFill>
+                  <a:latin typeface="Roboto" panose="02000000000000000000" pitchFamily="2" charset="0"/>
+                  <a:ea typeface="Roboto" panose="02000000000000000000" pitchFamily="2" charset="0"/>
+                </a:rPr>
+                <a:t>R</a:t>
+              </a:r>
+            </a:p>
+            <a:p>
+              <a:endParaRPr lang="es-MX" sz="2400" dirty="0">
+                <a:solidFill>
+                  <a:schemeClr val="bg1">
+                    <a:lumMod val="95000"/>
+                  </a:schemeClr>
                 </a:solidFill>
                 <a:latin typeface="Roboto" panose="02000000000000000000" pitchFamily="2" charset="0"/>
                 <a:ea typeface="Roboto" panose="02000000000000000000" pitchFamily="2" charset="0"/>
@@ -8048,51 +7933,35 @@
             </a:p>
             <a:p>
               <a:r>
-                <a:rPr lang="es-MX" sz="2400" dirty="0">
-                  <a:solidFill>
-                    <a:schemeClr val="bg1">
-                      <a:lumMod val="95000"/>
-                    </a:schemeClr>
+                <a:rPr lang="es-MX" sz="2200" b="1" dirty="0">
+                  <a:solidFill>
+                    <a:srgbClr val="FFC000"/>
                   </a:solidFill>
                   <a:latin typeface="Roboto" panose="02000000000000000000" pitchFamily="2" charset="0"/>
                   <a:ea typeface="Roboto" panose="02000000000000000000" pitchFamily="2" charset="0"/>
                 </a:rPr>
-                <a:t>	</a:t>
-              </a:r>
-              <a:r>
-                <a:rPr lang="es-MX" sz="2400" dirty="0" smtClean="0">
-                  <a:solidFill>
-                    <a:schemeClr val="bg1">
-                      <a:lumMod val="95000"/>
-                    </a:schemeClr>
+                <a:t>Eliminar </a:t>
+              </a:r>
+              <a:r>
+                <a:rPr lang="es-MX" sz="2200" b="1" dirty="0" err="1">
+                  <a:solidFill>
+                    <a:srgbClr val="FFC000"/>
                   </a:solidFill>
                   <a:latin typeface="Roboto" panose="02000000000000000000" pitchFamily="2" charset="0"/>
                   <a:ea typeface="Roboto" panose="02000000000000000000" pitchFamily="2" charset="0"/>
                 </a:rPr>
-                <a:t>* + a</a:t>
-              </a:r>
-              <a:endParaRPr lang="es-MX" sz="2400" dirty="0">
-                <a:solidFill>
-                  <a:schemeClr val="bg1">
-                    <a:lumMod val="95000"/>
-                  </a:schemeClr>
-                </a:solidFill>
-                <a:latin typeface="Roboto" panose="02000000000000000000" pitchFamily="2" charset="0"/>
-                <a:ea typeface="Roboto" panose="02000000000000000000" pitchFamily="2" charset="0"/>
-              </a:endParaRPr>
-            </a:p>
-            <a:p>
-              <a:endParaRPr lang="es-MX" dirty="0" smtClean="0">
-                <a:solidFill>
-                  <a:schemeClr val="bg1">
-                    <a:lumMod val="95000"/>
-                  </a:schemeClr>
-                </a:solidFill>
-                <a:latin typeface="Roboto" panose="02000000000000000000" pitchFamily="2" charset="0"/>
-                <a:ea typeface="Roboto" panose="02000000000000000000" pitchFamily="2" charset="0"/>
-              </a:endParaRPr>
-            </a:p>
-            <a:p>
+                <a:t>caracter</a:t>
+              </a:r>
+              <a:r>
+                <a:rPr lang="es-MX" sz="2200" b="1" dirty="0">
+                  <a:solidFill>
+                    <a:srgbClr val="FFC000"/>
+                  </a:solidFill>
+                  <a:latin typeface="Roboto" panose="02000000000000000000" pitchFamily="2" charset="0"/>
+                  <a:ea typeface="Roboto" panose="02000000000000000000" pitchFamily="2" charset="0"/>
+                </a:rPr>
+                <a:t> </a:t>
+              </a:r>
               <a:r>
                 <a:rPr lang="es-MX" sz="2200" dirty="0">
                   <a:solidFill>
@@ -8104,7 +7973,7 @@
                   <a:latin typeface="Roboto" panose="02000000000000000000" pitchFamily="2" charset="0"/>
                   <a:ea typeface="Roboto" panose="02000000000000000000" pitchFamily="2" charset="0"/>
                 </a:rPr>
-                <a:t>Reemplazar </a:t>
+                <a:t>frente al </a:t>
               </a:r>
               <a:r>
                 <a:rPr lang="es-MX" sz="2200" dirty="0" smtClean="0">
@@ -8117,41 +7986,78 @@
                   <a:latin typeface="Roboto" panose="02000000000000000000" pitchFamily="2" charset="0"/>
                   <a:ea typeface="Roboto" panose="02000000000000000000" pitchFamily="2" charset="0"/>
                 </a:rPr>
-                <a:t>caracteres </a:t>
-              </a:r>
-              <a:r>
-                <a:rPr lang="es-MX" sz="2200" b="1" dirty="0">
-                  <a:solidFill>
-                    <a:srgbClr val="FFC000"/>
+                <a:t>cursor</a:t>
+              </a:r>
+            </a:p>
+            <a:p>
+              <a:r>
+                <a:rPr lang="es-MX" sz="2200" dirty="0">
+                  <a:solidFill>
+                    <a:schemeClr val="accent6">
+                      <a:lumMod val="40000"/>
+                      <a:lumOff val="60000"/>
+                    </a:schemeClr>
                   </a:solidFill>
                   <a:latin typeface="Roboto" panose="02000000000000000000" pitchFamily="2" charset="0"/>
                   <a:ea typeface="Roboto" panose="02000000000000000000" pitchFamily="2" charset="0"/>
                 </a:rPr>
-                <a:t>hasta </a:t>
-              </a:r>
-              <a:r>
-                <a:rPr lang="es-MX" sz="2200" b="1" dirty="0" err="1">
-                  <a:solidFill>
-                    <a:srgbClr val="FFC000"/>
+                <a:t>	</a:t>
+              </a:r>
+              <a:r>
+                <a:rPr lang="es-MX" sz="2400" dirty="0">
+                  <a:solidFill>
+                    <a:schemeClr val="bg1">
+                      <a:lumMod val="95000"/>
+                    </a:schemeClr>
                   </a:solidFill>
                   <a:latin typeface="Roboto" panose="02000000000000000000" pitchFamily="2" charset="0"/>
                   <a:ea typeface="Roboto" panose="02000000000000000000" pitchFamily="2" charset="0"/>
                 </a:rPr>
-                <a:t>esc</a:t>
-              </a:r>
-              <a:r>
-                <a:rPr lang="es-MX" sz="2200" b="1" dirty="0">
-                  <a:solidFill>
-                    <a:srgbClr val="FFC000"/>
+                <a:t>* </a:t>
+              </a:r>
+              <a:r>
+                <a:rPr lang="es-MX" sz="1600" dirty="0">
+                  <a:solidFill>
+                    <a:schemeClr val="bg1">
+                      <a:lumMod val="75000"/>
+                    </a:schemeClr>
                   </a:solidFill>
                   <a:latin typeface="Roboto" panose="02000000000000000000" pitchFamily="2" charset="0"/>
                   <a:ea typeface="Roboto" panose="02000000000000000000" pitchFamily="2" charset="0"/>
                 </a:rPr>
+                <a:t>+</a:t>
+              </a:r>
+              <a:r>
+                <a:rPr lang="es-MX" sz="2400" dirty="0">
+                  <a:solidFill>
+                    <a:schemeClr val="bg1">
+                      <a:lumMod val="95000"/>
+                    </a:schemeClr>
+                  </a:solidFill>
+                  <a:latin typeface="Roboto" panose="02000000000000000000" pitchFamily="2" charset="0"/>
+                  <a:ea typeface="Roboto" panose="02000000000000000000" pitchFamily="2" charset="0"/>
+                </a:rPr>
                 <a:t> </a:t>
               </a:r>
-              <a:endParaRPr lang="es-MX" sz="2200" b="1" dirty="0">
-                <a:solidFill>
-                  <a:srgbClr val="FFC000"/>
+              <a:r>
+                <a:rPr lang="es-MX" sz="2400" dirty="0" smtClean="0">
+                  <a:solidFill>
+                    <a:schemeClr val="bg1">
+                      <a:lumMod val="95000"/>
+                    </a:schemeClr>
+                  </a:solidFill>
+                  <a:latin typeface="Roboto" panose="02000000000000000000" pitchFamily="2" charset="0"/>
+                  <a:ea typeface="Roboto" panose="02000000000000000000" pitchFamily="2" charset="0"/>
+                </a:rPr>
+                <a:t>x</a:t>
+              </a:r>
+            </a:p>
+            <a:p>
+              <a:endParaRPr lang="es-MX" sz="2400" dirty="0">
+                <a:solidFill>
+                  <a:schemeClr val="bg1">
+                    <a:lumMod val="95000"/>
+                  </a:schemeClr>
                 </a:solidFill>
                 <a:latin typeface="Roboto" panose="02000000000000000000" pitchFamily="2" charset="0"/>
                 <a:ea typeface="Roboto" panose="02000000000000000000" pitchFamily="2" charset="0"/>
@@ -8159,7 +8065,78 @@
             </a:p>
             <a:p>
               <a:r>
-                <a:rPr lang="es-MX" dirty="0">
+                <a:rPr lang="es-MX" sz="2200" b="1" dirty="0">
+                  <a:solidFill>
+                    <a:srgbClr val="FFC000"/>
+                  </a:solidFill>
+                  <a:latin typeface="Roboto" panose="02000000000000000000" pitchFamily="2" charset="0"/>
+                  <a:ea typeface="Roboto" panose="02000000000000000000" pitchFamily="2" charset="0"/>
+                </a:rPr>
+                <a:t>Eliminar </a:t>
+              </a:r>
+              <a:r>
+                <a:rPr lang="es-MX" sz="2200" b="1" dirty="0" smtClean="0">
+                  <a:solidFill>
+                    <a:srgbClr val="FFC000"/>
+                  </a:solidFill>
+                  <a:latin typeface="Roboto" panose="02000000000000000000" pitchFamily="2" charset="0"/>
+                  <a:ea typeface="Roboto" panose="02000000000000000000" pitchFamily="2" charset="0"/>
+                </a:rPr>
+                <a:t>N </a:t>
+              </a:r>
+              <a:r>
+                <a:rPr lang="es-MX" sz="2200" b="1" dirty="0">
+                  <a:solidFill>
+                    <a:srgbClr val="FFC000"/>
+                  </a:solidFill>
+                  <a:latin typeface="Roboto" panose="02000000000000000000" pitchFamily="2" charset="0"/>
+                  <a:ea typeface="Roboto" panose="02000000000000000000" pitchFamily="2" charset="0"/>
+                </a:rPr>
+                <a:t>caracteres </a:t>
+              </a:r>
+              <a:r>
+                <a:rPr lang="es-MX" sz="2200" dirty="0">
+                  <a:solidFill>
+                    <a:schemeClr val="accent6">
+                      <a:lumMod val="40000"/>
+                      <a:lumOff val="60000"/>
+                    </a:schemeClr>
+                  </a:solidFill>
+                  <a:latin typeface="Roboto" panose="02000000000000000000" pitchFamily="2" charset="0"/>
+                  <a:ea typeface="Roboto" panose="02000000000000000000" pitchFamily="2" charset="0"/>
+                </a:rPr>
+                <a:t>frente al </a:t>
+              </a:r>
+              <a:r>
+                <a:rPr lang="es-MX" sz="2200" dirty="0" smtClean="0">
+                  <a:solidFill>
+                    <a:schemeClr val="accent6">
+                      <a:lumMod val="40000"/>
+                      <a:lumOff val="60000"/>
+                    </a:schemeClr>
+                  </a:solidFill>
+                  <a:latin typeface="Roboto" panose="02000000000000000000" pitchFamily="2" charset="0"/>
+                  <a:ea typeface="Roboto" panose="02000000000000000000" pitchFamily="2" charset="0"/>
+                </a:rPr>
+                <a:t>cursor</a:t>
+              </a:r>
+            </a:p>
+            <a:p>
+              <a:r>
+                <a:rPr lang="es-MX" sz="2200" dirty="0">
+                  <a:solidFill>
+                    <a:schemeClr val="accent6">
+                      <a:lumMod val="40000"/>
+                      <a:lumOff val="60000"/>
+                    </a:schemeClr>
+                  </a:solidFill>
+                  <a:latin typeface="Roboto" panose="02000000000000000000" pitchFamily="2" charset="0"/>
+                  <a:ea typeface="Roboto" panose="02000000000000000000" pitchFamily="2" charset="0"/>
+                </a:rPr>
+                <a:t>	</a:t>
+              </a:r>
+              <a:r>
+                <a:rPr lang="es-MX" sz="2400" dirty="0" err="1">
                   <a:solidFill>
                     <a:schemeClr val="bg1">
                       <a:lumMod val="95000"/>
@@ -8168,10 +8145,71 @@
                   <a:latin typeface="Roboto" panose="02000000000000000000" pitchFamily="2" charset="0"/>
                   <a:ea typeface="Roboto" panose="02000000000000000000" pitchFamily="2" charset="0"/>
                 </a:rPr>
+                <a:t>Nx</a:t>
+              </a:r>
+              <a:endParaRPr lang="es-MX" sz="2400" dirty="0">
+                <a:solidFill>
+                  <a:schemeClr val="bg1">
+                    <a:lumMod val="95000"/>
+                  </a:schemeClr>
+                </a:solidFill>
+                <a:latin typeface="Roboto" panose="02000000000000000000" pitchFamily="2" charset="0"/>
+                <a:ea typeface="Roboto" panose="02000000000000000000" pitchFamily="2" charset="0"/>
+              </a:endParaRPr>
+            </a:p>
+            <a:p>
+              <a:endParaRPr lang="es-MX" sz="2200" dirty="0">
+                <a:solidFill>
+                  <a:schemeClr val="accent6">
+                    <a:lumMod val="40000"/>
+                    <a:lumOff val="60000"/>
+                  </a:schemeClr>
+                </a:solidFill>
+                <a:latin typeface="Roboto" panose="02000000000000000000" pitchFamily="2" charset="0"/>
+                <a:ea typeface="Roboto" panose="02000000000000000000" pitchFamily="2" charset="0"/>
+              </a:endParaRPr>
+            </a:p>
+            <a:p>
+              <a:r>
+                <a:rPr lang="es-MX" sz="2200" b="1" dirty="0">
+                  <a:solidFill>
+                    <a:srgbClr val="FFC000"/>
+                  </a:solidFill>
+                  <a:latin typeface="Roboto" panose="02000000000000000000" pitchFamily="2" charset="0"/>
+                  <a:ea typeface="Roboto" panose="02000000000000000000" pitchFamily="2" charset="0"/>
+                </a:rPr>
+                <a:t>Eliminar resto de línea </a:t>
+              </a:r>
+              <a:r>
+                <a:rPr lang="es-MX" sz="2200" dirty="0" smtClean="0">
+                  <a:solidFill>
+                    <a:schemeClr val="accent6">
+                      <a:lumMod val="40000"/>
+                      <a:lumOff val="60000"/>
+                    </a:schemeClr>
+                  </a:solidFill>
+                  <a:latin typeface="Roboto" panose="02000000000000000000" pitchFamily="2" charset="0"/>
+                  <a:ea typeface="Roboto" panose="02000000000000000000" pitchFamily="2" charset="0"/>
+                </a:rPr>
+                <a:t>después de cursor</a:t>
+              </a:r>
+            </a:p>
+            <a:p>
+              <a:r>
+                <a:rPr lang="es-MX" sz="2200" dirty="0">
+                  <a:solidFill>
+                    <a:schemeClr val="accent6">
+                      <a:lumMod val="40000"/>
+                      <a:lumOff val="60000"/>
+                    </a:schemeClr>
+                  </a:solidFill>
+                  <a:latin typeface="Roboto" panose="02000000000000000000" pitchFamily="2" charset="0"/>
+                  <a:ea typeface="Roboto" panose="02000000000000000000" pitchFamily="2" charset="0"/>
+                </a:rPr>
                 <a:t>	</a:t>
               </a:r>
               <a:r>
-                <a:rPr lang="es-MX" sz="2400" dirty="0" smtClean="0">
+                <a:rPr lang="es-MX" sz="2400" dirty="0">
                   <a:solidFill>
                     <a:schemeClr val="bg1">
                       <a:lumMod val="95000"/>
@@ -8180,7 +8218,7 @@
                   <a:latin typeface="Roboto" panose="02000000000000000000" pitchFamily="2" charset="0"/>
                   <a:ea typeface="Roboto" panose="02000000000000000000" pitchFamily="2" charset="0"/>
                 </a:rPr>
-                <a:t>R</a:t>
+                <a:t>D</a:t>
               </a:r>
               <a:endParaRPr lang="es-MX" sz="2400" dirty="0">
                 <a:solidFill>
@@ -8194,107 +8232,6 @@
             </a:p>
             <a:p>
               <a:endParaRPr lang="es-MX" dirty="0" smtClean="0"/>
-            </a:p>
-            <a:p>
-              <a:r>
-                <a:rPr lang="es-MX" sz="2200" dirty="0">
-                  <a:solidFill>
-                    <a:schemeClr val="accent6">
-                      <a:lumMod val="40000"/>
-                      <a:lumOff val="60000"/>
-                    </a:schemeClr>
-                  </a:solidFill>
-                  <a:latin typeface="Roboto" panose="02000000000000000000" pitchFamily="2" charset="0"/>
-                  <a:ea typeface="Roboto" panose="02000000000000000000" pitchFamily="2" charset="0"/>
-                </a:rPr>
-                <a:t>Cursor </a:t>
-              </a:r>
-              <a:r>
-                <a:rPr lang="es-MX" sz="2200" b="1" dirty="0" smtClean="0">
-                  <a:solidFill>
-                    <a:srgbClr val="FFC000"/>
-                  </a:solidFill>
-                  <a:latin typeface="Roboto" panose="02000000000000000000" pitchFamily="2" charset="0"/>
-                  <a:ea typeface="Roboto" panose="02000000000000000000" pitchFamily="2" charset="0"/>
-                </a:rPr>
-                <a:t>última línea </a:t>
-              </a:r>
-              <a:endParaRPr lang="es-MX" sz="2200" b="1" dirty="0">
-                <a:solidFill>
-                  <a:srgbClr val="FFC000"/>
-                </a:solidFill>
-                <a:latin typeface="Roboto" panose="02000000000000000000" pitchFamily="2" charset="0"/>
-                <a:ea typeface="Roboto" panose="02000000000000000000" pitchFamily="2" charset="0"/>
-              </a:endParaRPr>
-            </a:p>
-            <a:p>
-              <a:r>
-                <a:rPr lang="es-MX" sz="2200" b="1" dirty="0">
-                  <a:solidFill>
-                    <a:srgbClr val="FFC000"/>
-                  </a:solidFill>
-                  <a:latin typeface="Roboto" panose="02000000000000000000" pitchFamily="2" charset="0"/>
-                  <a:ea typeface="Roboto" panose="02000000000000000000" pitchFamily="2" charset="0"/>
-                </a:rPr>
-                <a:t>	</a:t>
-              </a:r>
-              <a:r>
-                <a:rPr lang="es-MX" sz="2400" dirty="0" err="1">
-                  <a:solidFill>
-                    <a:schemeClr val="bg1">
-                      <a:lumMod val="95000"/>
-                    </a:schemeClr>
-                  </a:solidFill>
-                  <a:latin typeface="Roboto" panose="02000000000000000000" pitchFamily="2" charset="0"/>
-                  <a:ea typeface="Roboto" panose="02000000000000000000" pitchFamily="2" charset="0"/>
-                </a:rPr>
-                <a:t>esc</a:t>
-              </a:r>
-              <a:r>
-                <a:rPr lang="es-MX" sz="2400" dirty="0">
-                  <a:solidFill>
-                    <a:schemeClr val="bg1">
-                      <a:lumMod val="95000"/>
-                    </a:schemeClr>
-                  </a:solidFill>
-                  <a:latin typeface="Roboto" panose="02000000000000000000" pitchFamily="2" charset="0"/>
-                  <a:ea typeface="Roboto" panose="02000000000000000000" pitchFamily="2" charset="0"/>
-                </a:rPr>
-                <a:t> -&gt; </a:t>
-              </a:r>
-              <a:r>
-                <a:rPr lang="es-MX" sz="2400" dirty="0" smtClean="0">
-                  <a:solidFill>
-                    <a:schemeClr val="bg1">
-                      <a:lumMod val="95000"/>
-                    </a:schemeClr>
-                  </a:solidFill>
-                  <a:latin typeface="Roboto" panose="02000000000000000000" pitchFamily="2" charset="0"/>
-                  <a:ea typeface="Roboto" panose="02000000000000000000" pitchFamily="2" charset="0"/>
-                </a:rPr>
-                <a:t>:</a:t>
-              </a:r>
-              <a:r>
-                <a:rPr lang="es-MX" sz="2400" dirty="0">
-                  <a:solidFill>
-                    <a:schemeClr val="bg1">
-                      <a:lumMod val="95000"/>
-                    </a:schemeClr>
-                  </a:solidFill>
-                  <a:latin typeface="Roboto" panose="02000000000000000000" pitchFamily="2" charset="0"/>
-                  <a:ea typeface="Roboto" panose="02000000000000000000" pitchFamily="2" charset="0"/>
-                </a:rPr>
-                <a:t>$</a:t>
-              </a:r>
-              <a:endParaRPr lang="es-MX" sz="2400" dirty="0">
-                <a:solidFill>
-                  <a:schemeClr val="bg1">
-                    <a:lumMod val="95000"/>
-                  </a:schemeClr>
-                </a:solidFill>
-                <a:latin typeface="Roboto" panose="02000000000000000000" pitchFamily="2" charset="0"/>
-                <a:ea typeface="Roboto" panose="02000000000000000000" pitchFamily="2" charset="0"/>
-              </a:endParaRPr>
             </a:p>
           </p:txBody>
         </p:sp>
@@ -8307,7 +8244,7 @@
           <p:spPr>
             <a:xfrm>
               <a:off x="6817025" y="1794293"/>
-              <a:ext cx="4473275" cy="3847207"/>
+              <a:ext cx="4473275" cy="3939540"/>
             </a:xfrm>
             <a:prstGeom prst="rect">
               <a:avLst/>
@@ -8321,7 +8258,17 @@
             <a:lstStyle/>
             <a:p>
               <a:r>
-                <a:rPr lang="es-MX" sz="2200" dirty="0">
+                <a:rPr lang="es-MX" sz="2200" b="1" dirty="0">
+                  <a:solidFill>
+                    <a:srgbClr val="FFC000"/>
+                  </a:solidFill>
+                  <a:latin typeface="Roboto" panose="02000000000000000000" pitchFamily="2" charset="0"/>
+                  <a:ea typeface="Roboto" panose="02000000000000000000" pitchFamily="2" charset="0"/>
+                </a:rPr>
+                <a:t>Buscar adelante </a:t>
+              </a:r>
+              <a:r>
+                <a:rPr lang="es-MX" sz="2200" dirty="0" smtClean="0">
                   <a:solidFill>
                     <a:schemeClr val="accent6">
                       <a:lumMod val="40000"/>
@@ -8331,28 +8278,15 @@
                   <a:latin typeface="Roboto" panose="02000000000000000000" pitchFamily="2" charset="0"/>
                   <a:ea typeface="Roboto" panose="02000000000000000000" pitchFamily="2" charset="0"/>
                 </a:rPr>
-                <a:t>Cursor </a:t>
-              </a:r>
-              <a:r>
-                <a:rPr lang="es-MX" sz="2200" b="1" dirty="0" smtClean="0">
-                  <a:solidFill>
-                    <a:srgbClr val="FFC000"/>
-                  </a:solidFill>
-                  <a:latin typeface="Roboto" panose="02000000000000000000" pitchFamily="2" charset="0"/>
-                  <a:ea typeface="Roboto" panose="02000000000000000000" pitchFamily="2" charset="0"/>
-                </a:rPr>
-                <a:t>n </a:t>
-              </a:r>
-              <a:r>
-                <a:rPr lang="es-MX" sz="2200" b="1" dirty="0">
-                  <a:solidFill>
-                    <a:srgbClr val="FFC000"/>
-                  </a:solidFill>
-                  <a:latin typeface="Roboto" panose="02000000000000000000" pitchFamily="2" charset="0"/>
-                  <a:ea typeface="Roboto" panose="02000000000000000000" pitchFamily="2" charset="0"/>
-                </a:rPr>
-                <a:t>línea </a:t>
-              </a:r>
+                <a:t>cadena</a:t>
+              </a:r>
+              <a:endParaRPr lang="es-MX" sz="2200" b="1" dirty="0">
+                <a:solidFill>
+                  <a:srgbClr val="FFC000"/>
+                </a:solidFill>
+                <a:latin typeface="Roboto" panose="02000000000000000000" pitchFamily="2" charset="0"/>
+                <a:ea typeface="Roboto" panose="02000000000000000000" pitchFamily="2" charset="0"/>
+              </a:endParaRPr>
             </a:p>
             <a:p>
               <a:r>
@@ -8368,7 +8302,7 @@
                 <a:t>	</a:t>
               </a:r>
               <a:r>
-                <a:rPr lang="es-MX" sz="2400" dirty="0" err="1">
+                <a:rPr lang="es-MX" sz="2400" dirty="0" smtClean="0">
                   <a:solidFill>
                     <a:schemeClr val="bg1">
                       <a:lumMod val="95000"/>
@@ -8377,31 +8311,7 @@
                   <a:latin typeface="Roboto" panose="02000000000000000000" pitchFamily="2" charset="0"/>
                   <a:ea typeface="Roboto" panose="02000000000000000000" pitchFamily="2" charset="0"/>
                 </a:rPr>
-                <a:t>esc</a:t>
-              </a:r>
-              <a:r>
-                <a:rPr lang="es-MX" sz="2400" dirty="0">
-                  <a:solidFill>
-                    <a:schemeClr val="bg1">
-                      <a:lumMod val="95000"/>
-                    </a:schemeClr>
-                  </a:solidFill>
-                  <a:latin typeface="Roboto" panose="02000000000000000000" pitchFamily="2" charset="0"/>
-                  <a:ea typeface="Roboto" panose="02000000000000000000" pitchFamily="2" charset="0"/>
-                </a:rPr>
-                <a:t> -&gt; </a:t>
-              </a:r>
-              <a:r>
-                <a:rPr lang="es-MX" sz="2400" dirty="0" smtClean="0">
-                  <a:solidFill>
-                    <a:schemeClr val="bg1">
-                      <a:lumMod val="95000"/>
-                    </a:schemeClr>
-                  </a:solidFill>
-                  <a:latin typeface="Roboto" panose="02000000000000000000" pitchFamily="2" charset="0"/>
-                  <a:ea typeface="Roboto" panose="02000000000000000000" pitchFamily="2" charset="0"/>
-                </a:rPr>
-                <a:t>:n</a:t>
+                <a:t>/”cadena”</a:t>
               </a:r>
               <a:endParaRPr lang="es-MX" sz="2400" dirty="0">
                 <a:solidFill>
@@ -8426,17 +8336,17 @@
             </a:p>
             <a:p>
               <a:r>
-                <a:rPr lang="es-MX" sz="2200" b="1" dirty="0">
+                <a:rPr lang="es-MX" sz="2200" b="1" dirty="0" smtClean="0">
                   <a:solidFill>
                     <a:srgbClr val="FFC000"/>
                   </a:solidFill>
                   <a:latin typeface="Roboto" panose="02000000000000000000" pitchFamily="2" charset="0"/>
                   <a:ea typeface="Roboto" panose="02000000000000000000" pitchFamily="2" charset="0"/>
                 </a:rPr>
-                <a:t>Descartar cambios </a:t>
-              </a:r>
-              <a:r>
-                <a:rPr lang="es-MX" sz="2200" dirty="0" smtClean="0">
+                <a:t>Buscar detrás </a:t>
+              </a:r>
+              <a:r>
+                <a:rPr lang="es-MX" sz="2200" dirty="0">
                   <a:solidFill>
                     <a:schemeClr val="accent6">
                       <a:lumMod val="40000"/>
@@ -8446,11 +8356,14 @@
                   <a:latin typeface="Roboto" panose="02000000000000000000" pitchFamily="2" charset="0"/>
                   <a:ea typeface="Roboto" panose="02000000000000000000" pitchFamily="2" charset="0"/>
                 </a:rPr>
-                <a:t>en la sesión</a:t>
-              </a:r>
-              <a:endParaRPr lang="es-MX" sz="2200" b="1" dirty="0">
-                <a:solidFill>
-                  <a:srgbClr val="FFC000"/>
+                <a:t>cadena</a:t>
+              </a:r>
+              <a:endParaRPr lang="es-MX" sz="2200" dirty="0">
+                <a:solidFill>
+                  <a:schemeClr val="accent6">
+                    <a:lumMod val="40000"/>
+                    <a:lumOff val="60000"/>
+                  </a:schemeClr>
                 </a:solidFill>
                 <a:latin typeface="Roboto" panose="02000000000000000000" pitchFamily="2" charset="0"/>
                 <a:ea typeface="Roboto" panose="02000000000000000000" pitchFamily="2" charset="0"/>
@@ -8458,6 +8371,10 @@
             </a:p>
             <a:p>
               <a:r>
+                <a:rPr lang="es-MX" dirty="0"/>
+                <a:t>	</a:t>
+              </a:r>
+              <a:r>
                 <a:rPr lang="es-MX" sz="2400" dirty="0">
                   <a:solidFill>
                     <a:schemeClr val="bg1">
@@ -8467,7 +8384,7 @@
                   <a:latin typeface="Roboto" panose="02000000000000000000" pitchFamily="2" charset="0"/>
                   <a:ea typeface="Roboto" panose="02000000000000000000" pitchFamily="2" charset="0"/>
                 </a:rPr>
-                <a:t>	</a:t>
+                <a:t>?”cadena</a:t>
               </a:r>
               <a:r>
                 <a:rPr lang="es-MX" sz="2400" dirty="0" smtClean="0">
@@ -8479,22 +8396,55 @@
                   <a:latin typeface="Roboto" panose="02000000000000000000" pitchFamily="2" charset="0"/>
                   <a:ea typeface="Roboto" panose="02000000000000000000" pitchFamily="2" charset="0"/>
                 </a:rPr>
-                <a:t>* </a:t>
-              </a:r>
-              <a:r>
-                <a:rPr lang="es-MX" sz="1600" dirty="0" smtClean="0">
-                  <a:solidFill>
-                    <a:schemeClr val="bg1">
-                      <a:lumMod val="75000"/>
-                    </a:schemeClr>
+                <a:t>”</a:t>
+              </a:r>
+            </a:p>
+            <a:p>
+              <a:endParaRPr lang="es-MX" sz="2400" dirty="0">
+                <a:solidFill>
+                  <a:schemeClr val="bg1">
+                    <a:lumMod val="95000"/>
+                  </a:schemeClr>
+                </a:solidFill>
+                <a:latin typeface="Roboto" panose="02000000000000000000" pitchFamily="2" charset="0"/>
+                <a:ea typeface="Roboto" panose="02000000000000000000" pitchFamily="2" charset="0"/>
+              </a:endParaRPr>
+            </a:p>
+            <a:p>
+              <a:r>
+                <a:rPr lang="es-MX" sz="2200" b="1" dirty="0">
+                  <a:solidFill>
+                    <a:srgbClr val="FFC000"/>
                   </a:solidFill>
                   <a:latin typeface="Roboto" panose="02000000000000000000" pitchFamily="2" charset="0"/>
                   <a:ea typeface="Roboto" panose="02000000000000000000" pitchFamily="2" charset="0"/>
                 </a:rPr>
-                <a:t>+</a:t>
-              </a:r>
-              <a:r>
-                <a:rPr lang="es-MX" sz="2400" dirty="0" smtClean="0">
+                <a:t>Número de línea </a:t>
+              </a:r>
+              <a:r>
+                <a:rPr lang="es-MX" sz="2200" dirty="0" smtClean="0">
+                  <a:solidFill>
+                    <a:schemeClr val="accent6">
+                      <a:lumMod val="40000"/>
+                      <a:lumOff val="60000"/>
+                    </a:schemeClr>
+                  </a:solidFill>
+                  <a:latin typeface="Roboto" panose="02000000000000000000" pitchFamily="2" charset="0"/>
+                  <a:ea typeface="Roboto" panose="02000000000000000000" pitchFamily="2" charset="0"/>
+                </a:rPr>
+                <a:t>(actual línea)</a:t>
+              </a:r>
+              <a:endParaRPr lang="es-MX" sz="2200" b="1" dirty="0">
+                <a:solidFill>
+                  <a:srgbClr val="FFC000"/>
+                </a:solidFill>
+                <a:latin typeface="Roboto" panose="02000000000000000000" pitchFamily="2" charset="0"/>
+                <a:ea typeface="Roboto" panose="02000000000000000000" pitchFamily="2" charset="0"/>
+              </a:endParaRPr>
+            </a:p>
+            <a:p>
+              <a:r>
+                <a:rPr lang="es-MX" dirty="0">
                   <a:solidFill>
                     <a:schemeClr val="bg1">
                       <a:lumMod val="95000"/>
@@ -8503,7 +8453,19 @@
                   <a:latin typeface="Roboto" panose="02000000000000000000" pitchFamily="2" charset="0"/>
                   <a:ea typeface="Roboto" panose="02000000000000000000" pitchFamily="2" charset="0"/>
                 </a:rPr>
-                <a:t> u</a:t>
+                <a:t>	</a:t>
+              </a:r>
+              <a:r>
+                <a:rPr lang="es-MX" sz="2400" dirty="0" smtClean="0">
+                  <a:solidFill>
+                    <a:schemeClr val="bg1">
+                      <a:lumMod val="95000"/>
+                    </a:schemeClr>
+                  </a:solidFill>
+                  <a:latin typeface="Roboto" panose="02000000000000000000" pitchFamily="2" charset="0"/>
+                  <a:ea typeface="Roboto" panose="02000000000000000000" pitchFamily="2" charset="0"/>
+                </a:rPr>
+                <a:t>:.=</a:t>
               </a:r>
               <a:endParaRPr lang="es-MX" sz="2400" dirty="0">
                 <a:solidFill>
@@ -8520,7 +8482,7 @@
             </a:p>
             <a:p>
               <a:r>
-                <a:rPr lang="es-MX" sz="2200" dirty="0">
+                <a:rPr lang="es-MX" sz="2200" dirty="0" smtClean="0">
                   <a:solidFill>
                     <a:schemeClr val="accent6">
                       <a:lumMod val="40000"/>
@@ -8530,27 +8492,7 @@
                   <a:latin typeface="Roboto" panose="02000000000000000000" pitchFamily="2" charset="0"/>
                   <a:ea typeface="Roboto" panose="02000000000000000000" pitchFamily="2" charset="0"/>
                 </a:rPr>
-                <a:t>Desplazamiento una </a:t>
-              </a:r>
-              <a:r>
-                <a:rPr lang="es-MX" sz="2200" b="1" dirty="0">
-                  <a:solidFill>
-                    <a:srgbClr val="FFC000"/>
-                  </a:solidFill>
-                  <a:latin typeface="Roboto" panose="02000000000000000000" pitchFamily="2" charset="0"/>
-                  <a:ea typeface="Roboto" panose="02000000000000000000" pitchFamily="2" charset="0"/>
-                </a:rPr>
-                <a:t>letra a la </a:t>
-              </a:r>
-              <a:r>
-                <a:rPr lang="es-MX" sz="2200" b="1" dirty="0" err="1">
-                  <a:solidFill>
-                    <a:srgbClr val="FFC000"/>
-                  </a:solidFill>
-                  <a:latin typeface="Roboto" panose="02000000000000000000" pitchFamily="2" charset="0"/>
-                  <a:ea typeface="Roboto" panose="02000000000000000000" pitchFamily="2" charset="0"/>
-                </a:rPr>
-                <a:t>izq</a:t>
+                <a:t>Número de líneas </a:t>
               </a:r>
               <a:endParaRPr lang="es-MX" sz="2200" b="1" dirty="0">
                 <a:solidFill>
@@ -8562,7 +8504,17 @@
             </a:p>
             <a:p>
               <a:r>
-                <a:rPr lang="es-MX" dirty="0">
+                <a:rPr lang="es-MX" sz="2200" b="1" dirty="0">
+                  <a:solidFill>
+                    <a:srgbClr val="FFC000"/>
+                  </a:solidFill>
+                  <a:latin typeface="Roboto" panose="02000000000000000000" pitchFamily="2" charset="0"/>
+                  <a:ea typeface="Roboto" panose="02000000000000000000" pitchFamily="2" charset="0"/>
+                </a:rPr>
+                <a:t>	</a:t>
+              </a:r>
+              <a:r>
+                <a:rPr lang="es-MX" sz="2400" dirty="0" smtClean="0">
                   <a:solidFill>
                     <a:schemeClr val="bg1">
                       <a:lumMod val="95000"/>
@@ -8571,97 +8523,7 @@
                   <a:latin typeface="Roboto" panose="02000000000000000000" pitchFamily="2" charset="0"/>
                   <a:ea typeface="Roboto" panose="02000000000000000000" pitchFamily="2" charset="0"/>
                 </a:rPr>
-                <a:t>	</a:t>
-              </a:r>
-              <a:r>
-                <a:rPr lang="es-MX" sz="2400" dirty="0" smtClean="0">
-                  <a:solidFill>
-                    <a:schemeClr val="bg1">
-                      <a:lumMod val="95000"/>
-                    </a:schemeClr>
-                  </a:solidFill>
-                  <a:latin typeface="Roboto" panose="02000000000000000000" pitchFamily="2" charset="0"/>
-                  <a:ea typeface="Roboto" panose="02000000000000000000" pitchFamily="2" charset="0"/>
-                </a:rPr>
-                <a:t>h ó →</a:t>
-              </a:r>
-              <a:endParaRPr lang="es-MX" sz="2400" dirty="0">
-                <a:solidFill>
-                  <a:schemeClr val="bg1">
-                    <a:lumMod val="95000"/>
-                  </a:schemeClr>
-                </a:solidFill>
-                <a:latin typeface="Roboto" panose="02000000000000000000" pitchFamily="2" charset="0"/>
-                <a:ea typeface="Roboto" panose="02000000000000000000" pitchFamily="2" charset="0"/>
-              </a:endParaRPr>
-            </a:p>
-            <a:p>
-              <a:endParaRPr lang="es-MX" dirty="0" smtClean="0"/>
-            </a:p>
-            <a:p>
-              <a:r>
-                <a:rPr lang="es-MX" sz="2200" dirty="0">
-                  <a:solidFill>
-                    <a:schemeClr val="accent6">
-                      <a:lumMod val="40000"/>
-                      <a:lumOff val="60000"/>
-                    </a:schemeClr>
-                  </a:solidFill>
-                  <a:latin typeface="Roboto" panose="02000000000000000000" pitchFamily="2" charset="0"/>
-                  <a:ea typeface="Roboto" panose="02000000000000000000" pitchFamily="2" charset="0"/>
-                </a:rPr>
-                <a:t>Desplazamiento una </a:t>
-              </a:r>
-              <a:r>
-                <a:rPr lang="es-MX" sz="2200" b="1" dirty="0">
-                  <a:solidFill>
-                    <a:srgbClr val="FFC000"/>
-                  </a:solidFill>
-                  <a:latin typeface="Roboto" panose="02000000000000000000" pitchFamily="2" charset="0"/>
-                  <a:ea typeface="Roboto" panose="02000000000000000000" pitchFamily="2" charset="0"/>
-                </a:rPr>
-                <a:t>letra a la </a:t>
-              </a:r>
-              <a:r>
-                <a:rPr lang="es-MX" sz="2200" b="1" dirty="0">
-                  <a:solidFill>
-                    <a:srgbClr val="FFC000"/>
-                  </a:solidFill>
-                  <a:latin typeface="Roboto" panose="02000000000000000000" pitchFamily="2" charset="0"/>
-                  <a:ea typeface="Roboto" panose="02000000000000000000" pitchFamily="2" charset="0"/>
-                </a:rPr>
-                <a:t>der</a:t>
-              </a:r>
-              <a:endParaRPr lang="es-MX" sz="2200" b="1" dirty="0">
-                <a:solidFill>
-                  <a:srgbClr val="FFC000"/>
-                </a:solidFill>
-                <a:latin typeface="Roboto" panose="02000000000000000000" pitchFamily="2" charset="0"/>
-                <a:ea typeface="Roboto" panose="02000000000000000000" pitchFamily="2" charset="0"/>
-              </a:endParaRPr>
-            </a:p>
-            <a:p>
-              <a:r>
-                <a:rPr lang="es-MX" sz="2200" b="1" dirty="0">
-                  <a:solidFill>
-                    <a:srgbClr val="FFC000"/>
-                  </a:solidFill>
-                  <a:latin typeface="Roboto" panose="02000000000000000000" pitchFamily="2" charset="0"/>
-                  <a:ea typeface="Roboto" panose="02000000000000000000" pitchFamily="2" charset="0"/>
-                </a:rPr>
-                <a:t>	</a:t>
-              </a:r>
-              <a:r>
-                <a:rPr lang="es-MX" sz="2400" dirty="0" smtClean="0">
-                  <a:solidFill>
-                    <a:schemeClr val="bg1">
-                      <a:lumMod val="95000"/>
-                    </a:schemeClr>
-                  </a:solidFill>
-                  <a:latin typeface="Roboto" panose="02000000000000000000" pitchFamily="2" charset="0"/>
-                  <a:ea typeface="Roboto" panose="02000000000000000000" pitchFamily="2" charset="0"/>
-                </a:rPr>
-                <a:t>l ó ←</a:t>
+                <a:t>:=</a:t>
               </a:r>
               <a:endParaRPr lang="es-MX" sz="2400" dirty="0">
                 <a:solidFill>
@@ -9443,15 +9305,6 @@
               </a:rPr>
               <a:t> [nombre rama]</a:t>
             </a:r>
-            <a:endParaRPr lang="es-MX" sz="2400" dirty="0" smtClean="0">
-              <a:solidFill>
-                <a:schemeClr val="bg1">
-                  <a:lumMod val="50000"/>
-                </a:schemeClr>
-              </a:solidFill>
-              <a:latin typeface="Roboto" panose="02000000000000000000" pitchFamily="2" charset="0"/>
-              <a:ea typeface="Roboto" panose="02000000000000000000" pitchFamily="2" charset="0"/>
-            </a:endParaRPr>
           </a:p>
           <a:p>
             <a:pPr marL="0" indent="0">
@@ -9481,19 +9334,7 @@
                 <a:latin typeface="Roboto" panose="02000000000000000000" pitchFamily="2" charset="0"/>
                 <a:ea typeface="Roboto" panose="02000000000000000000" pitchFamily="2" charset="0"/>
               </a:rPr>
-              <a:t>Cambiars</a:t>
-            </a:r>
-            <a:r>
-              <a:rPr lang="es-MX" sz="2200" dirty="0" smtClean="0">
-                <a:solidFill>
-                  <a:schemeClr val="bg1">
-                    <a:lumMod val="75000"/>
-                  </a:schemeClr>
-                </a:solidFill>
-                <a:latin typeface="Roboto" panose="02000000000000000000" pitchFamily="2" charset="0"/>
-                <a:ea typeface="Roboto" panose="02000000000000000000" pitchFamily="2" charset="0"/>
-              </a:rPr>
-              <a:t>e a otra rama</a:t>
+              <a:t>Cambiarse a otra rama</a:t>
             </a:r>
             <a:endParaRPr lang="es-MX" sz="2200" dirty="0">
               <a:solidFill>
@@ -9613,16 +9454,16 @@
       </p:pic>
       <p:grpSp>
         <p:nvGrpSpPr>
-          <p:cNvPr id="6" name="Grupo 5"/>
+          <p:cNvPr id="9" name="Grupo 8"/>
           <p:cNvGrpSpPr/>
           <p:nvPr/>
         </p:nvGrpSpPr>
         <p:grpSpPr>
           <a:xfrm>
-            <a:off x="6840747" y="3198168"/>
-            <a:ext cx="4688666" cy="461665"/>
-            <a:chOff x="6150634" y="3217653"/>
-            <a:chExt cx="4688666" cy="461665"/>
+            <a:off x="6228271" y="3198168"/>
+            <a:ext cx="5293190" cy="461665"/>
+            <a:chOff x="6228271" y="3405202"/>
+            <a:chExt cx="5293190" cy="461665"/>
           </a:xfrm>
         </p:grpSpPr>
         <p:sp>
@@ -9633,7 +9474,7 @@
           </p:nvSpPr>
           <p:spPr>
             <a:xfrm>
-              <a:off x="6150634" y="3217653"/>
+              <a:off x="6228271" y="3405202"/>
               <a:ext cx="4459875" cy="461665"/>
             </a:xfrm>
             <a:prstGeom prst="rect">
@@ -9707,23 +9548,14 @@
                 </a:rPr>
                 <a:t> –b [nombre rama]</a:t>
               </a:r>
-              <a:endParaRPr lang="es-MX" sz="2400" dirty="0">
-                <a:solidFill>
-                  <a:schemeClr val="bg1">
-                    <a:lumMod val="50000"/>
-                  </a:schemeClr>
-                </a:solidFill>
-                <a:latin typeface="Roboto" panose="02000000000000000000" pitchFamily="2" charset="0"/>
-                <a:ea typeface="Roboto" panose="02000000000000000000" pitchFamily="2" charset="0"/>
-              </a:endParaRPr>
             </a:p>
           </p:txBody>
         </p:sp>
         <p:pic>
           <p:nvPicPr>
-            <p:cNvPr id="1026" name="Picture 2" descr="http://www.newdesignfile.com/postpic/2014/01/8-bit-heart_281672.png"/>
+            <p:cNvPr id="7" name="Imagen 6"/>
             <p:cNvPicPr>
-              <a:picLocks noChangeAspect="1" noChangeArrowheads="1"/>
+              <a:picLocks noChangeAspect="1"/>
             </p:cNvPicPr>
             <p:nvPr/>
           </p:nvPicPr>
@@ -9735,29 +9567,18 @@
                 </a:ext>
               </a:extLst>
             </a:blip>
-            <a:srcRect/>
             <a:stretch>
               <a:fillRect/>
             </a:stretch>
           </p:blipFill>
-          <p:spPr bwMode="auto">
+          <p:spPr>
             <a:xfrm>
-              <a:off x="10610509" y="3334089"/>
-              <a:ext cx="228791" cy="228791"/>
+              <a:off x="10688146" y="3570778"/>
+              <a:ext cx="833315" cy="130512"/>
             </a:xfrm>
             <a:prstGeom prst="rect">
               <a:avLst/>
             </a:prstGeom>
-            <a:noFill/>
-            <a:extLst>
-              <a:ext uri="{909E8E84-426E-40DD-AFC4-6F175D3DCCD1}">
-                <a14:hiddenFill xmlns:a14="http://schemas.microsoft.com/office/drawing/2010/main">
-                  <a:solidFill>
-                    <a:srgbClr val="FFFFFF"/>
-                  </a:solidFill>
-                </a14:hiddenFill>
-              </a:ext>
-            </a:extLst>
           </p:spPr>
         </p:pic>
       </p:grpSp>

</xml_diff>

<commit_message>
este es una prueba
</commit_message>
<xml_diff>
--- a/2017/dec_7_Git_GitHub_WorkShop/DGO.pptx
+++ b/2017/dec_7_Git_GitHub_WorkShop/DGO.pptx
@@ -774,29 +774,12 @@
           <a:p>
             <a:r>
               <a:rPr lang="es-MX" dirty="0" smtClean="0"/>
-              <a:t>Primero crear un folder antes de inicializar</a:t>
-            </a:r>
-            <a:r>
-              <a:rPr lang="es-MX" baseline="0" dirty="0" smtClean="0"/>
-              <a:t> </a:t>
-            </a:r>
-            <a:r>
-              <a:rPr lang="es-MX" baseline="0" dirty="0" err="1" smtClean="0"/>
-              <a:t>git</a:t>
-            </a:r>
-            <a:r>
-              <a:rPr lang="es-MX" baseline="0" dirty="0" smtClean="0"/>
-              <a:t>  </a:t>
-            </a:r>
-            <a:br>
-              <a:rPr lang="es-MX" baseline="0" dirty="0" smtClean="0"/>
-            </a:br>
-            <a:r>
-              <a:rPr lang="es-MX" baseline="0" dirty="0" smtClean="0"/>
-              <a:t>ES EN EL QUE TRABAJARAN SIEMPRE</a:t>
-            </a:r>
-          </a:p>
-          <a:p>
+              <a:t>Tour por </a:t>
+            </a:r>
+            <a:r>
+              <a:rPr lang="es-MX" dirty="0" err="1" smtClean="0"/>
+              <a:t>github</a:t>
+            </a:r>
             <a:endParaRPr lang="es-MX" dirty="0"/>
           </a:p>
         </p:txBody>
@@ -818,6 +801,115 @@
           <a:p>
             <a:fld id="{46156E59-E055-4CB3-9140-1A026D5ECC98}" type="slidenum">
               <a:rPr lang="es-MX" smtClean="0"/>
+              <a:t>25</a:t>
+            </a:fld>
+            <a:endParaRPr lang="es-MX"/>
+          </a:p>
+        </p:txBody>
+      </p:sp>
+    </p:spTree>
+    <p:extLst>
+      <p:ext uri="{BB962C8B-B14F-4D97-AF65-F5344CB8AC3E}">
+        <p14:creationId xmlns:p14="http://schemas.microsoft.com/office/powerpoint/2010/main" val="583645856"/>
+      </p:ext>
+    </p:extLst>
+  </p:cSld>
+  <p:clrMapOvr>
+    <a:masterClrMapping/>
+  </p:clrMapOvr>
+</p:notes>
+</file>
+
+<file path=ppt/notesSlides/notesSlide12.xml><?xml version="1.0" encoding="utf-8"?>
+<p:notes xmlns:a="http://schemas.openxmlformats.org/drawingml/2006/main" xmlns:r="http://schemas.openxmlformats.org/officeDocument/2006/relationships" xmlns:p="http://schemas.openxmlformats.org/presentationml/2006/main">
+  <p:cSld>
+    <p:spTree>
+      <p:nvGrpSpPr>
+        <p:cNvPr id="1" name=""/>
+        <p:cNvGrpSpPr/>
+        <p:nvPr/>
+      </p:nvGrpSpPr>
+      <p:grpSpPr>
+        <a:xfrm>
+          <a:off x="0" y="0"/>
+          <a:ext cx="0" cy="0"/>
+          <a:chOff x="0" y="0"/>
+          <a:chExt cx="0" cy="0"/>
+        </a:xfrm>
+      </p:grpSpPr>
+      <p:sp>
+        <p:nvSpPr>
+          <p:cNvPr id="2" name="Marcador de imagen de diapositiva 1"/>
+          <p:cNvSpPr>
+            <a:spLocks noGrp="1" noRot="1" noChangeAspect="1"/>
+          </p:cNvSpPr>
+          <p:nvPr>
+            <p:ph type="sldImg"/>
+          </p:nvPr>
+        </p:nvSpPr>
+        <p:spPr/>
+      </p:sp>
+      <p:sp>
+        <p:nvSpPr>
+          <p:cNvPr id="3" name="Marcador de notas 2"/>
+          <p:cNvSpPr>
+            <a:spLocks noGrp="1"/>
+          </p:cNvSpPr>
+          <p:nvPr>
+            <p:ph type="body" idx="1"/>
+          </p:nvPr>
+        </p:nvSpPr>
+        <p:spPr/>
+        <p:txBody>
+          <a:bodyPr/>
+          <a:lstStyle/>
+          <a:p>
+            <a:r>
+              <a:rPr lang="es-MX" dirty="0" smtClean="0"/>
+              <a:t>Primero crear un folder antes de inicializar</a:t>
+            </a:r>
+            <a:r>
+              <a:rPr lang="es-MX" baseline="0" dirty="0" smtClean="0"/>
+              <a:t> </a:t>
+            </a:r>
+            <a:r>
+              <a:rPr lang="es-MX" baseline="0" dirty="0" err="1" smtClean="0"/>
+              <a:t>git</a:t>
+            </a:r>
+            <a:r>
+              <a:rPr lang="es-MX" baseline="0" dirty="0" smtClean="0"/>
+              <a:t>  </a:t>
+            </a:r>
+            <a:br>
+              <a:rPr lang="es-MX" baseline="0" dirty="0" smtClean="0"/>
+            </a:br>
+            <a:r>
+              <a:rPr lang="es-MX" baseline="0" dirty="0" smtClean="0"/>
+              <a:t>ES EN EL QUE TRABAJARAN SIEMPRE</a:t>
+            </a:r>
+          </a:p>
+          <a:p>
+            <a:endParaRPr lang="es-MX" dirty="0"/>
+          </a:p>
+        </p:txBody>
+      </p:sp>
+      <p:sp>
+        <p:nvSpPr>
+          <p:cNvPr id="4" name="Marcador de número de diapositiva 3"/>
+          <p:cNvSpPr>
+            <a:spLocks noGrp="1"/>
+          </p:cNvSpPr>
+          <p:nvPr>
+            <p:ph type="sldNum" sz="quarter" idx="10"/>
+          </p:nvPr>
+        </p:nvSpPr>
+        <p:spPr/>
+        <p:txBody>
+          <a:bodyPr/>
+          <a:lstStyle/>
+          <a:p>
+            <a:fld id="{46156E59-E055-4CB3-9140-1A026D5ECC98}" type="slidenum">
+              <a:rPr lang="es-MX" smtClean="0"/>
               <a:t>26</a:t>
             </a:fld>
             <a:endParaRPr lang="es-MX"/>
@@ -837,7 +929,7 @@
 </p:notes>
 </file>
 
-<file path=ppt/notesSlides/notesSlide12.xml><?xml version="1.0" encoding="utf-8"?>
+<file path=ppt/notesSlides/notesSlide13.xml><?xml version="1.0" encoding="utf-8"?>
 <p:notes xmlns:a="http://schemas.openxmlformats.org/drawingml/2006/main" xmlns:r="http://schemas.openxmlformats.org/officeDocument/2006/relationships" xmlns:p="http://schemas.openxmlformats.org/presentationml/2006/main">
   <p:cSld>
     <p:spTree>
@@ -12807,7 +12899,7 @@
           <p:nvPr/>
         </p:nvPicPr>
         <p:blipFill>
-          <a:blip r:embed="rId2">
+          <a:blip r:embed="rId3">
             <a:extLst>
               <a:ext uri="{28A0092B-C50C-407E-A947-70E740481C1C}">
                 <a14:useLocalDpi xmlns:a14="http://schemas.microsoft.com/office/drawing/2010/main" val="0"/>
@@ -12839,36 +12931,6 @@
           </a:extLst>
         </p:spPr>
       </p:pic>
-      <p:sp>
-        <p:nvSpPr>
-          <p:cNvPr id="2" name="CuadroTexto 1"/>
-          <p:cNvSpPr txBox="1"/>
-          <p:nvPr/>
-        </p:nvSpPr>
-        <p:spPr>
-          <a:xfrm>
-            <a:off x="2156604" y="5693434"/>
-            <a:ext cx="4968815" cy="369332"/>
-          </a:xfrm>
-          <a:prstGeom prst="rect">
-            <a:avLst/>
-          </a:prstGeom>
-          <a:noFill/>
-        </p:spPr>
-        <p:txBody>
-          <a:bodyPr wrap="square" rtlCol="0">
-            <a:spAutoFit/>
-          </a:bodyPr>
-          <a:lstStyle/>
-          <a:p>
-            <a:r>
-              <a:rPr lang="es-MX" smtClean="0"/>
-              <a:t>dlkjfj</a:t>
-            </a:r>
-            <a:endParaRPr lang="es-MX"/>
-          </a:p>
-        </p:txBody>
-      </p:sp>
     </p:spTree>
     <p:extLst>
       <p:ext uri="{BB962C8B-B14F-4D97-AF65-F5344CB8AC3E}">
@@ -14442,7 +14504,7 @@
                 <a:latin typeface="Roboto" panose="02000000000000000000" pitchFamily="2" charset="0"/>
                 <a:ea typeface="Roboto" panose="02000000000000000000" pitchFamily="2" charset="0"/>
               </a:rPr>
-              <a:t> –u </a:t>
+              <a:t> </a:t>
             </a:r>
             <a:r>
               <a:rPr lang="es-MX" sz="2400" dirty="0" err="1" smtClean="0">
@@ -14755,7 +14817,19 @@
                 <a:latin typeface="Roboto" panose="02000000000000000000" pitchFamily="2" charset="0"/>
                 <a:ea typeface="Roboto" panose="02000000000000000000" pitchFamily="2" charset="0"/>
               </a:rPr>
-              <a:t> -</a:t>
+              <a:t> </a:t>
+            </a:r>
+            <a:r>
+              <a:rPr lang="es-MX" sz="2000" dirty="0" smtClean="0">
+                <a:solidFill>
+                  <a:schemeClr val="bg1">
+                    <a:lumMod val="50000"/>
+                  </a:schemeClr>
+                </a:solidFill>
+                <a:latin typeface="Roboto" panose="02000000000000000000" pitchFamily="2" charset="0"/>
+                <a:ea typeface="Roboto" panose="02000000000000000000" pitchFamily="2" charset="0"/>
+              </a:rPr>
+              <a:t>–</a:t>
             </a:r>
             <a:r>
               <a:rPr lang="es-MX" sz="2000" dirty="0" err="1" smtClean="0">
@@ -14779,8 +14853,113 @@
                 <a:latin typeface="Roboto" panose="02000000000000000000" pitchFamily="2" charset="0"/>
                 <a:ea typeface="Roboto" panose="02000000000000000000" pitchFamily="2" charset="0"/>
               </a:rPr>
+              <a:t>	</a:t>
+            </a:r>
+            <a:r>
+              <a:rPr lang="es-MX" sz="2000" dirty="0" err="1" smtClean="0">
+                <a:solidFill>
+                  <a:schemeClr val="bg1">
+                    <a:lumMod val="50000"/>
+                  </a:schemeClr>
+                </a:solidFill>
+                <a:latin typeface="Roboto" panose="02000000000000000000" pitchFamily="2" charset="0"/>
+                <a:ea typeface="Roboto" panose="02000000000000000000" pitchFamily="2" charset="0"/>
+              </a:rPr>
+              <a:t>git</a:t>
+            </a:r>
+            <a:r>
+              <a:rPr lang="es-MX" sz="2000" dirty="0" smtClean="0">
+                <a:solidFill>
+                  <a:schemeClr val="bg1">
+                    <a:lumMod val="50000"/>
+                  </a:schemeClr>
+                </a:solidFill>
+                <a:latin typeface="Roboto" panose="02000000000000000000" pitchFamily="2" charset="0"/>
+                <a:ea typeface="Roboto" panose="02000000000000000000" pitchFamily="2" charset="0"/>
+              </a:rPr>
               <a:t> </a:t>
             </a:r>
+            <a:r>
+              <a:rPr lang="es-MX" sz="2000" dirty="0" err="1" smtClean="0">
+                <a:solidFill>
+                  <a:schemeClr val="bg1">
+                    <a:lumMod val="50000"/>
+                  </a:schemeClr>
+                </a:solidFill>
+                <a:latin typeface="Roboto" panose="02000000000000000000" pitchFamily="2" charset="0"/>
+                <a:ea typeface="Roboto" panose="02000000000000000000" pitchFamily="2" charset="0"/>
+              </a:rPr>
+              <a:t>add</a:t>
+            </a:r>
+            <a:r>
+              <a:rPr lang="es-MX" sz="2000" dirty="0" smtClean="0">
+                <a:solidFill>
+                  <a:schemeClr val="bg1">
+                    <a:lumMod val="50000"/>
+                  </a:schemeClr>
+                </a:solidFill>
+                <a:latin typeface="Roboto" panose="02000000000000000000" pitchFamily="2" charset="0"/>
+                <a:ea typeface="Roboto" panose="02000000000000000000" pitchFamily="2" charset="0"/>
+              </a:rPr>
+              <a:t> [archivo] 	</a:t>
+            </a:r>
+            <a:r>
+              <a:rPr lang="es-MX" sz="2000" dirty="0" err="1" smtClean="0">
+                <a:solidFill>
+                  <a:schemeClr val="bg1">
+                    <a:lumMod val="50000"/>
+                  </a:schemeClr>
+                </a:solidFill>
+                <a:latin typeface="Roboto" panose="02000000000000000000" pitchFamily="2" charset="0"/>
+                <a:ea typeface="Roboto" panose="02000000000000000000" pitchFamily="2" charset="0"/>
+              </a:rPr>
+              <a:t>git</a:t>
+            </a:r>
+            <a:r>
+              <a:rPr lang="es-MX" sz="2000" dirty="0" smtClean="0">
+                <a:solidFill>
+                  <a:schemeClr val="bg1">
+                    <a:lumMod val="50000"/>
+                  </a:schemeClr>
+                </a:solidFill>
+                <a:latin typeface="Roboto" panose="02000000000000000000" pitchFamily="2" charset="0"/>
+                <a:ea typeface="Roboto" panose="02000000000000000000" pitchFamily="2" charset="0"/>
+              </a:rPr>
+              <a:t> </a:t>
+            </a:r>
+            <a:r>
+              <a:rPr lang="es-MX" sz="2000" dirty="0" err="1" smtClean="0">
+                <a:solidFill>
+                  <a:schemeClr val="bg1">
+                    <a:lumMod val="50000"/>
+                  </a:schemeClr>
+                </a:solidFill>
+                <a:latin typeface="Roboto" panose="02000000000000000000" pitchFamily="2" charset="0"/>
+                <a:ea typeface="Roboto" panose="02000000000000000000" pitchFamily="2" charset="0"/>
+              </a:rPr>
+              <a:t>add</a:t>
+            </a:r>
+            <a:r>
+              <a:rPr lang="es-MX" sz="2000" smtClean="0">
+                <a:solidFill>
+                  <a:schemeClr val="bg1">
+                    <a:lumMod val="50000"/>
+                  </a:schemeClr>
+                </a:solidFill>
+                <a:latin typeface="Roboto" panose="02000000000000000000" pitchFamily="2" charset="0"/>
+                <a:ea typeface="Roboto" panose="02000000000000000000" pitchFamily="2" charset="0"/>
+              </a:rPr>
+              <a:t> . </a:t>
+            </a:r>
+            <a:endParaRPr lang="es-MX" sz="2000" dirty="0" smtClean="0">
+              <a:solidFill>
+                <a:schemeClr val="bg1">
+                  <a:lumMod val="50000"/>
+                </a:schemeClr>
+              </a:solidFill>
+              <a:latin typeface="Roboto" panose="02000000000000000000" pitchFamily="2" charset="0"/>
+              <a:ea typeface="Roboto" panose="02000000000000000000" pitchFamily="2" charset="0"/>
+            </a:endParaRPr>
           </a:p>
           <a:p>
             <a:pPr marL="0" indent="0">
@@ -18044,7 +18223,7 @@
         <p:spPr>
           <a:xfrm>
             <a:off x="4207098" y="3370440"/>
-            <a:ext cx="816249" cy="307777"/>
+            <a:ext cx="793807" cy="307777"/>
           </a:xfrm>
           <a:prstGeom prst="rect">
             <a:avLst/>
@@ -18058,14 +18237,24 @@
           <a:lstStyle/>
           <a:p>
             <a:r>
-              <a:rPr lang="es-MX" sz="1400" dirty="0" err="1" smtClean="0">
+              <a:rPr lang="es-MX" sz="1400" dirty="0" err="1">
                 <a:solidFill>
                   <a:srgbClr val="D50F2E"/>
                 </a:solidFill>
                 <a:latin typeface="Roboto Light" panose="02000000000000000000" pitchFamily="2" charset="0"/>
                 <a:ea typeface="Roboto Light" panose="02000000000000000000" pitchFamily="2" charset="0"/>
               </a:rPr>
-              <a:t>Commit</a:t>
+              <a:t>c</a:t>
+            </a:r>
+            <a:r>
+              <a:rPr lang="es-MX" sz="1400" dirty="0" err="1" smtClean="0">
+                <a:solidFill>
+                  <a:srgbClr val="D50F2E"/>
+                </a:solidFill>
+                <a:latin typeface="Roboto Light" panose="02000000000000000000" pitchFamily="2" charset="0"/>
+                <a:ea typeface="Roboto Light" panose="02000000000000000000" pitchFamily="2" charset="0"/>
+              </a:rPr>
+              <a:t>ommit</a:t>
             </a:r>
             <a:endParaRPr lang="es-MX" sz="1400" dirty="0">
               <a:solidFill>
@@ -18086,7 +18275,7 @@
         <p:spPr>
           <a:xfrm>
             <a:off x="4207098" y="4083565"/>
-            <a:ext cx="816249" cy="307777"/>
+            <a:ext cx="793807" cy="307777"/>
           </a:xfrm>
           <a:prstGeom prst="rect">
             <a:avLst/>
@@ -18107,7 +18296,7 @@
                 <a:latin typeface="Roboto Light" panose="02000000000000000000" pitchFamily="2" charset="0"/>
                 <a:ea typeface="Roboto Light" panose="02000000000000000000" pitchFamily="2" charset="0"/>
               </a:rPr>
-              <a:t>Commit</a:t>
+              <a:t>commit</a:t>
             </a:r>
             <a:endParaRPr lang="es-MX" sz="1400" dirty="0">
               <a:solidFill>
@@ -18128,7 +18317,7 @@
         <p:spPr>
           <a:xfrm>
             <a:off x="4207098" y="4853555"/>
-            <a:ext cx="816249" cy="307777"/>
+            <a:ext cx="793807" cy="307777"/>
           </a:xfrm>
           <a:prstGeom prst="rect">
             <a:avLst/>
@@ -18142,14 +18331,24 @@
           <a:lstStyle/>
           <a:p>
             <a:r>
-              <a:rPr lang="es-MX" sz="1400" dirty="0" err="1" smtClean="0">
+              <a:rPr lang="es-MX" sz="1400" dirty="0" err="1">
                 <a:solidFill>
                   <a:srgbClr val="D50F2E"/>
                 </a:solidFill>
                 <a:latin typeface="Roboto Light" panose="02000000000000000000" pitchFamily="2" charset="0"/>
                 <a:ea typeface="Roboto Light" panose="02000000000000000000" pitchFamily="2" charset="0"/>
               </a:rPr>
-              <a:t>Commit</a:t>
+              <a:t>c</a:t>
+            </a:r>
+            <a:r>
+              <a:rPr lang="es-MX" sz="1400" dirty="0" err="1" smtClean="0">
+                <a:solidFill>
+                  <a:srgbClr val="D50F2E"/>
+                </a:solidFill>
+                <a:latin typeface="Roboto Light" panose="02000000000000000000" pitchFamily="2" charset="0"/>
+                <a:ea typeface="Roboto Light" panose="02000000000000000000" pitchFamily="2" charset="0"/>
+              </a:rPr>
+              <a:t>ommit</a:t>
             </a:r>
             <a:endParaRPr lang="es-MX" sz="1400" dirty="0">
               <a:solidFill>

</xml_diff>